<commit_message>
added something to ppt
</commit_message>
<xml_diff>
--- a/dviz_ppt.pptx
+++ b/dviz_ppt.pptx
@@ -4,12 +4,30 @@
   <p:sldMasterIdLst>
     <p:sldMasterId id="2147483648" r:id="rId2"/>
     <p:sldMasterId id="2147483661" r:id="rId3"/>
-    <p:sldMasterId id="2147483674" r:id="rId4"/>
   </p:sldMasterIdLst>
   <p:sldIdLst>
-    <p:sldId id="256" r:id="rId5"/>
-    <p:sldId id="257" r:id="rId6"/>
-    <p:sldId id="258" r:id="rId7"/>
+    <p:sldId id="256" r:id="rId4"/>
+    <p:sldId id="257" r:id="rId5"/>
+    <p:sldId id="258" r:id="rId6"/>
+    <p:sldId id="259" r:id="rId7"/>
+    <p:sldId id="260" r:id="rId8"/>
+    <p:sldId id="261" r:id="rId9"/>
+    <p:sldId id="262" r:id="rId10"/>
+    <p:sldId id="263" r:id="rId11"/>
+    <p:sldId id="264" r:id="rId12"/>
+    <p:sldId id="265" r:id="rId13"/>
+    <p:sldId id="266" r:id="rId14"/>
+    <p:sldId id="267" r:id="rId15"/>
+    <p:sldId id="268" r:id="rId16"/>
+    <p:sldId id="269" r:id="rId17"/>
+    <p:sldId id="270" r:id="rId18"/>
+    <p:sldId id="271" r:id="rId19"/>
+    <p:sldId id="272" r:id="rId20"/>
+    <p:sldId id="273" r:id="rId21"/>
+    <p:sldId id="274" r:id="rId22"/>
+    <p:sldId id="275" r:id="rId23"/>
+    <p:sldId id="276" r:id="rId24"/>
+    <p:sldId id="277" r:id="rId25"/>
   </p:sldIdLst>
   <p:sldSz cx="9144000" cy="5143500"/>
   <p:notesSz cx="7772400" cy="10058400"/>
@@ -1963,351 +1981,6 @@
 </p:sldLayout>
 </file>
 
-<file path=ppt/slideLayouts/slideLayout25.xml><?xml version="1.0" encoding="utf-8"?>
-<p:sldLayout xmlns:a="http://schemas.openxmlformats.org/drawingml/2006/main" xmlns:p="http://schemas.openxmlformats.org/presentationml/2006/main" xmlns:r="http://schemas.openxmlformats.org/officeDocument/2006/relationships" xmlns:p14="http://schemas.microsoft.com/office/powerpoint/2010/main" xmlns:p15="http://schemas.microsoft.com/office/powerpoint/2012/main" xmlns:mc="http://schemas.openxmlformats.org/markup-compatibility/2006" type="blank" preserve="1">
-  <p:cSld name="Blank Slide">
-    <p:spTree>
-      <p:nvGrpSpPr>
-        <p:cNvPr id="1" name=""/>
-        <p:cNvGrpSpPr/>
-        <p:nvPr/>
-      </p:nvGrpSpPr>
-      <p:grpSpPr>
-        <a:xfrm>
-          <a:off x="0" y="0"/>
-          <a:ext cx="0" cy="0"/>
-          <a:chOff x="0" y="0"/>
-          <a:chExt cx="0" cy="0"/>
-        </a:xfrm>
-      </p:grpSpPr>
-    </p:spTree>
-  </p:cSld>
-</p:sldLayout>
-</file>
-
-<file path=ppt/slideLayouts/slideLayout26.xml><?xml version="1.0" encoding="utf-8"?>
-<p:sldLayout xmlns:a="http://schemas.openxmlformats.org/drawingml/2006/main" xmlns:p="http://schemas.openxmlformats.org/presentationml/2006/main" xmlns:r="http://schemas.openxmlformats.org/officeDocument/2006/relationships" xmlns:p14="http://schemas.microsoft.com/office/powerpoint/2010/main" xmlns:p15="http://schemas.microsoft.com/office/powerpoint/2012/main" xmlns:mc="http://schemas.openxmlformats.org/markup-compatibility/2006" type="tx" preserve="1">
-  <p:cSld name="Title Slide">
-    <p:spTree>
-      <p:nvGrpSpPr>
-        <p:cNvPr id="1" name=""/>
-        <p:cNvGrpSpPr/>
-        <p:nvPr/>
-      </p:nvGrpSpPr>
-      <p:grpSpPr>
-        <a:xfrm>
-          <a:off x="0" y="0"/>
-          <a:ext cx="0" cy="0"/>
-          <a:chOff x="0" y="0"/>
-          <a:chExt cx="0" cy="0"/>
-        </a:xfrm>
-      </p:grpSpPr>
-      <p:sp>
-        <p:nvSpPr>
-          <p:cNvPr id="90" name="PlaceHolder 1"/>
-          <p:cNvSpPr>
-            <a:spLocks noGrp="1"/>
-          </p:cNvSpPr>
-          <p:nvPr>
-            <p:ph type="title"/>
-          </p:nvPr>
-        </p:nvSpPr>
-        <p:spPr>
-          <a:xfrm>
-            <a:off x="457200" y="205200"/>
-            <a:ext cx="8229240" cy="858600"/>
-          </a:xfrm>
-          <a:prstGeom prst="rect">
-            <a:avLst/>
-          </a:prstGeom>
-        </p:spPr>
-        <p:txBody>
-          <a:bodyPr lIns="0" rIns="0" tIns="0" bIns="0" anchor="ctr"/>
-          <a:p>
-            <a:pPr algn="ctr"/>
-            <a:endParaRPr b="0" lang="en-US" sz="4400" spc="-1" strike="noStrike">
-              <a:latin typeface="Arial"/>
-            </a:endParaRPr>
-          </a:p>
-        </p:txBody>
-      </p:sp>
-      <p:sp>
-        <p:nvSpPr>
-          <p:cNvPr id="91" name="PlaceHolder 2"/>
-          <p:cNvSpPr>
-            <a:spLocks noGrp="1"/>
-          </p:cNvSpPr>
-          <p:nvPr>
-            <p:ph type="subTitle"/>
-          </p:nvPr>
-        </p:nvSpPr>
-        <p:spPr>
-          <a:xfrm>
-            <a:off x="457200" y="1203480"/>
-            <a:ext cx="8229240" cy="2982960"/>
-          </a:xfrm>
-          <a:prstGeom prst="rect">
-            <a:avLst/>
-          </a:prstGeom>
-        </p:spPr>
-        <p:txBody>
-          <a:bodyPr lIns="0" rIns="0" tIns="0" bIns="0" anchor="ctr"/>
-          <a:p>
-            <a:pPr algn="ctr"/>
-            <a:endParaRPr b="0" lang="en-US" sz="3200" spc="-1" strike="noStrike">
-              <a:latin typeface="Arial"/>
-            </a:endParaRPr>
-          </a:p>
-        </p:txBody>
-      </p:sp>
-    </p:spTree>
-  </p:cSld>
-</p:sldLayout>
-</file>
-
-<file path=ppt/slideLayouts/slideLayout27.xml><?xml version="1.0" encoding="utf-8"?>
-<p:sldLayout xmlns:a="http://schemas.openxmlformats.org/drawingml/2006/main" xmlns:p="http://schemas.openxmlformats.org/presentationml/2006/main" xmlns:r="http://schemas.openxmlformats.org/officeDocument/2006/relationships" xmlns:p14="http://schemas.microsoft.com/office/powerpoint/2010/main" xmlns:p15="http://schemas.microsoft.com/office/powerpoint/2012/main" xmlns:mc="http://schemas.openxmlformats.org/markup-compatibility/2006" type="obj" preserve="1">
-  <p:cSld name="Title, Content">
-    <p:spTree>
-      <p:nvGrpSpPr>
-        <p:cNvPr id="1" name=""/>
-        <p:cNvGrpSpPr/>
-        <p:nvPr/>
-      </p:nvGrpSpPr>
-      <p:grpSpPr>
-        <a:xfrm>
-          <a:off x="0" y="0"/>
-          <a:ext cx="0" cy="0"/>
-          <a:chOff x="0" y="0"/>
-          <a:chExt cx="0" cy="0"/>
-        </a:xfrm>
-      </p:grpSpPr>
-      <p:sp>
-        <p:nvSpPr>
-          <p:cNvPr id="92" name="PlaceHolder 1"/>
-          <p:cNvSpPr>
-            <a:spLocks noGrp="1"/>
-          </p:cNvSpPr>
-          <p:nvPr>
-            <p:ph type="title"/>
-          </p:nvPr>
-        </p:nvSpPr>
-        <p:spPr>
-          <a:xfrm>
-            <a:off x="457200" y="205200"/>
-            <a:ext cx="8229240" cy="858600"/>
-          </a:xfrm>
-          <a:prstGeom prst="rect">
-            <a:avLst/>
-          </a:prstGeom>
-        </p:spPr>
-        <p:txBody>
-          <a:bodyPr lIns="0" rIns="0" tIns="0" bIns="0" anchor="ctr"/>
-          <a:p>
-            <a:pPr algn="ctr"/>
-            <a:endParaRPr b="0" lang="en-US" sz="4400" spc="-1" strike="noStrike">
-              <a:latin typeface="Arial"/>
-            </a:endParaRPr>
-          </a:p>
-        </p:txBody>
-      </p:sp>
-      <p:sp>
-        <p:nvSpPr>
-          <p:cNvPr id="93" name="PlaceHolder 2"/>
-          <p:cNvSpPr>
-            <a:spLocks noGrp="1"/>
-          </p:cNvSpPr>
-          <p:nvPr>
-            <p:ph type="body"/>
-          </p:nvPr>
-        </p:nvSpPr>
-        <p:spPr>
-          <a:xfrm>
-            <a:off x="457200" y="1203480"/>
-            <a:ext cx="8229240" cy="2982960"/>
-          </a:xfrm>
-          <a:prstGeom prst="rect">
-            <a:avLst/>
-          </a:prstGeom>
-        </p:spPr>
-        <p:txBody>
-          <a:bodyPr lIns="0" rIns="0" tIns="0" bIns="0">
-            <a:normAutofit/>
-          </a:bodyPr>
-          <a:p>
-            <a:endParaRPr b="0" lang="en-US" sz="3200" spc="-1" strike="noStrike">
-              <a:latin typeface="Arial"/>
-            </a:endParaRPr>
-          </a:p>
-        </p:txBody>
-      </p:sp>
-    </p:spTree>
-  </p:cSld>
-</p:sldLayout>
-</file>
-
-<file path=ppt/slideLayouts/slideLayout28.xml><?xml version="1.0" encoding="utf-8"?>
-<p:sldLayout xmlns:a="http://schemas.openxmlformats.org/drawingml/2006/main" xmlns:p="http://schemas.openxmlformats.org/presentationml/2006/main" xmlns:r="http://schemas.openxmlformats.org/officeDocument/2006/relationships" xmlns:p14="http://schemas.microsoft.com/office/powerpoint/2010/main" xmlns:p15="http://schemas.microsoft.com/office/powerpoint/2012/main" xmlns:mc="http://schemas.openxmlformats.org/markup-compatibility/2006" type="twoObj" preserve="1">
-  <p:cSld name="Title, 2 Content">
-    <p:spTree>
-      <p:nvGrpSpPr>
-        <p:cNvPr id="1" name=""/>
-        <p:cNvGrpSpPr/>
-        <p:nvPr/>
-      </p:nvGrpSpPr>
-      <p:grpSpPr>
-        <a:xfrm>
-          <a:off x="0" y="0"/>
-          <a:ext cx="0" cy="0"/>
-          <a:chOff x="0" y="0"/>
-          <a:chExt cx="0" cy="0"/>
-        </a:xfrm>
-      </p:grpSpPr>
-      <p:sp>
-        <p:nvSpPr>
-          <p:cNvPr id="94" name="PlaceHolder 1"/>
-          <p:cNvSpPr>
-            <a:spLocks noGrp="1"/>
-          </p:cNvSpPr>
-          <p:nvPr>
-            <p:ph type="title"/>
-          </p:nvPr>
-        </p:nvSpPr>
-        <p:spPr>
-          <a:xfrm>
-            <a:off x="457200" y="205200"/>
-            <a:ext cx="8229240" cy="858600"/>
-          </a:xfrm>
-          <a:prstGeom prst="rect">
-            <a:avLst/>
-          </a:prstGeom>
-        </p:spPr>
-        <p:txBody>
-          <a:bodyPr lIns="0" rIns="0" tIns="0" bIns="0" anchor="ctr"/>
-          <a:p>
-            <a:pPr algn="ctr"/>
-            <a:endParaRPr b="0" lang="en-US" sz="4400" spc="-1" strike="noStrike">
-              <a:latin typeface="Arial"/>
-            </a:endParaRPr>
-          </a:p>
-        </p:txBody>
-      </p:sp>
-      <p:sp>
-        <p:nvSpPr>
-          <p:cNvPr id="95" name="PlaceHolder 2"/>
-          <p:cNvSpPr>
-            <a:spLocks noGrp="1"/>
-          </p:cNvSpPr>
-          <p:nvPr>
-            <p:ph type="body"/>
-          </p:nvPr>
-        </p:nvSpPr>
-        <p:spPr>
-          <a:xfrm>
-            <a:off x="457200" y="1203480"/>
-            <a:ext cx="4015800" cy="2982960"/>
-          </a:xfrm>
-          <a:prstGeom prst="rect">
-            <a:avLst/>
-          </a:prstGeom>
-        </p:spPr>
-        <p:txBody>
-          <a:bodyPr lIns="0" rIns="0" tIns="0" bIns="0">
-            <a:normAutofit/>
-          </a:bodyPr>
-          <a:p>
-            <a:endParaRPr b="0" lang="en-US" sz="3200" spc="-1" strike="noStrike">
-              <a:latin typeface="Arial"/>
-            </a:endParaRPr>
-          </a:p>
-        </p:txBody>
-      </p:sp>
-      <p:sp>
-        <p:nvSpPr>
-          <p:cNvPr id="96" name="PlaceHolder 3"/>
-          <p:cNvSpPr>
-            <a:spLocks noGrp="1"/>
-          </p:cNvSpPr>
-          <p:nvPr>
-            <p:ph type="body"/>
-          </p:nvPr>
-        </p:nvSpPr>
-        <p:spPr>
-          <a:xfrm>
-            <a:off x="4674240" y="1203480"/>
-            <a:ext cx="4015800" cy="2982960"/>
-          </a:xfrm>
-          <a:prstGeom prst="rect">
-            <a:avLst/>
-          </a:prstGeom>
-        </p:spPr>
-        <p:txBody>
-          <a:bodyPr lIns="0" rIns="0" tIns="0" bIns="0">
-            <a:normAutofit/>
-          </a:bodyPr>
-          <a:p>
-            <a:endParaRPr b="0" lang="en-US" sz="3200" spc="-1" strike="noStrike">
-              <a:latin typeface="Arial"/>
-            </a:endParaRPr>
-          </a:p>
-        </p:txBody>
-      </p:sp>
-    </p:spTree>
-  </p:cSld>
-</p:sldLayout>
-</file>
-
-<file path=ppt/slideLayouts/slideLayout29.xml><?xml version="1.0" encoding="utf-8"?>
-<p:sldLayout xmlns:a="http://schemas.openxmlformats.org/drawingml/2006/main" xmlns:p="http://schemas.openxmlformats.org/presentationml/2006/main" xmlns:r="http://schemas.openxmlformats.org/officeDocument/2006/relationships" xmlns:p14="http://schemas.microsoft.com/office/powerpoint/2010/main" xmlns:p15="http://schemas.microsoft.com/office/powerpoint/2012/main" xmlns:mc="http://schemas.openxmlformats.org/markup-compatibility/2006" type="titleOnly" preserve="1">
-  <p:cSld name="Title Only">
-    <p:spTree>
-      <p:nvGrpSpPr>
-        <p:cNvPr id="1" name=""/>
-        <p:cNvGrpSpPr/>
-        <p:nvPr/>
-      </p:nvGrpSpPr>
-      <p:grpSpPr>
-        <a:xfrm>
-          <a:off x="0" y="0"/>
-          <a:ext cx="0" cy="0"/>
-          <a:chOff x="0" y="0"/>
-          <a:chExt cx="0" cy="0"/>
-        </a:xfrm>
-      </p:grpSpPr>
-      <p:sp>
-        <p:nvSpPr>
-          <p:cNvPr id="97" name="PlaceHolder 1"/>
-          <p:cNvSpPr>
-            <a:spLocks noGrp="1"/>
-          </p:cNvSpPr>
-          <p:nvPr>
-            <p:ph type="title"/>
-          </p:nvPr>
-        </p:nvSpPr>
-        <p:spPr>
-          <a:xfrm>
-            <a:off x="457200" y="205200"/>
-            <a:ext cx="8229240" cy="858600"/>
-          </a:xfrm>
-          <a:prstGeom prst="rect">
-            <a:avLst/>
-          </a:prstGeom>
-        </p:spPr>
-        <p:txBody>
-          <a:bodyPr lIns="0" rIns="0" tIns="0" bIns="0" anchor="ctr"/>
-          <a:p>
-            <a:pPr algn="ctr"/>
-            <a:endParaRPr b="0" lang="en-US" sz="4400" spc="-1" strike="noStrike">
-              <a:latin typeface="Arial"/>
-            </a:endParaRPr>
-          </a:p>
-        </p:txBody>
-      </p:sp>
-    </p:spTree>
-  </p:cSld>
-</p:sldLayout>
-</file>
-
 <file path=ppt/slideLayouts/slideLayout3.xml><?xml version="1.0" encoding="utf-8"?>
 <p:sldLayout xmlns:a="http://schemas.openxmlformats.org/drawingml/2006/main" xmlns:p="http://schemas.openxmlformats.org/presentationml/2006/main" xmlns:r="http://schemas.openxmlformats.org/officeDocument/2006/relationships" xmlns:p14="http://schemas.microsoft.com/office/powerpoint/2010/main" xmlns:p15="http://schemas.microsoft.com/office/powerpoint/2012/main" xmlns:mc="http://schemas.openxmlformats.org/markup-compatibility/2006" type="obj" preserve="1">
   <p:cSld name="Title, Content">
@@ -2368,993 +2041,6 @@
           <a:xfrm>
             <a:off x="457200" y="1203480"/>
             <a:ext cx="8229240" cy="2982960"/>
-          </a:xfrm>
-          <a:prstGeom prst="rect">
-            <a:avLst/>
-          </a:prstGeom>
-        </p:spPr>
-        <p:txBody>
-          <a:bodyPr lIns="0" rIns="0" tIns="0" bIns="0">
-            <a:normAutofit/>
-          </a:bodyPr>
-          <a:p>
-            <a:endParaRPr b="0" lang="en-US" sz="3200" spc="-1" strike="noStrike">
-              <a:latin typeface="Arial"/>
-            </a:endParaRPr>
-          </a:p>
-        </p:txBody>
-      </p:sp>
-    </p:spTree>
-  </p:cSld>
-</p:sldLayout>
-</file>
-
-<file path=ppt/slideLayouts/slideLayout30.xml><?xml version="1.0" encoding="utf-8"?>
-<p:sldLayout xmlns:a="http://schemas.openxmlformats.org/drawingml/2006/main" xmlns:p="http://schemas.openxmlformats.org/presentationml/2006/main" xmlns:r="http://schemas.openxmlformats.org/officeDocument/2006/relationships" xmlns:p14="http://schemas.microsoft.com/office/powerpoint/2010/main" xmlns:p15="http://schemas.microsoft.com/office/powerpoint/2012/main" xmlns:mc="http://schemas.openxmlformats.org/markup-compatibility/2006" type="objOnly" preserve="1">
-  <p:cSld name="Centered Text">
-    <p:spTree>
-      <p:nvGrpSpPr>
-        <p:cNvPr id="1" name=""/>
-        <p:cNvGrpSpPr/>
-        <p:nvPr/>
-      </p:nvGrpSpPr>
-      <p:grpSpPr>
-        <a:xfrm>
-          <a:off x="0" y="0"/>
-          <a:ext cx="0" cy="0"/>
-          <a:chOff x="0" y="0"/>
-          <a:chExt cx="0" cy="0"/>
-        </a:xfrm>
-      </p:grpSpPr>
-      <p:sp>
-        <p:nvSpPr>
-          <p:cNvPr id="98" name="PlaceHolder 1"/>
-          <p:cNvSpPr>
-            <a:spLocks noGrp="1"/>
-          </p:cNvSpPr>
-          <p:nvPr>
-            <p:ph type="subTitle"/>
-          </p:nvPr>
-        </p:nvSpPr>
-        <p:spPr>
-          <a:xfrm>
-            <a:off x="457200" y="205200"/>
-            <a:ext cx="8229240" cy="3981240"/>
-          </a:xfrm>
-          <a:prstGeom prst="rect">
-            <a:avLst/>
-          </a:prstGeom>
-        </p:spPr>
-        <p:txBody>
-          <a:bodyPr lIns="0" rIns="0" tIns="0" bIns="0" anchor="ctr"/>
-          <a:p>
-            <a:pPr algn="ctr"/>
-            <a:endParaRPr b="0" lang="en-US" sz="3200" spc="-1" strike="noStrike">
-              <a:latin typeface="Arial"/>
-            </a:endParaRPr>
-          </a:p>
-        </p:txBody>
-      </p:sp>
-    </p:spTree>
-  </p:cSld>
-</p:sldLayout>
-</file>
-
-<file path=ppt/slideLayouts/slideLayout31.xml><?xml version="1.0" encoding="utf-8"?>
-<p:sldLayout xmlns:a="http://schemas.openxmlformats.org/drawingml/2006/main" xmlns:p="http://schemas.openxmlformats.org/presentationml/2006/main" xmlns:r="http://schemas.openxmlformats.org/officeDocument/2006/relationships" xmlns:p14="http://schemas.microsoft.com/office/powerpoint/2010/main" xmlns:p15="http://schemas.microsoft.com/office/powerpoint/2012/main" xmlns:mc="http://schemas.openxmlformats.org/markup-compatibility/2006" type="twoObjAndObj" preserve="1">
-  <p:cSld name="Title, 2 Content and Content">
-    <p:spTree>
-      <p:nvGrpSpPr>
-        <p:cNvPr id="1" name=""/>
-        <p:cNvGrpSpPr/>
-        <p:nvPr/>
-      </p:nvGrpSpPr>
-      <p:grpSpPr>
-        <a:xfrm>
-          <a:off x="0" y="0"/>
-          <a:ext cx="0" cy="0"/>
-          <a:chOff x="0" y="0"/>
-          <a:chExt cx="0" cy="0"/>
-        </a:xfrm>
-      </p:grpSpPr>
-      <p:sp>
-        <p:nvSpPr>
-          <p:cNvPr id="99" name="PlaceHolder 1"/>
-          <p:cNvSpPr>
-            <a:spLocks noGrp="1"/>
-          </p:cNvSpPr>
-          <p:nvPr>
-            <p:ph type="title"/>
-          </p:nvPr>
-        </p:nvSpPr>
-        <p:spPr>
-          <a:xfrm>
-            <a:off x="457200" y="205200"/>
-            <a:ext cx="8229240" cy="858600"/>
-          </a:xfrm>
-          <a:prstGeom prst="rect">
-            <a:avLst/>
-          </a:prstGeom>
-        </p:spPr>
-        <p:txBody>
-          <a:bodyPr lIns="0" rIns="0" tIns="0" bIns="0" anchor="ctr"/>
-          <a:p>
-            <a:pPr algn="ctr"/>
-            <a:endParaRPr b="0" lang="en-US" sz="4400" spc="-1" strike="noStrike">
-              <a:latin typeface="Arial"/>
-            </a:endParaRPr>
-          </a:p>
-        </p:txBody>
-      </p:sp>
-      <p:sp>
-        <p:nvSpPr>
-          <p:cNvPr id="100" name="PlaceHolder 2"/>
-          <p:cNvSpPr>
-            <a:spLocks noGrp="1"/>
-          </p:cNvSpPr>
-          <p:nvPr>
-            <p:ph type="body"/>
-          </p:nvPr>
-        </p:nvSpPr>
-        <p:spPr>
-          <a:xfrm>
-            <a:off x="457200" y="1203480"/>
-            <a:ext cx="4015800" cy="1422720"/>
-          </a:xfrm>
-          <a:prstGeom prst="rect">
-            <a:avLst/>
-          </a:prstGeom>
-        </p:spPr>
-        <p:txBody>
-          <a:bodyPr lIns="0" rIns="0" tIns="0" bIns="0">
-            <a:normAutofit/>
-          </a:bodyPr>
-          <a:p>
-            <a:endParaRPr b="0" lang="en-US" sz="3200" spc="-1" strike="noStrike">
-              <a:latin typeface="Arial"/>
-            </a:endParaRPr>
-          </a:p>
-        </p:txBody>
-      </p:sp>
-      <p:sp>
-        <p:nvSpPr>
-          <p:cNvPr id="101" name="PlaceHolder 3"/>
-          <p:cNvSpPr>
-            <a:spLocks noGrp="1"/>
-          </p:cNvSpPr>
-          <p:nvPr>
-            <p:ph type="body"/>
-          </p:nvPr>
-        </p:nvSpPr>
-        <p:spPr>
-          <a:xfrm>
-            <a:off x="4674240" y="1203480"/>
-            <a:ext cx="4015800" cy="2982960"/>
-          </a:xfrm>
-          <a:prstGeom prst="rect">
-            <a:avLst/>
-          </a:prstGeom>
-        </p:spPr>
-        <p:txBody>
-          <a:bodyPr lIns="0" rIns="0" tIns="0" bIns="0">
-            <a:normAutofit/>
-          </a:bodyPr>
-          <a:p>
-            <a:endParaRPr b="0" lang="en-US" sz="3200" spc="-1" strike="noStrike">
-              <a:latin typeface="Arial"/>
-            </a:endParaRPr>
-          </a:p>
-        </p:txBody>
-      </p:sp>
-      <p:sp>
-        <p:nvSpPr>
-          <p:cNvPr id="102" name="PlaceHolder 4"/>
-          <p:cNvSpPr>
-            <a:spLocks noGrp="1"/>
-          </p:cNvSpPr>
-          <p:nvPr>
-            <p:ph type="body"/>
-          </p:nvPr>
-        </p:nvSpPr>
-        <p:spPr>
-          <a:xfrm>
-            <a:off x="457200" y="2761920"/>
-            <a:ext cx="4015800" cy="1422720"/>
-          </a:xfrm>
-          <a:prstGeom prst="rect">
-            <a:avLst/>
-          </a:prstGeom>
-        </p:spPr>
-        <p:txBody>
-          <a:bodyPr lIns="0" rIns="0" tIns="0" bIns="0">
-            <a:normAutofit/>
-          </a:bodyPr>
-          <a:p>
-            <a:endParaRPr b="0" lang="en-US" sz="3200" spc="-1" strike="noStrike">
-              <a:latin typeface="Arial"/>
-            </a:endParaRPr>
-          </a:p>
-        </p:txBody>
-      </p:sp>
-    </p:spTree>
-  </p:cSld>
-</p:sldLayout>
-</file>
-
-<file path=ppt/slideLayouts/slideLayout32.xml><?xml version="1.0" encoding="utf-8"?>
-<p:sldLayout xmlns:a="http://schemas.openxmlformats.org/drawingml/2006/main" xmlns:p="http://schemas.openxmlformats.org/presentationml/2006/main" xmlns:r="http://schemas.openxmlformats.org/officeDocument/2006/relationships" xmlns:p14="http://schemas.microsoft.com/office/powerpoint/2010/main" xmlns:p15="http://schemas.microsoft.com/office/powerpoint/2012/main" xmlns:mc="http://schemas.openxmlformats.org/markup-compatibility/2006" type="objAndTwoObj" preserve="1">
-  <p:cSld name="Title Content and 2 Content">
-    <p:spTree>
-      <p:nvGrpSpPr>
-        <p:cNvPr id="1" name=""/>
-        <p:cNvGrpSpPr/>
-        <p:nvPr/>
-      </p:nvGrpSpPr>
-      <p:grpSpPr>
-        <a:xfrm>
-          <a:off x="0" y="0"/>
-          <a:ext cx="0" cy="0"/>
-          <a:chOff x="0" y="0"/>
-          <a:chExt cx="0" cy="0"/>
-        </a:xfrm>
-      </p:grpSpPr>
-      <p:sp>
-        <p:nvSpPr>
-          <p:cNvPr id="103" name="PlaceHolder 1"/>
-          <p:cNvSpPr>
-            <a:spLocks noGrp="1"/>
-          </p:cNvSpPr>
-          <p:nvPr>
-            <p:ph type="title"/>
-          </p:nvPr>
-        </p:nvSpPr>
-        <p:spPr>
-          <a:xfrm>
-            <a:off x="457200" y="205200"/>
-            <a:ext cx="8229240" cy="858600"/>
-          </a:xfrm>
-          <a:prstGeom prst="rect">
-            <a:avLst/>
-          </a:prstGeom>
-        </p:spPr>
-        <p:txBody>
-          <a:bodyPr lIns="0" rIns="0" tIns="0" bIns="0" anchor="ctr"/>
-          <a:p>
-            <a:pPr algn="ctr"/>
-            <a:endParaRPr b="0" lang="en-US" sz="4400" spc="-1" strike="noStrike">
-              <a:latin typeface="Arial"/>
-            </a:endParaRPr>
-          </a:p>
-        </p:txBody>
-      </p:sp>
-      <p:sp>
-        <p:nvSpPr>
-          <p:cNvPr id="104" name="PlaceHolder 2"/>
-          <p:cNvSpPr>
-            <a:spLocks noGrp="1"/>
-          </p:cNvSpPr>
-          <p:nvPr>
-            <p:ph type="body"/>
-          </p:nvPr>
-        </p:nvSpPr>
-        <p:spPr>
-          <a:xfrm>
-            <a:off x="457200" y="1203480"/>
-            <a:ext cx="4015800" cy="2982960"/>
-          </a:xfrm>
-          <a:prstGeom prst="rect">
-            <a:avLst/>
-          </a:prstGeom>
-        </p:spPr>
-        <p:txBody>
-          <a:bodyPr lIns="0" rIns="0" tIns="0" bIns="0">
-            <a:normAutofit/>
-          </a:bodyPr>
-          <a:p>
-            <a:endParaRPr b="0" lang="en-US" sz="3200" spc="-1" strike="noStrike">
-              <a:latin typeface="Arial"/>
-            </a:endParaRPr>
-          </a:p>
-        </p:txBody>
-      </p:sp>
-      <p:sp>
-        <p:nvSpPr>
-          <p:cNvPr id="105" name="PlaceHolder 3"/>
-          <p:cNvSpPr>
-            <a:spLocks noGrp="1"/>
-          </p:cNvSpPr>
-          <p:nvPr>
-            <p:ph type="body"/>
-          </p:nvPr>
-        </p:nvSpPr>
-        <p:spPr>
-          <a:xfrm>
-            <a:off x="4674240" y="1203480"/>
-            <a:ext cx="4015800" cy="1422720"/>
-          </a:xfrm>
-          <a:prstGeom prst="rect">
-            <a:avLst/>
-          </a:prstGeom>
-        </p:spPr>
-        <p:txBody>
-          <a:bodyPr lIns="0" rIns="0" tIns="0" bIns="0">
-            <a:normAutofit/>
-          </a:bodyPr>
-          <a:p>
-            <a:endParaRPr b="0" lang="en-US" sz="3200" spc="-1" strike="noStrike">
-              <a:latin typeface="Arial"/>
-            </a:endParaRPr>
-          </a:p>
-        </p:txBody>
-      </p:sp>
-      <p:sp>
-        <p:nvSpPr>
-          <p:cNvPr id="106" name="PlaceHolder 4"/>
-          <p:cNvSpPr>
-            <a:spLocks noGrp="1"/>
-          </p:cNvSpPr>
-          <p:nvPr>
-            <p:ph type="body"/>
-          </p:nvPr>
-        </p:nvSpPr>
-        <p:spPr>
-          <a:xfrm>
-            <a:off x="4674240" y="2761920"/>
-            <a:ext cx="4015800" cy="1422720"/>
-          </a:xfrm>
-          <a:prstGeom prst="rect">
-            <a:avLst/>
-          </a:prstGeom>
-        </p:spPr>
-        <p:txBody>
-          <a:bodyPr lIns="0" rIns="0" tIns="0" bIns="0">
-            <a:normAutofit/>
-          </a:bodyPr>
-          <a:p>
-            <a:endParaRPr b="0" lang="en-US" sz="3200" spc="-1" strike="noStrike">
-              <a:latin typeface="Arial"/>
-            </a:endParaRPr>
-          </a:p>
-        </p:txBody>
-      </p:sp>
-    </p:spTree>
-  </p:cSld>
-</p:sldLayout>
-</file>
-
-<file path=ppt/slideLayouts/slideLayout33.xml><?xml version="1.0" encoding="utf-8"?>
-<p:sldLayout xmlns:a="http://schemas.openxmlformats.org/drawingml/2006/main" xmlns:p="http://schemas.openxmlformats.org/presentationml/2006/main" xmlns:r="http://schemas.openxmlformats.org/officeDocument/2006/relationships" xmlns:p14="http://schemas.microsoft.com/office/powerpoint/2010/main" xmlns:p15="http://schemas.microsoft.com/office/powerpoint/2012/main" xmlns:mc="http://schemas.openxmlformats.org/markup-compatibility/2006" type="twoObjOverTx" preserve="1">
-  <p:cSld name="Title, 2 Content over Content">
-    <p:spTree>
-      <p:nvGrpSpPr>
-        <p:cNvPr id="1" name=""/>
-        <p:cNvGrpSpPr/>
-        <p:nvPr/>
-      </p:nvGrpSpPr>
-      <p:grpSpPr>
-        <a:xfrm>
-          <a:off x="0" y="0"/>
-          <a:ext cx="0" cy="0"/>
-          <a:chOff x="0" y="0"/>
-          <a:chExt cx="0" cy="0"/>
-        </a:xfrm>
-      </p:grpSpPr>
-      <p:sp>
-        <p:nvSpPr>
-          <p:cNvPr id="107" name="PlaceHolder 1"/>
-          <p:cNvSpPr>
-            <a:spLocks noGrp="1"/>
-          </p:cNvSpPr>
-          <p:nvPr>
-            <p:ph type="title"/>
-          </p:nvPr>
-        </p:nvSpPr>
-        <p:spPr>
-          <a:xfrm>
-            <a:off x="457200" y="205200"/>
-            <a:ext cx="8229240" cy="858600"/>
-          </a:xfrm>
-          <a:prstGeom prst="rect">
-            <a:avLst/>
-          </a:prstGeom>
-        </p:spPr>
-        <p:txBody>
-          <a:bodyPr lIns="0" rIns="0" tIns="0" bIns="0" anchor="ctr"/>
-          <a:p>
-            <a:pPr algn="ctr"/>
-            <a:endParaRPr b="0" lang="en-US" sz="4400" spc="-1" strike="noStrike">
-              <a:latin typeface="Arial"/>
-            </a:endParaRPr>
-          </a:p>
-        </p:txBody>
-      </p:sp>
-      <p:sp>
-        <p:nvSpPr>
-          <p:cNvPr id="108" name="PlaceHolder 2"/>
-          <p:cNvSpPr>
-            <a:spLocks noGrp="1"/>
-          </p:cNvSpPr>
-          <p:nvPr>
-            <p:ph type="body"/>
-          </p:nvPr>
-        </p:nvSpPr>
-        <p:spPr>
-          <a:xfrm>
-            <a:off x="457200" y="1203480"/>
-            <a:ext cx="4015800" cy="1422720"/>
-          </a:xfrm>
-          <a:prstGeom prst="rect">
-            <a:avLst/>
-          </a:prstGeom>
-        </p:spPr>
-        <p:txBody>
-          <a:bodyPr lIns="0" rIns="0" tIns="0" bIns="0">
-            <a:normAutofit/>
-          </a:bodyPr>
-          <a:p>
-            <a:endParaRPr b="0" lang="en-US" sz="3200" spc="-1" strike="noStrike">
-              <a:latin typeface="Arial"/>
-            </a:endParaRPr>
-          </a:p>
-        </p:txBody>
-      </p:sp>
-      <p:sp>
-        <p:nvSpPr>
-          <p:cNvPr id="109" name="PlaceHolder 3"/>
-          <p:cNvSpPr>
-            <a:spLocks noGrp="1"/>
-          </p:cNvSpPr>
-          <p:nvPr>
-            <p:ph type="body"/>
-          </p:nvPr>
-        </p:nvSpPr>
-        <p:spPr>
-          <a:xfrm>
-            <a:off x="4674240" y="1203480"/>
-            <a:ext cx="4015800" cy="1422720"/>
-          </a:xfrm>
-          <a:prstGeom prst="rect">
-            <a:avLst/>
-          </a:prstGeom>
-        </p:spPr>
-        <p:txBody>
-          <a:bodyPr lIns="0" rIns="0" tIns="0" bIns="0">
-            <a:normAutofit/>
-          </a:bodyPr>
-          <a:p>
-            <a:endParaRPr b="0" lang="en-US" sz="3200" spc="-1" strike="noStrike">
-              <a:latin typeface="Arial"/>
-            </a:endParaRPr>
-          </a:p>
-        </p:txBody>
-      </p:sp>
-      <p:sp>
-        <p:nvSpPr>
-          <p:cNvPr id="110" name="PlaceHolder 4"/>
-          <p:cNvSpPr>
-            <a:spLocks noGrp="1"/>
-          </p:cNvSpPr>
-          <p:nvPr>
-            <p:ph type="body"/>
-          </p:nvPr>
-        </p:nvSpPr>
-        <p:spPr>
-          <a:xfrm>
-            <a:off x="457200" y="2761920"/>
-            <a:ext cx="8229240" cy="1422720"/>
-          </a:xfrm>
-          <a:prstGeom prst="rect">
-            <a:avLst/>
-          </a:prstGeom>
-        </p:spPr>
-        <p:txBody>
-          <a:bodyPr lIns="0" rIns="0" tIns="0" bIns="0">
-            <a:normAutofit/>
-          </a:bodyPr>
-          <a:p>
-            <a:endParaRPr b="0" lang="en-US" sz="3200" spc="-1" strike="noStrike">
-              <a:latin typeface="Arial"/>
-            </a:endParaRPr>
-          </a:p>
-        </p:txBody>
-      </p:sp>
-    </p:spTree>
-  </p:cSld>
-</p:sldLayout>
-</file>
-
-<file path=ppt/slideLayouts/slideLayout34.xml><?xml version="1.0" encoding="utf-8"?>
-<p:sldLayout xmlns:a="http://schemas.openxmlformats.org/drawingml/2006/main" xmlns:p="http://schemas.openxmlformats.org/presentationml/2006/main" xmlns:r="http://schemas.openxmlformats.org/officeDocument/2006/relationships" xmlns:p14="http://schemas.microsoft.com/office/powerpoint/2010/main" xmlns:p15="http://schemas.microsoft.com/office/powerpoint/2012/main" xmlns:mc="http://schemas.openxmlformats.org/markup-compatibility/2006" type="objOverTx" preserve="1">
-  <p:cSld name="Title, Content over Content">
-    <p:spTree>
-      <p:nvGrpSpPr>
-        <p:cNvPr id="1" name=""/>
-        <p:cNvGrpSpPr/>
-        <p:nvPr/>
-      </p:nvGrpSpPr>
-      <p:grpSpPr>
-        <a:xfrm>
-          <a:off x="0" y="0"/>
-          <a:ext cx="0" cy="0"/>
-          <a:chOff x="0" y="0"/>
-          <a:chExt cx="0" cy="0"/>
-        </a:xfrm>
-      </p:grpSpPr>
-      <p:sp>
-        <p:nvSpPr>
-          <p:cNvPr id="111" name="PlaceHolder 1"/>
-          <p:cNvSpPr>
-            <a:spLocks noGrp="1"/>
-          </p:cNvSpPr>
-          <p:nvPr>
-            <p:ph type="title"/>
-          </p:nvPr>
-        </p:nvSpPr>
-        <p:spPr>
-          <a:xfrm>
-            <a:off x="457200" y="205200"/>
-            <a:ext cx="8229240" cy="858600"/>
-          </a:xfrm>
-          <a:prstGeom prst="rect">
-            <a:avLst/>
-          </a:prstGeom>
-        </p:spPr>
-        <p:txBody>
-          <a:bodyPr lIns="0" rIns="0" tIns="0" bIns="0" anchor="ctr"/>
-          <a:p>
-            <a:pPr algn="ctr"/>
-            <a:endParaRPr b="0" lang="en-US" sz="4400" spc="-1" strike="noStrike">
-              <a:latin typeface="Arial"/>
-            </a:endParaRPr>
-          </a:p>
-        </p:txBody>
-      </p:sp>
-      <p:sp>
-        <p:nvSpPr>
-          <p:cNvPr id="112" name="PlaceHolder 2"/>
-          <p:cNvSpPr>
-            <a:spLocks noGrp="1"/>
-          </p:cNvSpPr>
-          <p:nvPr>
-            <p:ph type="body"/>
-          </p:nvPr>
-        </p:nvSpPr>
-        <p:spPr>
-          <a:xfrm>
-            <a:off x="457200" y="1203480"/>
-            <a:ext cx="8229240" cy="1422720"/>
-          </a:xfrm>
-          <a:prstGeom prst="rect">
-            <a:avLst/>
-          </a:prstGeom>
-        </p:spPr>
-        <p:txBody>
-          <a:bodyPr lIns="0" rIns="0" tIns="0" bIns="0">
-            <a:normAutofit/>
-          </a:bodyPr>
-          <a:p>
-            <a:endParaRPr b="0" lang="en-US" sz="3200" spc="-1" strike="noStrike">
-              <a:latin typeface="Arial"/>
-            </a:endParaRPr>
-          </a:p>
-        </p:txBody>
-      </p:sp>
-      <p:sp>
-        <p:nvSpPr>
-          <p:cNvPr id="113" name="PlaceHolder 3"/>
-          <p:cNvSpPr>
-            <a:spLocks noGrp="1"/>
-          </p:cNvSpPr>
-          <p:nvPr>
-            <p:ph type="body"/>
-          </p:nvPr>
-        </p:nvSpPr>
-        <p:spPr>
-          <a:xfrm>
-            <a:off x="457200" y="2761920"/>
-            <a:ext cx="8229240" cy="1422720"/>
-          </a:xfrm>
-          <a:prstGeom prst="rect">
-            <a:avLst/>
-          </a:prstGeom>
-        </p:spPr>
-        <p:txBody>
-          <a:bodyPr lIns="0" rIns="0" tIns="0" bIns="0">
-            <a:normAutofit/>
-          </a:bodyPr>
-          <a:p>
-            <a:endParaRPr b="0" lang="en-US" sz="3200" spc="-1" strike="noStrike">
-              <a:latin typeface="Arial"/>
-            </a:endParaRPr>
-          </a:p>
-        </p:txBody>
-      </p:sp>
-    </p:spTree>
-  </p:cSld>
-</p:sldLayout>
-</file>
-
-<file path=ppt/slideLayouts/slideLayout35.xml><?xml version="1.0" encoding="utf-8"?>
-<p:sldLayout xmlns:a="http://schemas.openxmlformats.org/drawingml/2006/main" xmlns:p="http://schemas.openxmlformats.org/presentationml/2006/main" xmlns:r="http://schemas.openxmlformats.org/officeDocument/2006/relationships" xmlns:p14="http://schemas.microsoft.com/office/powerpoint/2010/main" xmlns:p15="http://schemas.microsoft.com/office/powerpoint/2012/main" xmlns:mc="http://schemas.openxmlformats.org/markup-compatibility/2006" type="fourObj" preserve="1">
-  <p:cSld name="Title, 4 Content">
-    <p:spTree>
-      <p:nvGrpSpPr>
-        <p:cNvPr id="1" name=""/>
-        <p:cNvGrpSpPr/>
-        <p:nvPr/>
-      </p:nvGrpSpPr>
-      <p:grpSpPr>
-        <a:xfrm>
-          <a:off x="0" y="0"/>
-          <a:ext cx="0" cy="0"/>
-          <a:chOff x="0" y="0"/>
-          <a:chExt cx="0" cy="0"/>
-        </a:xfrm>
-      </p:grpSpPr>
-      <p:sp>
-        <p:nvSpPr>
-          <p:cNvPr id="114" name="PlaceHolder 1"/>
-          <p:cNvSpPr>
-            <a:spLocks noGrp="1"/>
-          </p:cNvSpPr>
-          <p:nvPr>
-            <p:ph type="title"/>
-          </p:nvPr>
-        </p:nvSpPr>
-        <p:spPr>
-          <a:xfrm>
-            <a:off x="457200" y="205200"/>
-            <a:ext cx="8229240" cy="858600"/>
-          </a:xfrm>
-          <a:prstGeom prst="rect">
-            <a:avLst/>
-          </a:prstGeom>
-        </p:spPr>
-        <p:txBody>
-          <a:bodyPr lIns="0" rIns="0" tIns="0" bIns="0" anchor="ctr"/>
-          <a:p>
-            <a:pPr algn="ctr"/>
-            <a:endParaRPr b="0" lang="en-US" sz="4400" spc="-1" strike="noStrike">
-              <a:latin typeface="Arial"/>
-            </a:endParaRPr>
-          </a:p>
-        </p:txBody>
-      </p:sp>
-      <p:sp>
-        <p:nvSpPr>
-          <p:cNvPr id="115" name="PlaceHolder 2"/>
-          <p:cNvSpPr>
-            <a:spLocks noGrp="1"/>
-          </p:cNvSpPr>
-          <p:nvPr>
-            <p:ph type="body"/>
-          </p:nvPr>
-        </p:nvSpPr>
-        <p:spPr>
-          <a:xfrm>
-            <a:off x="457200" y="1203480"/>
-            <a:ext cx="4015800" cy="1422720"/>
-          </a:xfrm>
-          <a:prstGeom prst="rect">
-            <a:avLst/>
-          </a:prstGeom>
-        </p:spPr>
-        <p:txBody>
-          <a:bodyPr lIns="0" rIns="0" tIns="0" bIns="0">
-            <a:normAutofit/>
-          </a:bodyPr>
-          <a:p>
-            <a:endParaRPr b="0" lang="en-US" sz="3200" spc="-1" strike="noStrike">
-              <a:latin typeface="Arial"/>
-            </a:endParaRPr>
-          </a:p>
-        </p:txBody>
-      </p:sp>
-      <p:sp>
-        <p:nvSpPr>
-          <p:cNvPr id="116" name="PlaceHolder 3"/>
-          <p:cNvSpPr>
-            <a:spLocks noGrp="1"/>
-          </p:cNvSpPr>
-          <p:nvPr>
-            <p:ph type="body"/>
-          </p:nvPr>
-        </p:nvSpPr>
-        <p:spPr>
-          <a:xfrm>
-            <a:off x="4674240" y="1203480"/>
-            <a:ext cx="4015800" cy="1422720"/>
-          </a:xfrm>
-          <a:prstGeom prst="rect">
-            <a:avLst/>
-          </a:prstGeom>
-        </p:spPr>
-        <p:txBody>
-          <a:bodyPr lIns="0" rIns="0" tIns="0" bIns="0">
-            <a:normAutofit/>
-          </a:bodyPr>
-          <a:p>
-            <a:endParaRPr b="0" lang="en-US" sz="3200" spc="-1" strike="noStrike">
-              <a:latin typeface="Arial"/>
-            </a:endParaRPr>
-          </a:p>
-        </p:txBody>
-      </p:sp>
-      <p:sp>
-        <p:nvSpPr>
-          <p:cNvPr id="117" name="PlaceHolder 4"/>
-          <p:cNvSpPr>
-            <a:spLocks noGrp="1"/>
-          </p:cNvSpPr>
-          <p:nvPr>
-            <p:ph type="body"/>
-          </p:nvPr>
-        </p:nvSpPr>
-        <p:spPr>
-          <a:xfrm>
-            <a:off x="457200" y="2761920"/>
-            <a:ext cx="4015800" cy="1422720"/>
-          </a:xfrm>
-          <a:prstGeom prst="rect">
-            <a:avLst/>
-          </a:prstGeom>
-        </p:spPr>
-        <p:txBody>
-          <a:bodyPr lIns="0" rIns="0" tIns="0" bIns="0">
-            <a:normAutofit/>
-          </a:bodyPr>
-          <a:p>
-            <a:endParaRPr b="0" lang="en-US" sz="3200" spc="-1" strike="noStrike">
-              <a:latin typeface="Arial"/>
-            </a:endParaRPr>
-          </a:p>
-        </p:txBody>
-      </p:sp>
-      <p:sp>
-        <p:nvSpPr>
-          <p:cNvPr id="118" name="PlaceHolder 5"/>
-          <p:cNvSpPr>
-            <a:spLocks noGrp="1"/>
-          </p:cNvSpPr>
-          <p:nvPr>
-            <p:ph type="body"/>
-          </p:nvPr>
-        </p:nvSpPr>
-        <p:spPr>
-          <a:xfrm>
-            <a:off x="4674240" y="2761920"/>
-            <a:ext cx="4015800" cy="1422720"/>
-          </a:xfrm>
-          <a:prstGeom prst="rect">
-            <a:avLst/>
-          </a:prstGeom>
-        </p:spPr>
-        <p:txBody>
-          <a:bodyPr lIns="0" rIns="0" tIns="0" bIns="0">
-            <a:normAutofit/>
-          </a:bodyPr>
-          <a:p>
-            <a:endParaRPr b="0" lang="en-US" sz="3200" spc="-1" strike="noStrike">
-              <a:latin typeface="Arial"/>
-            </a:endParaRPr>
-          </a:p>
-        </p:txBody>
-      </p:sp>
-    </p:spTree>
-  </p:cSld>
-</p:sldLayout>
-</file>
-
-<file path=ppt/slideLayouts/slideLayout36.xml><?xml version="1.0" encoding="utf-8"?>
-<p:sldLayout xmlns:a="http://schemas.openxmlformats.org/drawingml/2006/main" xmlns:p="http://schemas.openxmlformats.org/presentationml/2006/main" xmlns:r="http://schemas.openxmlformats.org/officeDocument/2006/relationships" xmlns:p14="http://schemas.microsoft.com/office/powerpoint/2010/main" xmlns:p15="http://schemas.microsoft.com/office/powerpoint/2012/main" xmlns:mc="http://schemas.openxmlformats.org/markup-compatibility/2006" type="blank" preserve="1">
-  <p:cSld name="Title, 6 Content">
-    <p:spTree>
-      <p:nvGrpSpPr>
-        <p:cNvPr id="1" name=""/>
-        <p:cNvGrpSpPr/>
-        <p:nvPr/>
-      </p:nvGrpSpPr>
-      <p:grpSpPr>
-        <a:xfrm>
-          <a:off x="0" y="0"/>
-          <a:ext cx="0" cy="0"/>
-          <a:chOff x="0" y="0"/>
-          <a:chExt cx="0" cy="0"/>
-        </a:xfrm>
-      </p:grpSpPr>
-      <p:sp>
-        <p:nvSpPr>
-          <p:cNvPr id="119" name="PlaceHolder 1"/>
-          <p:cNvSpPr>
-            <a:spLocks noGrp="1"/>
-          </p:cNvSpPr>
-          <p:nvPr>
-            <p:ph type="title"/>
-          </p:nvPr>
-        </p:nvSpPr>
-        <p:spPr>
-          <a:xfrm>
-            <a:off x="457200" y="205200"/>
-            <a:ext cx="8229240" cy="858600"/>
-          </a:xfrm>
-          <a:prstGeom prst="rect">
-            <a:avLst/>
-          </a:prstGeom>
-        </p:spPr>
-        <p:txBody>
-          <a:bodyPr lIns="0" rIns="0" tIns="0" bIns="0" anchor="ctr"/>
-          <a:p>
-            <a:pPr algn="ctr"/>
-            <a:endParaRPr b="0" lang="en-US" sz="4400" spc="-1" strike="noStrike">
-              <a:latin typeface="Arial"/>
-            </a:endParaRPr>
-          </a:p>
-        </p:txBody>
-      </p:sp>
-      <p:sp>
-        <p:nvSpPr>
-          <p:cNvPr id="120" name="PlaceHolder 2"/>
-          <p:cNvSpPr>
-            <a:spLocks noGrp="1"/>
-          </p:cNvSpPr>
-          <p:nvPr>
-            <p:ph type="body"/>
-          </p:nvPr>
-        </p:nvSpPr>
-        <p:spPr>
-          <a:xfrm>
-            <a:off x="457200" y="1203480"/>
-            <a:ext cx="2649600" cy="1422720"/>
-          </a:xfrm>
-          <a:prstGeom prst="rect">
-            <a:avLst/>
-          </a:prstGeom>
-        </p:spPr>
-        <p:txBody>
-          <a:bodyPr lIns="0" rIns="0" tIns="0" bIns="0">
-            <a:normAutofit/>
-          </a:bodyPr>
-          <a:p>
-            <a:endParaRPr b="0" lang="en-US" sz="3200" spc="-1" strike="noStrike">
-              <a:latin typeface="Arial"/>
-            </a:endParaRPr>
-          </a:p>
-        </p:txBody>
-      </p:sp>
-      <p:sp>
-        <p:nvSpPr>
-          <p:cNvPr id="121" name="PlaceHolder 3"/>
-          <p:cNvSpPr>
-            <a:spLocks noGrp="1"/>
-          </p:cNvSpPr>
-          <p:nvPr>
-            <p:ph type="body"/>
-          </p:nvPr>
-        </p:nvSpPr>
-        <p:spPr>
-          <a:xfrm>
-            <a:off x="3239640" y="1203480"/>
-            <a:ext cx="2649600" cy="1422720"/>
-          </a:xfrm>
-          <a:prstGeom prst="rect">
-            <a:avLst/>
-          </a:prstGeom>
-        </p:spPr>
-        <p:txBody>
-          <a:bodyPr lIns="0" rIns="0" tIns="0" bIns="0">
-            <a:normAutofit/>
-          </a:bodyPr>
-          <a:p>
-            <a:endParaRPr b="0" lang="en-US" sz="3200" spc="-1" strike="noStrike">
-              <a:latin typeface="Arial"/>
-            </a:endParaRPr>
-          </a:p>
-        </p:txBody>
-      </p:sp>
-      <p:sp>
-        <p:nvSpPr>
-          <p:cNvPr id="122" name="PlaceHolder 4"/>
-          <p:cNvSpPr>
-            <a:spLocks noGrp="1"/>
-          </p:cNvSpPr>
-          <p:nvPr>
-            <p:ph type="body"/>
-          </p:nvPr>
-        </p:nvSpPr>
-        <p:spPr>
-          <a:xfrm>
-            <a:off x="6022080" y="1203480"/>
-            <a:ext cx="2649600" cy="1422720"/>
-          </a:xfrm>
-          <a:prstGeom prst="rect">
-            <a:avLst/>
-          </a:prstGeom>
-        </p:spPr>
-        <p:txBody>
-          <a:bodyPr lIns="0" rIns="0" tIns="0" bIns="0">
-            <a:normAutofit/>
-          </a:bodyPr>
-          <a:p>
-            <a:endParaRPr b="0" lang="en-US" sz="3200" spc="-1" strike="noStrike">
-              <a:latin typeface="Arial"/>
-            </a:endParaRPr>
-          </a:p>
-        </p:txBody>
-      </p:sp>
-      <p:sp>
-        <p:nvSpPr>
-          <p:cNvPr id="123" name="PlaceHolder 5"/>
-          <p:cNvSpPr>
-            <a:spLocks noGrp="1"/>
-          </p:cNvSpPr>
-          <p:nvPr>
-            <p:ph type="body"/>
-          </p:nvPr>
-        </p:nvSpPr>
-        <p:spPr>
-          <a:xfrm>
-            <a:off x="457200" y="2761920"/>
-            <a:ext cx="2649600" cy="1422720"/>
-          </a:xfrm>
-          <a:prstGeom prst="rect">
-            <a:avLst/>
-          </a:prstGeom>
-        </p:spPr>
-        <p:txBody>
-          <a:bodyPr lIns="0" rIns="0" tIns="0" bIns="0">
-            <a:normAutofit/>
-          </a:bodyPr>
-          <a:p>
-            <a:endParaRPr b="0" lang="en-US" sz="3200" spc="-1" strike="noStrike">
-              <a:latin typeface="Arial"/>
-            </a:endParaRPr>
-          </a:p>
-        </p:txBody>
-      </p:sp>
-      <p:sp>
-        <p:nvSpPr>
-          <p:cNvPr id="124" name="PlaceHolder 6"/>
-          <p:cNvSpPr>
-            <a:spLocks noGrp="1"/>
-          </p:cNvSpPr>
-          <p:nvPr>
-            <p:ph type="body"/>
-          </p:nvPr>
-        </p:nvSpPr>
-        <p:spPr>
-          <a:xfrm>
-            <a:off x="3239640" y="2761920"/>
-            <a:ext cx="2649600" cy="1422720"/>
-          </a:xfrm>
-          <a:prstGeom prst="rect">
-            <a:avLst/>
-          </a:prstGeom>
-        </p:spPr>
-        <p:txBody>
-          <a:bodyPr lIns="0" rIns="0" tIns="0" bIns="0">
-            <a:normAutofit/>
-          </a:bodyPr>
-          <a:p>
-            <a:endParaRPr b="0" lang="en-US" sz="3200" spc="-1" strike="noStrike">
-              <a:latin typeface="Arial"/>
-            </a:endParaRPr>
-          </a:p>
-        </p:txBody>
-      </p:sp>
-      <p:sp>
-        <p:nvSpPr>
-          <p:cNvPr id="125" name="PlaceHolder 7"/>
-          <p:cNvSpPr>
-            <a:spLocks noGrp="1"/>
-          </p:cNvSpPr>
-          <p:nvPr>
-            <p:ph type="body"/>
-          </p:nvPr>
-        </p:nvSpPr>
-        <p:spPr>
-          <a:xfrm>
-            <a:off x="6022080" y="2761920"/>
-            <a:ext cx="2649600" cy="1422720"/>
           </a:xfrm>
           <a:prstGeom prst="rect">
             <a:avLst/>
@@ -4045,9 +2731,9 @@
         <p:grpSpPr>
           <a:xfrm>
             <a:off x="633240" y="-648360"/>
-            <a:ext cx="731880" cy="2365920"/>
+            <a:ext cx="731520" cy="2365560"/>
             <a:chOff x="633240" y="-648360"/>
-            <a:chExt cx="731880" cy="2365920"/>
+            <a:chExt cx="731520" cy="2365560"/>
           </a:xfrm>
         </p:grpSpPr>
         <p:sp>
@@ -4059,7 +2745,7 @@
           <p:spPr>
             <a:xfrm>
               <a:off x="633240" y="-648360"/>
-              <a:ext cx="731880" cy="2365920"/>
+              <a:ext cx="731520" cy="2365560"/>
             </a:xfrm>
             <a:prstGeom prst="rect">
               <a:avLst/>
@@ -4091,7 +2777,7 @@
           <p:spPr>
             <a:xfrm>
               <a:off x="755640" y="978480"/>
-              <a:ext cx="487800" cy="619200"/>
+              <a:ext cx="487440" cy="618840"/>
             </a:xfrm>
             <a:prstGeom prst="rect">
               <a:avLst/>
@@ -4369,7 +3055,7 @@
         <p:spPr>
           <a:xfrm>
             <a:off x="0" y="957960"/>
-            <a:ext cx="81360" cy="385920"/>
+            <a:ext cx="81000" cy="385560"/>
           </a:xfrm>
           <a:prstGeom prst="rect">
             <a:avLst/>
@@ -4397,7 +3083,7 @@
         <p:spPr>
           <a:xfrm>
             <a:off x="3556080" y="3540960"/>
-            <a:ext cx="183240" cy="367920"/>
+            <a:ext cx="182880" cy="367560"/>
           </a:xfrm>
           <a:prstGeom prst="rect">
             <a:avLst/>
@@ -4423,9 +3109,9 @@
         <p:grpSpPr>
           <a:xfrm>
             <a:off x="-30960" y="4661640"/>
-            <a:ext cx="9227160" cy="527400"/>
+            <a:ext cx="9226800" cy="527040"/>
             <a:chOff x="-30960" y="4661640"/>
-            <a:chExt cx="9227160" cy="527400"/>
+            <a:chExt cx="9226800" cy="527040"/>
           </a:xfrm>
         </p:grpSpPr>
         <p:sp>
@@ -4437,7 +3123,7 @@
           <p:spPr>
             <a:xfrm>
               <a:off x="-30960" y="4734720"/>
-              <a:ext cx="9227160" cy="454320"/>
+              <a:ext cx="9226800" cy="453960"/>
             </a:xfrm>
             <a:prstGeom prst="rect">
               <a:avLst/>
@@ -4465,7 +3151,7 @@
           <p:spPr>
             <a:xfrm>
               <a:off x="635400" y="4661640"/>
-              <a:ext cx="385920" cy="527400"/>
+              <a:ext cx="385560" cy="527040"/>
             </a:xfrm>
             <a:prstGeom prst="rect">
               <a:avLst/>
@@ -4497,7 +3183,7 @@
           <p:spPr>
             <a:xfrm>
               <a:off x="699840" y="4726800"/>
-              <a:ext cx="256680" cy="326160"/>
+              <a:ext cx="256320" cy="325800"/>
             </a:xfrm>
             <a:prstGeom prst="rect">
               <a:avLst/>
@@ -4516,7 +3202,7 @@
           <p:spPr>
             <a:xfrm>
               <a:off x="1031040" y="4823640"/>
-              <a:ext cx="3612240" cy="229320"/>
+              <a:ext cx="3611880" cy="228960"/>
             </a:xfrm>
             <a:prstGeom prst="rect">
               <a:avLst/>
@@ -4791,156 +3477,6 @@
 </p:sldMaster>
 </file>
 
-<file path=ppt/slideMasters/slideMaster3.xml><?xml version="1.0" encoding="utf-8"?>
-<p:sldMaster xmlns:a="http://schemas.openxmlformats.org/drawingml/2006/main" xmlns:p="http://schemas.openxmlformats.org/presentationml/2006/main" xmlns:r="http://schemas.openxmlformats.org/officeDocument/2006/relationships" xmlns:p14="http://schemas.microsoft.com/office/powerpoint/2010/main" xmlns:p15="http://schemas.microsoft.com/office/powerpoint/2012/main" xmlns:mc="http://schemas.openxmlformats.org/markup-compatibility/2006">
-  <p:cSld>
-    <p:bg>
-      <p:bgPr>
-        <a:solidFill>
-          <a:srgbClr val="660b13"/>
-        </a:solidFill>
-      </p:bgPr>
-    </p:bg>
-    <p:spTree>
-      <p:nvGrpSpPr>
-        <p:cNvPr id="1" name=""/>
-        <p:cNvGrpSpPr/>
-        <p:nvPr/>
-      </p:nvGrpSpPr>
-      <p:grpSpPr>
-        <a:xfrm>
-          <a:off x="0" y="0"/>
-          <a:ext cx="0" cy="0"/>
-          <a:chOff x="0" y="0"/>
-          <a:chExt cx="0" cy="0"/>
-        </a:xfrm>
-      </p:grpSpPr>
-      <p:sp>
-        <p:nvSpPr>
-          <p:cNvPr id="86" name="CustomShape 1"/>
-          <p:cNvSpPr/>
-          <p:nvPr/>
-        </p:nvSpPr>
-        <p:spPr>
-          <a:xfrm>
-            <a:off x="1378800" y="2390400"/>
-            <a:ext cx="183240" cy="367920"/>
-          </a:xfrm>
-          <a:prstGeom prst="rect">
-            <a:avLst/>
-          </a:prstGeom>
-          <a:noFill/>
-          <a:ln>
-            <a:noFill/>
-          </a:ln>
-        </p:spPr>
-        <p:style>
-          <a:lnRef idx="0"/>
-          <a:fillRef idx="0"/>
-          <a:effectRef idx="0"/>
-          <a:fontRef idx="minor"/>
-        </p:style>
-      </p:sp>
-      <p:sp>
-        <p:nvSpPr>
-          <p:cNvPr id="87" name="CustomShape 2"/>
-          <p:cNvSpPr/>
-          <p:nvPr/>
-        </p:nvSpPr>
-        <p:spPr>
-          <a:xfrm>
-            <a:off x="1378800" y="2390400"/>
-            <a:ext cx="183240" cy="367920"/>
-          </a:xfrm>
-          <a:prstGeom prst="rect">
-            <a:avLst/>
-          </a:prstGeom>
-          <a:noFill/>
-          <a:ln>
-            <a:noFill/>
-          </a:ln>
-        </p:spPr>
-        <p:style>
-          <a:lnRef idx="0"/>
-          <a:fillRef idx="0"/>
-          <a:effectRef idx="0"/>
-          <a:fontRef idx="minor"/>
-        </p:style>
-      </p:sp>
-      <p:sp>
-        <p:nvSpPr>
-          <p:cNvPr id="88" name="CustomShape 3"/>
-          <p:cNvSpPr/>
-          <p:nvPr/>
-        </p:nvSpPr>
-        <p:spPr>
-          <a:xfrm>
-            <a:off x="1378800" y="2390400"/>
-            <a:ext cx="183240" cy="367920"/>
-          </a:xfrm>
-          <a:prstGeom prst="rect">
-            <a:avLst/>
-          </a:prstGeom>
-          <a:noFill/>
-          <a:ln>
-            <a:noFill/>
-          </a:ln>
-        </p:spPr>
-        <p:style>
-          <a:lnRef idx="0"/>
-          <a:fillRef idx="0"/>
-          <a:effectRef idx="0"/>
-          <a:fontRef idx="minor"/>
-        </p:style>
-      </p:sp>
-      <p:sp>
-        <p:nvSpPr>
-          <p:cNvPr id="89" name="CustomShape 4"/>
-          <p:cNvSpPr/>
-          <p:nvPr/>
-        </p:nvSpPr>
-        <p:spPr>
-          <a:xfrm>
-            <a:off x="-15120" y="2031840"/>
-            <a:ext cx="147240" cy="835200"/>
-          </a:xfrm>
-          <a:prstGeom prst="rect">
-            <a:avLst/>
-          </a:prstGeom>
-          <a:solidFill>
-            <a:srgbClr val="990000"/>
-          </a:solidFill>
-          <a:ln>
-            <a:noFill/>
-          </a:ln>
-        </p:spPr>
-        <p:style>
-          <a:lnRef idx="0"/>
-          <a:fillRef idx="0"/>
-          <a:effectRef idx="0"/>
-          <a:fontRef idx="minor"/>
-        </p:style>
-      </p:sp>
-    </p:spTree>
-  </p:cSld>
-  <p:clrMap bg1="lt1" bg2="lt2" tx1="dk1" tx2="dk2" accent1="accent1" accent2="accent2" accent3="accent3" accent4="accent4" accent5="accent5" accent6="accent6" hlink="hlink" folHlink="folHlink"/>
-  <p:sldLayoutIdLst>
-    <p:sldLayoutId id="2147483675" r:id="rId2"/>
-    <p:sldLayoutId id="2147483676" r:id="rId3"/>
-    <p:sldLayoutId id="2147483677" r:id="rId4"/>
-    <p:sldLayoutId id="2147483678" r:id="rId5"/>
-    <p:sldLayoutId id="2147483679" r:id="rId6"/>
-    <p:sldLayoutId id="2147483680" r:id="rId7"/>
-    <p:sldLayoutId id="2147483681" r:id="rId8"/>
-    <p:sldLayoutId id="2147483682" r:id="rId9"/>
-    <p:sldLayoutId id="2147483683" r:id="rId10"/>
-    <p:sldLayoutId id="2147483684" r:id="rId11"/>
-    <p:sldLayoutId id="2147483685" r:id="rId12"/>
-    <p:sldLayoutId id="2147483686" r:id="rId13"/>
-  </p:sldLayoutIdLst>
-</p:sldMaster>
-</file>
-
 <file path=ppt/slides/slide1.xml><?xml version="1.0" encoding="utf-8"?>
 <p:sld xmlns:a="http://schemas.openxmlformats.org/drawingml/2006/main" xmlns:p="http://schemas.openxmlformats.org/presentationml/2006/main" xmlns:r="http://schemas.openxmlformats.org/officeDocument/2006/relationships" xmlns:p14="http://schemas.microsoft.com/office/powerpoint/2010/main" xmlns:p15="http://schemas.microsoft.com/office/powerpoint/2012/main" xmlns:mc="http://schemas.openxmlformats.org/markup-compatibility/2006">
   <p:cSld>
@@ -4960,14 +3496,14 @@
       </p:grpSpPr>
       <p:sp>
         <p:nvSpPr>
-          <p:cNvPr id="126" name="CustomShape 1"/>
+          <p:cNvPr id="86" name="CustomShape 1"/>
           <p:cNvSpPr/>
           <p:nvPr/>
         </p:nvSpPr>
         <p:spPr>
           <a:xfrm>
             <a:off x="502920" y="2766600"/>
-            <a:ext cx="7732800" cy="693000"/>
+            <a:ext cx="7732440" cy="692640"/>
           </a:xfrm>
           <a:prstGeom prst="rect">
             <a:avLst/>
@@ -4986,7 +3522,7 @@
         <p:txBody>
           <a:bodyPr lIns="90000" rIns="90000" tIns="45000" bIns="45000" anchor="ctr"/>
           <a:p>
-            <a:pPr>
+            <a:pPr algn="ctr">
               <a:lnSpc>
                 <a:spcPct val="90000"/>
               </a:lnSpc>
@@ -4999,24 +3535,54 @@
                 <a:latin typeface="Calibri"/>
                 <a:ea typeface="Arial"/>
               </a:rPr>
-              <a:t>dsfas</a:t>
+              <a:t>Data Visualization </a:t>
             </a:r>
             <a:endParaRPr b="0" lang="en-US" sz="3600" spc="-1" strike="noStrike">
               <a:latin typeface="Arial"/>
             </a:endParaRPr>
           </a:p>
-        </p:txBody>
-      </p:sp>
-      <p:sp>
-        <p:nvSpPr>
-          <p:cNvPr id="127" name="CustomShape 2"/>
+          <a:p>
+            <a:pPr algn="ctr">
+              <a:lnSpc>
+                <a:spcPct val="90000"/>
+              </a:lnSpc>
+            </a:pPr>
+            <a:endParaRPr b="0" lang="en-US" sz="3600" spc="-1" strike="noStrike">
+              <a:latin typeface="Arial"/>
+            </a:endParaRPr>
+          </a:p>
+          <a:p>
+            <a:pPr algn="ctr">
+              <a:lnSpc>
+                <a:spcPct val="90000"/>
+              </a:lnSpc>
+            </a:pPr>
+            <a:r>
+              <a:rPr b="1" lang="en-US" sz="3600" spc="-1" strike="noStrike">
+                <a:solidFill>
+                  <a:srgbClr val="ffffff"/>
+                </a:solidFill>
+                <a:latin typeface="Calibri"/>
+                <a:ea typeface="Arial"/>
+              </a:rPr>
+              <a:t>Journalists Killed Since 1992</a:t>
+            </a:r>
+            <a:endParaRPr b="0" lang="en-US" sz="3600" spc="-1" strike="noStrike">
+              <a:latin typeface="Arial"/>
+            </a:endParaRPr>
+          </a:p>
+        </p:txBody>
+      </p:sp>
+      <p:sp>
+        <p:nvSpPr>
+          <p:cNvPr id="87" name="CustomShape 2"/>
           <p:cNvSpPr/>
           <p:nvPr/>
         </p:nvSpPr>
         <p:spPr>
           <a:xfrm>
             <a:off x="530640" y="3461040"/>
-            <a:ext cx="7732800" cy="250920"/>
+            <a:ext cx="7732440" cy="250560"/>
           </a:xfrm>
           <a:prstGeom prst="rect">
             <a:avLst/>
@@ -5032,29 +3598,6 @@
           <a:effectRef idx="0"/>
           <a:fontRef idx="minor"/>
         </p:style>
-        <p:txBody>
-          <a:bodyPr lIns="90000" rIns="90000" tIns="45000" bIns="45000" anchor="ctr"/>
-          <a:p>
-            <a:pPr>
-              <a:lnSpc>
-                <a:spcPct val="100000"/>
-              </a:lnSpc>
-            </a:pPr>
-            <a:r>
-              <a:rPr b="0" lang="en-US" sz="1800" spc="-1" strike="noStrike">
-                <a:solidFill>
-                  <a:srgbClr val="a6a6a6"/>
-                </a:solidFill>
-                <a:latin typeface="Calibri"/>
-                <a:ea typeface="Arial"/>
-              </a:rPr>
-              <a:t>sadfsf</a:t>
-            </a:r>
-            <a:endParaRPr b="0" lang="en-US" sz="1800" spc="-1" strike="noStrike">
-              <a:latin typeface="Arial"/>
-            </a:endParaRPr>
-          </a:p>
-        </p:txBody>
       </p:sp>
     </p:spTree>
   </p:cSld>
@@ -5065,6 +3608,986 @@
           <p:childTnLst>
             <p:seq>
               <p:cTn id="2" dur="indefinite" nodeType="mainSeq"/>
+              <p:prevCondLst>
+                <p:cond delay="0" evt="onPrev">
+                  <p:tgtEl>
+                    <p:sldTgt/>
+                  </p:tgtEl>
+                </p:cond>
+              </p:prevCondLst>
+              <p:nextCondLst>
+                <p:cond delay="0" evt="onNext">
+                  <p:tgtEl>
+                    <p:sldTgt/>
+                  </p:tgtEl>
+                </p:cond>
+              </p:nextCondLst>
+            </p:seq>
+          </p:childTnLst>
+        </p:cTn>
+      </p:par>
+    </p:tnLst>
+  </p:timing>
+</p:sld>
+</file>
+
+<file path=ppt/slides/slide10.xml><?xml version="1.0" encoding="utf-8"?>
+<p:sld xmlns:a="http://schemas.openxmlformats.org/drawingml/2006/main" xmlns:p="http://schemas.openxmlformats.org/presentationml/2006/main" xmlns:r="http://schemas.openxmlformats.org/officeDocument/2006/relationships" xmlns:p14="http://schemas.microsoft.com/office/powerpoint/2010/main" xmlns:p15="http://schemas.microsoft.com/office/powerpoint/2012/main" xmlns:mc="http://schemas.openxmlformats.org/markup-compatibility/2006">
+  <p:cSld>
+    <p:spTree>
+      <p:nvGrpSpPr>
+        <p:cNvPr id="1" name=""/>
+        <p:cNvGrpSpPr/>
+        <p:nvPr/>
+      </p:nvGrpSpPr>
+      <p:grpSpPr>
+        <a:xfrm>
+          <a:off x="0" y="0"/>
+          <a:ext cx="0" cy="0"/>
+          <a:chOff x="0" y="0"/>
+          <a:chExt cx="0" cy="0"/>
+        </a:xfrm>
+      </p:grpSpPr>
+      <p:sp>
+        <p:nvSpPr>
+          <p:cNvPr id="97" name="CustomShape 1"/>
+          <p:cNvSpPr/>
+          <p:nvPr/>
+        </p:nvSpPr>
+        <p:spPr>
+          <a:xfrm>
+            <a:off x="529920" y="759240"/>
+            <a:ext cx="8002440" cy="697320"/>
+          </a:xfrm>
+          <a:prstGeom prst="rect">
+            <a:avLst/>
+          </a:prstGeom>
+          <a:noFill/>
+          <a:ln>
+            <a:noFill/>
+          </a:ln>
+        </p:spPr>
+        <p:style>
+          <a:lnRef idx="0"/>
+          <a:fillRef idx="0"/>
+          <a:effectRef idx="0"/>
+          <a:fontRef idx="minor"/>
+        </p:style>
+        <p:txBody>
+          <a:bodyPr lIns="90000" rIns="90000" tIns="45000" bIns="45000" anchor="ctr"/>
+          <a:p>
+            <a:pPr>
+              <a:lnSpc>
+                <a:spcPct val="100000"/>
+              </a:lnSpc>
+            </a:pPr>
+            <a:r>
+              <a:rPr b="1" lang="en-US" sz="3000" spc="-1" strike="noStrike">
+                <a:solidFill>
+                  <a:srgbClr val="404041"/>
+                </a:solidFill>
+                <a:latin typeface="Arial"/>
+                <a:ea typeface="Arial"/>
+              </a:rPr>
+              <a:t>Exploratory Analysis: Tortured?</a:t>
+            </a:r>
+            <a:endParaRPr b="0" lang="en-US" sz="3000" spc="-1" strike="noStrike">
+              <a:latin typeface="Arial"/>
+            </a:endParaRPr>
+          </a:p>
+        </p:txBody>
+      </p:sp>
+    </p:spTree>
+  </p:cSld>
+  <p:timing>
+    <p:tnLst>
+      <p:par>
+        <p:cTn id="19" dur="indefinite" restart="never" nodeType="tmRoot">
+          <p:childTnLst>
+            <p:seq>
+              <p:cTn id="20" dur="indefinite" nodeType="mainSeq"/>
+              <p:prevCondLst>
+                <p:cond delay="0" evt="onPrev">
+                  <p:tgtEl>
+                    <p:sldTgt/>
+                  </p:tgtEl>
+                </p:cond>
+              </p:prevCondLst>
+              <p:nextCondLst>
+                <p:cond delay="0" evt="onNext">
+                  <p:tgtEl>
+                    <p:sldTgt/>
+                  </p:tgtEl>
+                </p:cond>
+              </p:nextCondLst>
+            </p:seq>
+          </p:childTnLst>
+        </p:cTn>
+      </p:par>
+    </p:tnLst>
+  </p:timing>
+</p:sld>
+</file>
+
+<file path=ppt/slides/slide11.xml><?xml version="1.0" encoding="utf-8"?>
+<p:sld xmlns:a="http://schemas.openxmlformats.org/drawingml/2006/main" xmlns:p="http://schemas.openxmlformats.org/presentationml/2006/main" xmlns:r="http://schemas.openxmlformats.org/officeDocument/2006/relationships" xmlns:p14="http://schemas.microsoft.com/office/powerpoint/2010/main" xmlns:p15="http://schemas.microsoft.com/office/powerpoint/2012/main" xmlns:mc="http://schemas.openxmlformats.org/markup-compatibility/2006">
+  <p:cSld>
+    <p:spTree>
+      <p:nvGrpSpPr>
+        <p:cNvPr id="1" name=""/>
+        <p:cNvGrpSpPr/>
+        <p:nvPr/>
+      </p:nvGrpSpPr>
+      <p:grpSpPr>
+        <a:xfrm>
+          <a:off x="0" y="0"/>
+          <a:ext cx="0" cy="0"/>
+          <a:chOff x="0" y="0"/>
+          <a:chExt cx="0" cy="0"/>
+        </a:xfrm>
+      </p:grpSpPr>
+      <p:sp>
+        <p:nvSpPr>
+          <p:cNvPr id="98" name="CustomShape 1"/>
+          <p:cNvSpPr/>
+          <p:nvPr/>
+        </p:nvSpPr>
+        <p:spPr>
+          <a:xfrm>
+            <a:off x="529920" y="759240"/>
+            <a:ext cx="8002440" cy="697320"/>
+          </a:xfrm>
+          <a:prstGeom prst="rect">
+            <a:avLst/>
+          </a:prstGeom>
+          <a:noFill/>
+          <a:ln>
+            <a:noFill/>
+          </a:ln>
+        </p:spPr>
+        <p:style>
+          <a:lnRef idx="0"/>
+          <a:fillRef idx="0"/>
+          <a:effectRef idx="0"/>
+          <a:fontRef idx="minor"/>
+        </p:style>
+        <p:txBody>
+          <a:bodyPr lIns="90000" rIns="90000" tIns="45000" bIns="45000" anchor="ctr"/>
+          <a:p>
+            <a:pPr>
+              <a:lnSpc>
+                <a:spcPct val="100000"/>
+              </a:lnSpc>
+            </a:pPr>
+            <a:r>
+              <a:rPr b="1" lang="en-US" sz="3000" spc="-1" strike="noStrike">
+                <a:solidFill>
+                  <a:srgbClr val="404041"/>
+                </a:solidFill>
+                <a:latin typeface="Arial"/>
+                <a:ea typeface="Arial"/>
+              </a:rPr>
+              <a:t>Exploratory Analysis: Medium</a:t>
+            </a:r>
+            <a:endParaRPr b="0" lang="en-US" sz="3000" spc="-1" strike="noStrike">
+              <a:latin typeface="Arial"/>
+            </a:endParaRPr>
+          </a:p>
+        </p:txBody>
+      </p:sp>
+    </p:spTree>
+  </p:cSld>
+  <p:timing>
+    <p:tnLst>
+      <p:par>
+        <p:cTn id="21" dur="indefinite" restart="never" nodeType="tmRoot">
+          <p:childTnLst>
+            <p:seq>
+              <p:cTn id="22" dur="indefinite" nodeType="mainSeq"/>
+              <p:prevCondLst>
+                <p:cond delay="0" evt="onPrev">
+                  <p:tgtEl>
+                    <p:sldTgt/>
+                  </p:tgtEl>
+                </p:cond>
+              </p:prevCondLst>
+              <p:nextCondLst>
+                <p:cond delay="0" evt="onNext">
+                  <p:tgtEl>
+                    <p:sldTgt/>
+                  </p:tgtEl>
+                </p:cond>
+              </p:nextCondLst>
+            </p:seq>
+          </p:childTnLst>
+        </p:cTn>
+      </p:par>
+    </p:tnLst>
+  </p:timing>
+</p:sld>
+</file>
+
+<file path=ppt/slides/slide12.xml><?xml version="1.0" encoding="utf-8"?>
+<p:sld xmlns:a="http://schemas.openxmlformats.org/drawingml/2006/main" xmlns:p="http://schemas.openxmlformats.org/presentationml/2006/main" xmlns:r="http://schemas.openxmlformats.org/officeDocument/2006/relationships" xmlns:p14="http://schemas.microsoft.com/office/powerpoint/2010/main" xmlns:p15="http://schemas.microsoft.com/office/powerpoint/2012/main" xmlns:mc="http://schemas.openxmlformats.org/markup-compatibility/2006">
+  <p:cSld>
+    <p:spTree>
+      <p:nvGrpSpPr>
+        <p:cNvPr id="1" name=""/>
+        <p:cNvGrpSpPr/>
+        <p:nvPr/>
+      </p:nvGrpSpPr>
+      <p:grpSpPr>
+        <a:xfrm>
+          <a:off x="0" y="0"/>
+          <a:ext cx="0" cy="0"/>
+          <a:chOff x="0" y="0"/>
+          <a:chExt cx="0" cy="0"/>
+        </a:xfrm>
+      </p:grpSpPr>
+      <p:sp>
+        <p:nvSpPr>
+          <p:cNvPr id="99" name="CustomShape 1"/>
+          <p:cNvSpPr/>
+          <p:nvPr/>
+        </p:nvSpPr>
+        <p:spPr>
+          <a:xfrm>
+            <a:off x="529920" y="759240"/>
+            <a:ext cx="8002440" cy="697320"/>
+          </a:xfrm>
+          <a:prstGeom prst="rect">
+            <a:avLst/>
+          </a:prstGeom>
+          <a:noFill/>
+          <a:ln>
+            <a:noFill/>
+          </a:ln>
+        </p:spPr>
+        <p:style>
+          <a:lnRef idx="0"/>
+          <a:fillRef idx="0"/>
+          <a:effectRef idx="0"/>
+          <a:fontRef idx="minor"/>
+        </p:style>
+        <p:txBody>
+          <a:bodyPr lIns="90000" rIns="90000" tIns="45000" bIns="45000" anchor="ctr"/>
+          <a:p>
+            <a:pPr>
+              <a:lnSpc>
+                <a:spcPct val="100000"/>
+              </a:lnSpc>
+            </a:pPr>
+            <a:r>
+              <a:rPr b="1" lang="en-US" sz="3000" spc="-1" strike="noStrike">
+                <a:solidFill>
+                  <a:srgbClr val="404041"/>
+                </a:solidFill>
+                <a:latin typeface="Arial"/>
+                <a:ea typeface="Arial"/>
+              </a:rPr>
+              <a:t>Exploratory Analysis: Source of Fire</a:t>
+            </a:r>
+            <a:endParaRPr b="0" lang="en-US" sz="3000" spc="-1" strike="noStrike">
+              <a:latin typeface="Arial"/>
+            </a:endParaRPr>
+          </a:p>
+        </p:txBody>
+      </p:sp>
+    </p:spTree>
+  </p:cSld>
+  <p:timing>
+    <p:tnLst>
+      <p:par>
+        <p:cTn id="23" dur="indefinite" restart="never" nodeType="tmRoot">
+          <p:childTnLst>
+            <p:seq>
+              <p:cTn id="24" dur="indefinite" nodeType="mainSeq"/>
+              <p:prevCondLst>
+                <p:cond delay="0" evt="onPrev">
+                  <p:tgtEl>
+                    <p:sldTgt/>
+                  </p:tgtEl>
+                </p:cond>
+              </p:prevCondLst>
+              <p:nextCondLst>
+                <p:cond delay="0" evt="onNext">
+                  <p:tgtEl>
+                    <p:sldTgt/>
+                  </p:tgtEl>
+                </p:cond>
+              </p:nextCondLst>
+            </p:seq>
+          </p:childTnLst>
+        </p:cTn>
+      </p:par>
+    </p:tnLst>
+  </p:timing>
+</p:sld>
+</file>
+
+<file path=ppt/slides/slide13.xml><?xml version="1.0" encoding="utf-8"?>
+<p:sld xmlns:a="http://schemas.openxmlformats.org/drawingml/2006/main" xmlns:p="http://schemas.openxmlformats.org/presentationml/2006/main" xmlns:r="http://schemas.openxmlformats.org/officeDocument/2006/relationships" xmlns:p14="http://schemas.microsoft.com/office/powerpoint/2010/main" xmlns:p15="http://schemas.microsoft.com/office/powerpoint/2012/main" xmlns:mc="http://schemas.openxmlformats.org/markup-compatibility/2006">
+  <p:cSld>
+    <p:spTree>
+      <p:nvGrpSpPr>
+        <p:cNvPr id="1" name=""/>
+        <p:cNvGrpSpPr/>
+        <p:nvPr/>
+      </p:nvGrpSpPr>
+      <p:grpSpPr>
+        <a:xfrm>
+          <a:off x="0" y="0"/>
+          <a:ext cx="0" cy="0"/>
+          <a:chOff x="0" y="0"/>
+          <a:chExt cx="0" cy="0"/>
+        </a:xfrm>
+      </p:grpSpPr>
+      <p:sp>
+        <p:nvSpPr>
+          <p:cNvPr id="100" name="CustomShape 1"/>
+          <p:cNvSpPr/>
+          <p:nvPr/>
+        </p:nvSpPr>
+        <p:spPr>
+          <a:xfrm>
+            <a:off x="529920" y="759240"/>
+            <a:ext cx="8002440" cy="697320"/>
+          </a:xfrm>
+          <a:prstGeom prst="rect">
+            <a:avLst/>
+          </a:prstGeom>
+          <a:noFill/>
+          <a:ln>
+            <a:noFill/>
+          </a:ln>
+        </p:spPr>
+        <p:style>
+          <a:lnRef idx="0"/>
+          <a:fillRef idx="0"/>
+          <a:effectRef idx="0"/>
+          <a:fontRef idx="minor"/>
+        </p:style>
+        <p:txBody>
+          <a:bodyPr lIns="90000" rIns="90000" tIns="45000" bIns="45000" anchor="ctr"/>
+          <a:p>
+            <a:pPr>
+              <a:lnSpc>
+                <a:spcPct val="100000"/>
+              </a:lnSpc>
+            </a:pPr>
+            <a:r>
+              <a:rPr b="1" lang="en-US" sz="3000" spc="-1" strike="noStrike">
+                <a:solidFill>
+                  <a:srgbClr val="404041"/>
+                </a:solidFill>
+                <a:latin typeface="Arial"/>
+                <a:ea typeface="Arial"/>
+              </a:rPr>
+              <a:t>Exploratory Analysis: Coverage</a:t>
+            </a:r>
+            <a:endParaRPr b="0" lang="en-US" sz="3000" spc="-1" strike="noStrike">
+              <a:latin typeface="Arial"/>
+            </a:endParaRPr>
+          </a:p>
+        </p:txBody>
+      </p:sp>
+    </p:spTree>
+  </p:cSld>
+  <p:timing>
+    <p:tnLst>
+      <p:par>
+        <p:cTn id="25" dur="indefinite" restart="never" nodeType="tmRoot">
+          <p:childTnLst>
+            <p:seq>
+              <p:cTn id="26" dur="indefinite" nodeType="mainSeq"/>
+              <p:prevCondLst>
+                <p:cond delay="0" evt="onPrev">
+                  <p:tgtEl>
+                    <p:sldTgt/>
+                  </p:tgtEl>
+                </p:cond>
+              </p:prevCondLst>
+              <p:nextCondLst>
+                <p:cond delay="0" evt="onNext">
+                  <p:tgtEl>
+                    <p:sldTgt/>
+                  </p:tgtEl>
+                </p:cond>
+              </p:nextCondLst>
+            </p:seq>
+          </p:childTnLst>
+        </p:cTn>
+      </p:par>
+    </p:tnLst>
+  </p:timing>
+</p:sld>
+</file>
+
+<file path=ppt/slides/slide14.xml><?xml version="1.0" encoding="utf-8"?>
+<p:sld xmlns:a="http://schemas.openxmlformats.org/drawingml/2006/main" xmlns:p="http://schemas.openxmlformats.org/presentationml/2006/main" xmlns:r="http://schemas.openxmlformats.org/officeDocument/2006/relationships" xmlns:p14="http://schemas.microsoft.com/office/powerpoint/2010/main" xmlns:p15="http://schemas.microsoft.com/office/powerpoint/2012/main" xmlns:mc="http://schemas.openxmlformats.org/markup-compatibility/2006">
+  <p:cSld>
+    <p:spTree>
+      <p:nvGrpSpPr>
+        <p:cNvPr id="1" name=""/>
+        <p:cNvGrpSpPr/>
+        <p:nvPr/>
+      </p:nvGrpSpPr>
+      <p:grpSpPr>
+        <a:xfrm>
+          <a:off x="0" y="0"/>
+          <a:ext cx="0" cy="0"/>
+          <a:chOff x="0" y="0"/>
+          <a:chExt cx="0" cy="0"/>
+        </a:xfrm>
+      </p:grpSpPr>
+      <p:sp>
+        <p:nvSpPr>
+          <p:cNvPr id="101" name="CustomShape 1"/>
+          <p:cNvSpPr/>
+          <p:nvPr/>
+        </p:nvSpPr>
+        <p:spPr>
+          <a:xfrm>
+            <a:off x="529920" y="759240"/>
+            <a:ext cx="8002440" cy="697320"/>
+          </a:xfrm>
+          <a:prstGeom prst="rect">
+            <a:avLst/>
+          </a:prstGeom>
+          <a:noFill/>
+          <a:ln>
+            <a:noFill/>
+          </a:ln>
+        </p:spPr>
+        <p:style>
+          <a:lnRef idx="0"/>
+          <a:fillRef idx="0"/>
+          <a:effectRef idx="0"/>
+          <a:fontRef idx="minor"/>
+        </p:style>
+        <p:txBody>
+          <a:bodyPr lIns="90000" rIns="90000" tIns="45000" bIns="45000" anchor="ctr"/>
+          <a:p>
+            <a:pPr>
+              <a:lnSpc>
+                <a:spcPct val="100000"/>
+              </a:lnSpc>
+            </a:pPr>
+            <a:r>
+              <a:rPr b="1" lang="en-US" sz="3000" spc="-1" strike="noStrike">
+                <a:solidFill>
+                  <a:srgbClr val="404041"/>
+                </a:solidFill>
+                <a:latin typeface="Arial"/>
+                <a:ea typeface="Arial"/>
+              </a:rPr>
+              <a:t>Data Map: Country Codes</a:t>
+            </a:r>
+            <a:endParaRPr b="0" lang="en-US" sz="3000" spc="-1" strike="noStrike">
+              <a:latin typeface="Arial"/>
+            </a:endParaRPr>
+          </a:p>
+        </p:txBody>
+      </p:sp>
+    </p:spTree>
+  </p:cSld>
+  <p:timing>
+    <p:tnLst>
+      <p:par>
+        <p:cTn id="27" dur="indefinite" restart="never" nodeType="tmRoot">
+          <p:childTnLst>
+            <p:seq>
+              <p:cTn id="28" dur="indefinite" nodeType="mainSeq"/>
+              <p:prevCondLst>
+                <p:cond delay="0" evt="onPrev">
+                  <p:tgtEl>
+                    <p:sldTgt/>
+                  </p:tgtEl>
+                </p:cond>
+              </p:prevCondLst>
+              <p:nextCondLst>
+                <p:cond delay="0" evt="onNext">
+                  <p:tgtEl>
+                    <p:sldTgt/>
+                  </p:tgtEl>
+                </p:cond>
+              </p:nextCondLst>
+            </p:seq>
+          </p:childTnLst>
+        </p:cTn>
+      </p:par>
+    </p:tnLst>
+  </p:timing>
+</p:sld>
+</file>
+
+<file path=ppt/slides/slide15.xml><?xml version="1.0" encoding="utf-8"?>
+<p:sld xmlns:a="http://schemas.openxmlformats.org/drawingml/2006/main" xmlns:p="http://schemas.openxmlformats.org/presentationml/2006/main" xmlns:r="http://schemas.openxmlformats.org/officeDocument/2006/relationships" xmlns:p14="http://schemas.microsoft.com/office/powerpoint/2010/main" xmlns:p15="http://schemas.microsoft.com/office/powerpoint/2012/main" xmlns:mc="http://schemas.openxmlformats.org/markup-compatibility/2006">
+  <p:cSld>
+    <p:spTree>
+      <p:nvGrpSpPr>
+        <p:cNvPr id="1" name=""/>
+        <p:cNvGrpSpPr/>
+        <p:nvPr/>
+      </p:nvGrpSpPr>
+      <p:grpSpPr>
+        <a:xfrm>
+          <a:off x="0" y="0"/>
+          <a:ext cx="0" cy="0"/>
+          <a:chOff x="0" y="0"/>
+          <a:chExt cx="0" cy="0"/>
+        </a:xfrm>
+      </p:grpSpPr>
+      <p:sp>
+        <p:nvSpPr>
+          <p:cNvPr id="102" name="CustomShape 1"/>
+          <p:cNvSpPr/>
+          <p:nvPr/>
+        </p:nvSpPr>
+        <p:spPr>
+          <a:xfrm>
+            <a:off x="529920" y="759240"/>
+            <a:ext cx="8002440" cy="697320"/>
+          </a:xfrm>
+          <a:prstGeom prst="rect">
+            <a:avLst/>
+          </a:prstGeom>
+          <a:noFill/>
+          <a:ln>
+            <a:noFill/>
+          </a:ln>
+        </p:spPr>
+        <p:style>
+          <a:lnRef idx="0"/>
+          <a:fillRef idx="0"/>
+          <a:effectRef idx="0"/>
+          <a:fontRef idx="minor"/>
+        </p:style>
+        <p:txBody>
+          <a:bodyPr lIns="90000" rIns="90000" tIns="45000" bIns="45000" anchor="ctr"/>
+          <a:p>
+            <a:pPr>
+              <a:lnSpc>
+                <a:spcPct val="100000"/>
+              </a:lnSpc>
+            </a:pPr>
+            <a:r>
+              <a:rPr b="1" lang="en-US" sz="3000" spc="-1" strike="noStrike">
+                <a:solidFill>
+                  <a:srgbClr val="404041"/>
+                </a:solidFill>
+                <a:latin typeface="Arial"/>
+                <a:ea typeface="Arial"/>
+              </a:rPr>
+              <a:t>Data Map: 1992 - 2016</a:t>
+            </a:r>
+            <a:endParaRPr b="0" lang="en-US" sz="3000" spc="-1" strike="noStrike">
+              <a:latin typeface="Arial"/>
+            </a:endParaRPr>
+          </a:p>
+        </p:txBody>
+      </p:sp>
+    </p:spTree>
+  </p:cSld>
+  <p:timing>
+    <p:tnLst>
+      <p:par>
+        <p:cTn id="29" dur="indefinite" restart="never" nodeType="tmRoot">
+          <p:childTnLst>
+            <p:seq>
+              <p:cTn id="30" dur="indefinite" nodeType="mainSeq"/>
+              <p:prevCondLst>
+                <p:cond delay="0" evt="onPrev">
+                  <p:tgtEl>
+                    <p:sldTgt/>
+                  </p:tgtEl>
+                </p:cond>
+              </p:prevCondLst>
+              <p:nextCondLst>
+                <p:cond delay="0" evt="onNext">
+                  <p:tgtEl>
+                    <p:sldTgt/>
+                  </p:tgtEl>
+                </p:cond>
+              </p:nextCondLst>
+            </p:seq>
+          </p:childTnLst>
+        </p:cTn>
+      </p:par>
+    </p:tnLst>
+  </p:timing>
+</p:sld>
+</file>
+
+<file path=ppt/slides/slide16.xml><?xml version="1.0" encoding="utf-8"?>
+<p:sld xmlns:a="http://schemas.openxmlformats.org/drawingml/2006/main" xmlns:p="http://schemas.openxmlformats.org/presentationml/2006/main" xmlns:r="http://schemas.openxmlformats.org/officeDocument/2006/relationships" xmlns:p14="http://schemas.microsoft.com/office/powerpoint/2010/main" xmlns:p15="http://schemas.microsoft.com/office/powerpoint/2012/main" xmlns:mc="http://schemas.openxmlformats.org/markup-compatibility/2006">
+  <p:cSld>
+    <p:spTree>
+      <p:nvGrpSpPr>
+        <p:cNvPr id="1" name=""/>
+        <p:cNvGrpSpPr/>
+        <p:nvPr/>
+      </p:nvGrpSpPr>
+      <p:grpSpPr>
+        <a:xfrm>
+          <a:off x="0" y="0"/>
+          <a:ext cx="0" cy="0"/>
+          <a:chOff x="0" y="0"/>
+          <a:chExt cx="0" cy="0"/>
+        </a:xfrm>
+      </p:grpSpPr>
+      <p:sp>
+        <p:nvSpPr>
+          <p:cNvPr id="103" name="CustomShape 1"/>
+          <p:cNvSpPr/>
+          <p:nvPr/>
+        </p:nvSpPr>
+        <p:spPr>
+          <a:xfrm>
+            <a:off x="529920" y="759240"/>
+            <a:ext cx="8002440" cy="697320"/>
+          </a:xfrm>
+          <a:prstGeom prst="rect">
+            <a:avLst/>
+          </a:prstGeom>
+          <a:noFill/>
+          <a:ln>
+            <a:noFill/>
+          </a:ln>
+        </p:spPr>
+        <p:style>
+          <a:lnRef idx="0"/>
+          <a:fillRef idx="0"/>
+          <a:effectRef idx="0"/>
+          <a:fontRef idx="minor"/>
+        </p:style>
+        <p:txBody>
+          <a:bodyPr lIns="90000" rIns="90000" tIns="45000" bIns="45000" anchor="ctr"/>
+          <a:p>
+            <a:pPr>
+              <a:lnSpc>
+                <a:spcPct val="100000"/>
+              </a:lnSpc>
+            </a:pPr>
+            <a:r>
+              <a:rPr b="1" lang="en-US" sz="3000" spc="-1" strike="noStrike">
+                <a:solidFill>
+                  <a:srgbClr val="404041"/>
+                </a:solidFill>
+                <a:latin typeface="Arial"/>
+                <a:ea typeface="Arial"/>
+              </a:rPr>
+              <a:t>Data Map: # some interesting years</a:t>
+            </a:r>
+            <a:endParaRPr b="0" lang="en-US" sz="3000" spc="-1" strike="noStrike">
+              <a:latin typeface="Arial"/>
+            </a:endParaRPr>
+          </a:p>
+        </p:txBody>
+      </p:sp>
+    </p:spTree>
+  </p:cSld>
+  <p:timing>
+    <p:tnLst>
+      <p:par>
+        <p:cTn id="31" dur="indefinite" restart="never" nodeType="tmRoot">
+          <p:childTnLst>
+            <p:seq>
+              <p:cTn id="32" dur="indefinite" nodeType="mainSeq"/>
+              <p:prevCondLst>
+                <p:cond delay="0" evt="onPrev">
+                  <p:tgtEl>
+                    <p:sldTgt/>
+                  </p:tgtEl>
+                </p:cond>
+              </p:prevCondLst>
+              <p:nextCondLst>
+                <p:cond delay="0" evt="onNext">
+                  <p:tgtEl>
+                    <p:sldTgt/>
+                  </p:tgtEl>
+                </p:cond>
+              </p:nextCondLst>
+            </p:seq>
+          </p:childTnLst>
+        </p:cTn>
+      </p:par>
+    </p:tnLst>
+  </p:timing>
+</p:sld>
+</file>
+
+<file path=ppt/slides/slide17.xml><?xml version="1.0" encoding="utf-8"?>
+<p:sld xmlns:a="http://schemas.openxmlformats.org/drawingml/2006/main" xmlns:p="http://schemas.openxmlformats.org/presentationml/2006/main" xmlns:r="http://schemas.openxmlformats.org/officeDocument/2006/relationships" xmlns:p14="http://schemas.microsoft.com/office/powerpoint/2010/main" xmlns:p15="http://schemas.microsoft.com/office/powerpoint/2012/main" xmlns:mc="http://schemas.openxmlformats.org/markup-compatibility/2006">
+  <p:cSld>
+    <p:spTree>
+      <p:nvGrpSpPr>
+        <p:cNvPr id="1" name=""/>
+        <p:cNvGrpSpPr/>
+        <p:nvPr/>
+      </p:nvGrpSpPr>
+      <p:grpSpPr>
+        <a:xfrm>
+          <a:off x="0" y="0"/>
+          <a:ext cx="0" cy="0"/>
+          <a:chOff x="0" y="0"/>
+          <a:chExt cx="0" cy="0"/>
+        </a:xfrm>
+      </p:grpSpPr>
+      <p:sp>
+        <p:nvSpPr>
+          <p:cNvPr id="104" name="CustomShape 1"/>
+          <p:cNvSpPr/>
+          <p:nvPr/>
+        </p:nvSpPr>
+        <p:spPr>
+          <a:xfrm>
+            <a:off x="529920" y="759240"/>
+            <a:ext cx="8002440" cy="697320"/>
+          </a:xfrm>
+          <a:prstGeom prst="rect">
+            <a:avLst/>
+          </a:prstGeom>
+          <a:noFill/>
+          <a:ln>
+            <a:noFill/>
+          </a:ln>
+        </p:spPr>
+        <p:style>
+          <a:lnRef idx="0"/>
+          <a:fillRef idx="0"/>
+          <a:effectRef idx="0"/>
+          <a:fontRef idx="minor"/>
+        </p:style>
+        <p:txBody>
+          <a:bodyPr lIns="90000" rIns="90000" tIns="45000" bIns="45000" anchor="ctr"/>
+          <a:p>
+            <a:pPr>
+              <a:lnSpc>
+                <a:spcPct val="100000"/>
+              </a:lnSpc>
+            </a:pPr>
+            <a:r>
+              <a:rPr b="1" lang="en-US" sz="3000" spc="-1" strike="noStrike">
+                <a:solidFill>
+                  <a:srgbClr val="404041"/>
+                </a:solidFill>
+                <a:latin typeface="Arial"/>
+                <a:ea typeface="Arial"/>
+              </a:rPr>
+              <a:t>Network Graph: 1992-2016</a:t>
+            </a:r>
+            <a:endParaRPr b="0" lang="en-US" sz="3000" spc="-1" strike="noStrike">
+              <a:latin typeface="Arial"/>
+            </a:endParaRPr>
+          </a:p>
+        </p:txBody>
+      </p:sp>
+    </p:spTree>
+  </p:cSld>
+  <p:timing>
+    <p:tnLst>
+      <p:par>
+        <p:cTn id="33" dur="indefinite" restart="never" nodeType="tmRoot">
+          <p:childTnLst>
+            <p:seq>
+              <p:cTn id="34" dur="indefinite" nodeType="mainSeq"/>
+              <p:prevCondLst>
+                <p:cond delay="0" evt="onPrev">
+                  <p:tgtEl>
+                    <p:sldTgt/>
+                  </p:tgtEl>
+                </p:cond>
+              </p:prevCondLst>
+              <p:nextCondLst>
+                <p:cond delay="0" evt="onNext">
+                  <p:tgtEl>
+                    <p:sldTgt/>
+                  </p:tgtEl>
+                </p:cond>
+              </p:nextCondLst>
+            </p:seq>
+          </p:childTnLst>
+        </p:cTn>
+      </p:par>
+    </p:tnLst>
+  </p:timing>
+</p:sld>
+</file>
+
+<file path=ppt/slides/slide18.xml><?xml version="1.0" encoding="utf-8"?>
+<p:sld xmlns:a="http://schemas.openxmlformats.org/drawingml/2006/main" xmlns:p="http://schemas.openxmlformats.org/presentationml/2006/main" xmlns:r="http://schemas.openxmlformats.org/officeDocument/2006/relationships" xmlns:p14="http://schemas.microsoft.com/office/powerpoint/2010/main" xmlns:p15="http://schemas.microsoft.com/office/powerpoint/2012/main" xmlns:mc="http://schemas.openxmlformats.org/markup-compatibility/2006">
+  <p:cSld>
+    <p:spTree>
+      <p:nvGrpSpPr>
+        <p:cNvPr id="1" name=""/>
+        <p:cNvGrpSpPr/>
+        <p:nvPr/>
+      </p:nvGrpSpPr>
+      <p:grpSpPr>
+        <a:xfrm>
+          <a:off x="0" y="0"/>
+          <a:ext cx="0" cy="0"/>
+          <a:chOff x="0" y="0"/>
+          <a:chExt cx="0" cy="0"/>
+        </a:xfrm>
+      </p:grpSpPr>
+      <p:sp>
+        <p:nvSpPr>
+          <p:cNvPr id="105" name="CustomShape 1"/>
+          <p:cNvSpPr/>
+          <p:nvPr/>
+        </p:nvSpPr>
+        <p:spPr>
+          <a:xfrm>
+            <a:off x="529920" y="759240"/>
+            <a:ext cx="8002440" cy="697320"/>
+          </a:xfrm>
+          <a:prstGeom prst="rect">
+            <a:avLst/>
+          </a:prstGeom>
+          <a:noFill/>
+          <a:ln>
+            <a:noFill/>
+          </a:ln>
+        </p:spPr>
+        <p:style>
+          <a:lnRef idx="0"/>
+          <a:fillRef idx="0"/>
+          <a:effectRef idx="0"/>
+          <a:fontRef idx="minor"/>
+        </p:style>
+        <p:txBody>
+          <a:bodyPr lIns="90000" rIns="90000" tIns="45000" bIns="45000" anchor="ctr"/>
+          <a:p>
+            <a:pPr>
+              <a:lnSpc>
+                <a:spcPct val="100000"/>
+              </a:lnSpc>
+            </a:pPr>
+            <a:r>
+              <a:rPr b="1" lang="en-US" sz="3000" spc="-1" strike="noStrike">
+                <a:solidFill>
+                  <a:srgbClr val="404041"/>
+                </a:solidFill>
+                <a:latin typeface="Arial"/>
+                <a:ea typeface="Arial"/>
+              </a:rPr>
+              <a:t>Network Graph: #some interesting years</a:t>
+            </a:r>
+            <a:endParaRPr b="0" lang="en-US" sz="3000" spc="-1" strike="noStrike">
+              <a:latin typeface="Arial"/>
+            </a:endParaRPr>
+          </a:p>
+        </p:txBody>
+      </p:sp>
+    </p:spTree>
+  </p:cSld>
+  <p:timing>
+    <p:tnLst>
+      <p:par>
+        <p:cTn id="35" dur="indefinite" restart="never" nodeType="tmRoot">
+          <p:childTnLst>
+            <p:seq>
+              <p:cTn id="36" dur="indefinite" nodeType="mainSeq"/>
+              <p:prevCondLst>
+                <p:cond delay="0" evt="onPrev">
+                  <p:tgtEl>
+                    <p:sldTgt/>
+                  </p:tgtEl>
+                </p:cond>
+              </p:prevCondLst>
+              <p:nextCondLst>
+                <p:cond delay="0" evt="onNext">
+                  <p:tgtEl>
+                    <p:sldTgt/>
+                  </p:tgtEl>
+                </p:cond>
+              </p:nextCondLst>
+            </p:seq>
+          </p:childTnLst>
+        </p:cTn>
+      </p:par>
+    </p:tnLst>
+  </p:timing>
+</p:sld>
+</file>
+
+<file path=ppt/slides/slide19.xml><?xml version="1.0" encoding="utf-8"?>
+<p:sld xmlns:a="http://schemas.openxmlformats.org/drawingml/2006/main" xmlns:p="http://schemas.openxmlformats.org/presentationml/2006/main" xmlns:r="http://schemas.openxmlformats.org/officeDocument/2006/relationships" xmlns:p14="http://schemas.microsoft.com/office/powerpoint/2010/main" xmlns:p15="http://schemas.microsoft.com/office/powerpoint/2012/main" xmlns:mc="http://schemas.openxmlformats.org/markup-compatibility/2006">
+  <p:cSld>
+    <p:spTree>
+      <p:nvGrpSpPr>
+        <p:cNvPr id="1" name=""/>
+        <p:cNvGrpSpPr/>
+        <p:nvPr/>
+      </p:nvGrpSpPr>
+      <p:grpSpPr>
+        <a:xfrm>
+          <a:off x="0" y="0"/>
+          <a:ext cx="0" cy="0"/>
+          <a:chOff x="0" y="0"/>
+          <a:chExt cx="0" cy="0"/>
+        </a:xfrm>
+      </p:grpSpPr>
+      <p:sp>
+        <p:nvSpPr>
+          <p:cNvPr id="106" name="CustomShape 1"/>
+          <p:cNvSpPr/>
+          <p:nvPr/>
+        </p:nvSpPr>
+        <p:spPr>
+          <a:xfrm>
+            <a:off x="529920" y="759240"/>
+            <a:ext cx="8002440" cy="697320"/>
+          </a:xfrm>
+          <a:prstGeom prst="rect">
+            <a:avLst/>
+          </a:prstGeom>
+          <a:noFill/>
+          <a:ln>
+            <a:noFill/>
+          </a:ln>
+        </p:spPr>
+        <p:style>
+          <a:lnRef idx="0"/>
+          <a:fillRef idx="0"/>
+          <a:effectRef idx="0"/>
+          <a:fontRef idx="minor"/>
+        </p:style>
+        <p:txBody>
+          <a:bodyPr lIns="90000" rIns="90000" tIns="45000" bIns="45000" anchor="ctr"/>
+          <a:p>
+            <a:pPr>
+              <a:lnSpc>
+                <a:spcPct val="100000"/>
+              </a:lnSpc>
+            </a:pPr>
+            <a:r>
+              <a:rPr b="1" lang="en-US" sz="3000" spc="-1" strike="noStrike">
+                <a:solidFill>
+                  <a:srgbClr val="404041"/>
+                </a:solidFill>
+                <a:latin typeface="Arial"/>
+                <a:ea typeface="Arial"/>
+              </a:rPr>
+              <a:t>Interesting Observations</a:t>
+            </a:r>
+            <a:endParaRPr b="0" lang="en-US" sz="3000" spc="-1" strike="noStrike">
+              <a:latin typeface="Arial"/>
+            </a:endParaRPr>
+          </a:p>
+        </p:txBody>
+      </p:sp>
+    </p:spTree>
+  </p:cSld>
+  <p:timing>
+    <p:tnLst>
+      <p:par>
+        <p:cTn id="37" dur="indefinite" restart="never" nodeType="tmRoot">
+          <p:childTnLst>
+            <p:seq>
+              <p:cTn id="38" dur="indefinite" nodeType="mainSeq"/>
               <p:prevCondLst>
                 <p:cond delay="0" evt="onPrev">
                   <p:tgtEl>
@@ -5107,14 +4630,14 @@
       </p:grpSpPr>
       <p:sp>
         <p:nvSpPr>
-          <p:cNvPr id="128" name="CustomShape 1"/>
+          <p:cNvPr id="88" name="CustomShape 1"/>
           <p:cNvSpPr/>
           <p:nvPr/>
         </p:nvSpPr>
         <p:spPr>
           <a:xfrm>
             <a:off x="529920" y="759240"/>
-            <a:ext cx="8002800" cy="697680"/>
+            <a:ext cx="8002440" cy="697320"/>
           </a:xfrm>
           <a:prstGeom prst="rect">
             <a:avLst/>
@@ -5156,14 +4679,14 @@
       </p:sp>
       <p:sp>
         <p:nvSpPr>
-          <p:cNvPr id="129" name="CustomShape 2"/>
+          <p:cNvPr id="89" name="CustomShape 2"/>
           <p:cNvSpPr/>
           <p:nvPr/>
         </p:nvSpPr>
         <p:spPr>
           <a:xfrm>
             <a:off x="518760" y="1458000"/>
-            <a:ext cx="8490240" cy="3067920"/>
+            <a:ext cx="8489880" cy="3067560"/>
           </a:xfrm>
           <a:prstGeom prst="rect">
             <a:avLst/>
@@ -5182,7 +4705,7 @@
         <p:txBody>
           <a:bodyPr lIns="90000" rIns="90000" tIns="45000" bIns="45000"/>
           <a:p>
-            <a:pPr marL="228600" indent="-227160">
+            <a:pPr marL="228600" indent="-226800">
               <a:lnSpc>
                 <a:spcPct val="90000"/>
               </a:lnSpc>
@@ -5195,86 +4718,12 @@
               <a:buFont typeface="Arial"/>
               <a:buChar char="•"/>
             </a:pPr>
-            <a:r>
-              <a:rPr b="1" lang="en-US" sz="1400" spc="-1" strike="noStrike">
-                <a:solidFill>
-                  <a:srgbClr val="000000"/>
-                </a:solidFill>
-                <a:latin typeface="Calibri"/>
-                <a:ea typeface="DejaVu Sans"/>
-              </a:rPr>
-              <a:t>Lead </a:t>
-            </a:r>
-            <a:r>
-              <a:rPr b="0" lang="en-US" sz="1400" spc="-1" strike="noStrike">
-                <a:solidFill>
-                  <a:srgbClr val="000000"/>
-                </a:solidFill>
-                <a:latin typeface="Calibri"/>
-                <a:ea typeface="DejaVu Sans"/>
-              </a:rPr>
-              <a:t>Prof Damir Cavar – Department of Linguistic, Indiana University [</a:t>
-            </a:r>
-            <a:r>
-              <a:rPr b="0" lang="en-US" sz="1400" spc="-1" strike="noStrike" u="sng">
-                <a:solidFill>
-                  <a:srgbClr val="0000ff"/>
-                </a:solidFill>
-                <a:uFillTx/>
-                <a:latin typeface="Calibri"/>
-                <a:ea typeface="DejaVu Sans"/>
-                <a:hlinkClick r:id="rId1"/>
-              </a:rPr>
-              <a:t>website</a:t>
-            </a:r>
-            <a:r>
-              <a:rPr b="0" lang="en-US" sz="1400" spc="-1" strike="noStrike">
-                <a:solidFill>
-                  <a:srgbClr val="000000"/>
-                </a:solidFill>
-                <a:latin typeface="Calibri"/>
-                <a:ea typeface="DejaVu Sans"/>
-              </a:rPr>
-              <a:t>, </a:t>
-            </a:r>
-            <a:r>
-              <a:rPr b="0" lang="en-US" sz="1400" spc="-1" strike="noStrike" u="sng">
-                <a:solidFill>
-                  <a:srgbClr val="0000ff"/>
-                </a:solidFill>
-                <a:uFillTx/>
-                <a:latin typeface="Calibri"/>
-                <a:ea typeface="DejaVu Sans"/>
-                <a:hlinkClick r:id="rId2"/>
-              </a:rPr>
-              <a:t>dcavar@iu.edu</a:t>
-            </a:r>
-            <a:r>
-              <a:rPr b="0" lang="en-US" sz="1400" spc="-1" strike="noStrike">
-                <a:solidFill>
-                  <a:srgbClr val="000000"/>
-                </a:solidFill>
-                <a:latin typeface="Calibri"/>
-                <a:ea typeface="DejaVu Sans"/>
-              </a:rPr>
-              <a:t>]</a:t>
-            </a:r>
-            <a:r>
-              <a:rPr b="0" lang="en-US" sz="1400" spc="-1" strike="noStrike">
-                <a:solidFill>
-                  <a:srgbClr val="000000"/>
-                </a:solidFill>
-                <a:latin typeface="Calibri"/>
-                <a:ea typeface="DejaVu Sans"/>
-              </a:rPr>
-              <a:t>	</a:t>
-            </a:r>
-            <a:endParaRPr b="0" lang="en-US" sz="1400" spc="-1" strike="noStrike">
-              <a:latin typeface="Arial"/>
-            </a:endParaRPr>
-          </a:p>
-          <a:p>
-            <a:pPr marL="228600" indent="-227160">
+            <a:endParaRPr b="0" lang="en-US" sz="1800" spc="-1" strike="noStrike">
+              <a:latin typeface="Arial"/>
+            </a:endParaRPr>
+          </a:p>
+          <a:p>
+            <a:pPr marL="228600" indent="-226800">
               <a:lnSpc>
                 <a:spcPct val="90000"/>
               </a:lnSpc>
@@ -5295,14 +4744,14 @@
                 <a:latin typeface="Calibri"/>
                 <a:ea typeface="DejaVu Sans"/>
               </a:rPr>
-              <a:t>Arnav – Data Science [aarnav@iu.edu]</a:t>
+              <a:t>Arnav – Online Section [aarnav@iu.edu]</a:t>
             </a:r>
             <a:endParaRPr b="0" lang="en-US" sz="1400" spc="-1" strike="noStrike">
               <a:latin typeface="Arial"/>
             </a:endParaRPr>
           </a:p>
           <a:p>
-            <a:pPr marL="228600" indent="-227160">
+            <a:pPr marL="228600" indent="-226800">
               <a:lnSpc>
                 <a:spcPct val="90000"/>
               </a:lnSpc>
@@ -5323,14 +4772,14 @@
                 <a:latin typeface="Calibri"/>
                 <a:ea typeface="DejaVu Sans"/>
               </a:rPr>
-              <a:t>Abhishek Babuji – Data Science [ababuji@iu.edu]</a:t>
+              <a:t>Karen Sanchez Trejo – Residential Section [karsanc@iu.edu]</a:t>
             </a:r>
             <a:endParaRPr b="0" lang="en-US" sz="1400" spc="-1" strike="noStrike">
               <a:latin typeface="Arial"/>
             </a:endParaRPr>
           </a:p>
           <a:p>
-            <a:pPr marL="228600" indent="-227160">
+            <a:pPr marL="228600" indent="-226800">
               <a:lnSpc>
                 <a:spcPct val="90000"/>
               </a:lnSpc>
@@ -5343,86 +4792,12 @@
               <a:buFont typeface="Arial"/>
               <a:buChar char="•"/>
             </a:pPr>
-            <a:r>
-              <a:rPr b="0" lang="en-US" sz="1400" spc="-1" strike="noStrike">
-                <a:solidFill>
-                  <a:srgbClr val="000000"/>
-                </a:solidFill>
-                <a:latin typeface="Calibri"/>
-                <a:ea typeface="DejaVu Sans"/>
-              </a:rPr>
-              <a:t>Shreejith Panicker – Data Science [skpanick@iu.edu]</a:t>
-            </a:r>
             <a:endParaRPr b="0" lang="en-US" sz="1400" spc="-1" strike="noStrike">
               <a:latin typeface="Arial"/>
             </a:endParaRPr>
           </a:p>
-          <a:p>
-            <a:pPr marL="228600" indent="-227160">
-              <a:lnSpc>
-                <a:spcPct val="90000"/>
-              </a:lnSpc>
-              <a:spcBef>
-                <a:spcPts val="1001"/>
-              </a:spcBef>
-              <a:buClr>
-                <a:srgbClr val="7f7f7f"/>
-              </a:buClr>
-              <a:buFont typeface="Arial"/>
-              <a:buChar char="•"/>
-            </a:pPr>
-            <a:r>
-              <a:rPr b="0" lang="en-US" sz="1400" spc="-1" strike="noStrike">
-                <a:solidFill>
-                  <a:srgbClr val="000000"/>
-                </a:solidFill>
-                <a:latin typeface="Calibri"/>
-                <a:ea typeface="DejaVu Sans"/>
-              </a:rPr>
-              <a:t>Prashant Modak – Computer Science [prkumoda@iu.edu]</a:t>
-            </a:r>
-            <a:endParaRPr b="0" lang="en-US" sz="1400" spc="-1" strike="noStrike">
-              <a:latin typeface="Arial"/>
-            </a:endParaRPr>
-          </a:p>
-          <a:p>
-            <a:pPr>
-              <a:lnSpc>
-                <a:spcPct val="90000"/>
-              </a:lnSpc>
-              <a:spcBef>
-                <a:spcPts val="1001"/>
-              </a:spcBef>
-            </a:pPr>
-            <a:endParaRPr b="0" lang="en-US" sz="1400" spc="-1" strike="noStrike">
-              <a:latin typeface="Arial"/>
-            </a:endParaRPr>
-          </a:p>
-        </p:txBody>
-      </p:sp>
-      <p:pic>
-        <p:nvPicPr>
-          <p:cNvPr id="130" name="Picture 8" descr=""/>
-          <p:cNvPicPr/>
-          <p:nvPr/>
-        </p:nvPicPr>
-        <p:blipFill>
-          <a:blip r:embed="rId3"/>
-          <a:stretch/>
-        </p:blipFill>
-        <p:spPr>
-          <a:xfrm>
-            <a:off x="7242840" y="1774800"/>
-            <a:ext cx="1168920" cy="1607760"/>
-          </a:xfrm>
-          <a:prstGeom prst="rect">
-            <a:avLst/>
-          </a:prstGeom>
-          <a:ln>
-            <a:noFill/>
-          </a:ln>
-        </p:spPr>
-      </p:pic>
+        </p:txBody>
+      </p:sp>
     </p:spTree>
   </p:cSld>
   <p:timing>
@@ -5432,6 +4807,300 @@
           <p:childTnLst>
             <p:seq>
               <p:cTn id="4" dur="indefinite" nodeType="mainSeq"/>
+              <p:prevCondLst>
+                <p:cond delay="0" evt="onPrev">
+                  <p:tgtEl>
+                    <p:sldTgt/>
+                  </p:tgtEl>
+                </p:cond>
+              </p:prevCondLst>
+              <p:nextCondLst>
+                <p:cond delay="0" evt="onNext">
+                  <p:tgtEl>
+                    <p:sldTgt/>
+                  </p:tgtEl>
+                </p:cond>
+              </p:nextCondLst>
+            </p:seq>
+          </p:childTnLst>
+        </p:cTn>
+      </p:par>
+    </p:tnLst>
+  </p:timing>
+</p:sld>
+</file>
+
+<file path=ppt/slides/slide20.xml><?xml version="1.0" encoding="utf-8"?>
+<p:sld xmlns:a="http://schemas.openxmlformats.org/drawingml/2006/main" xmlns:p="http://schemas.openxmlformats.org/presentationml/2006/main" xmlns:r="http://schemas.openxmlformats.org/officeDocument/2006/relationships" xmlns:p14="http://schemas.microsoft.com/office/powerpoint/2010/main" xmlns:p15="http://schemas.microsoft.com/office/powerpoint/2012/main" xmlns:mc="http://schemas.openxmlformats.org/markup-compatibility/2006">
+  <p:cSld>
+    <p:spTree>
+      <p:nvGrpSpPr>
+        <p:cNvPr id="1" name=""/>
+        <p:cNvGrpSpPr/>
+        <p:nvPr/>
+      </p:nvGrpSpPr>
+      <p:grpSpPr>
+        <a:xfrm>
+          <a:off x="0" y="0"/>
+          <a:ext cx="0" cy="0"/>
+          <a:chOff x="0" y="0"/>
+          <a:chExt cx="0" cy="0"/>
+        </a:xfrm>
+      </p:grpSpPr>
+      <p:sp>
+        <p:nvSpPr>
+          <p:cNvPr id="107" name="CustomShape 1"/>
+          <p:cNvSpPr/>
+          <p:nvPr/>
+        </p:nvSpPr>
+        <p:spPr>
+          <a:xfrm>
+            <a:off x="529920" y="759240"/>
+            <a:ext cx="8002440" cy="697320"/>
+          </a:xfrm>
+          <a:prstGeom prst="rect">
+            <a:avLst/>
+          </a:prstGeom>
+          <a:noFill/>
+          <a:ln>
+            <a:noFill/>
+          </a:ln>
+        </p:spPr>
+        <p:style>
+          <a:lnRef idx="0"/>
+          <a:fillRef idx="0"/>
+          <a:effectRef idx="0"/>
+          <a:fontRef idx="minor"/>
+        </p:style>
+        <p:txBody>
+          <a:bodyPr lIns="90000" rIns="90000" tIns="45000" bIns="45000" anchor="ctr"/>
+          <a:p>
+            <a:pPr>
+              <a:lnSpc>
+                <a:spcPct val="100000"/>
+              </a:lnSpc>
+            </a:pPr>
+            <a:r>
+              <a:rPr b="1" lang="en-US" sz="3000" spc="-1" strike="noStrike">
+                <a:solidFill>
+                  <a:srgbClr val="404041"/>
+                </a:solidFill>
+                <a:latin typeface="Arial"/>
+                <a:ea typeface="Arial"/>
+              </a:rPr>
+              <a:t>Challenges</a:t>
+            </a:r>
+            <a:endParaRPr b="0" lang="en-US" sz="3000" spc="-1" strike="noStrike">
+              <a:latin typeface="Arial"/>
+            </a:endParaRPr>
+          </a:p>
+        </p:txBody>
+      </p:sp>
+    </p:spTree>
+  </p:cSld>
+  <p:timing>
+    <p:tnLst>
+      <p:par>
+        <p:cTn id="39" dur="indefinite" restart="never" nodeType="tmRoot">
+          <p:childTnLst>
+            <p:seq>
+              <p:cTn id="40" dur="indefinite" nodeType="mainSeq"/>
+              <p:prevCondLst>
+                <p:cond delay="0" evt="onPrev">
+                  <p:tgtEl>
+                    <p:sldTgt/>
+                  </p:tgtEl>
+                </p:cond>
+              </p:prevCondLst>
+              <p:nextCondLst>
+                <p:cond delay="0" evt="onNext">
+                  <p:tgtEl>
+                    <p:sldTgt/>
+                  </p:tgtEl>
+                </p:cond>
+              </p:nextCondLst>
+            </p:seq>
+          </p:childTnLst>
+        </p:cTn>
+      </p:par>
+    </p:tnLst>
+  </p:timing>
+</p:sld>
+</file>
+
+<file path=ppt/slides/slide21.xml><?xml version="1.0" encoding="utf-8"?>
+<p:sld xmlns:a="http://schemas.openxmlformats.org/drawingml/2006/main" xmlns:p="http://schemas.openxmlformats.org/presentationml/2006/main" xmlns:r="http://schemas.openxmlformats.org/officeDocument/2006/relationships" xmlns:p14="http://schemas.microsoft.com/office/powerpoint/2010/main" xmlns:p15="http://schemas.microsoft.com/office/powerpoint/2012/main" xmlns:mc="http://schemas.openxmlformats.org/markup-compatibility/2006">
+  <p:cSld>
+    <p:spTree>
+      <p:nvGrpSpPr>
+        <p:cNvPr id="1" name=""/>
+        <p:cNvGrpSpPr/>
+        <p:nvPr/>
+      </p:nvGrpSpPr>
+      <p:grpSpPr>
+        <a:xfrm>
+          <a:off x="0" y="0"/>
+          <a:ext cx="0" cy="0"/>
+          <a:chOff x="0" y="0"/>
+          <a:chExt cx="0" cy="0"/>
+        </a:xfrm>
+      </p:grpSpPr>
+      <p:sp>
+        <p:nvSpPr>
+          <p:cNvPr id="108" name="CustomShape 1"/>
+          <p:cNvSpPr/>
+          <p:nvPr/>
+        </p:nvSpPr>
+        <p:spPr>
+          <a:xfrm>
+            <a:off x="529920" y="759240"/>
+            <a:ext cx="8002440" cy="697320"/>
+          </a:xfrm>
+          <a:prstGeom prst="rect">
+            <a:avLst/>
+          </a:prstGeom>
+          <a:noFill/>
+          <a:ln>
+            <a:noFill/>
+          </a:ln>
+        </p:spPr>
+        <p:style>
+          <a:lnRef idx="0"/>
+          <a:fillRef idx="0"/>
+          <a:effectRef idx="0"/>
+          <a:fontRef idx="minor"/>
+        </p:style>
+        <p:txBody>
+          <a:bodyPr lIns="90000" rIns="90000" tIns="45000" bIns="45000" anchor="ctr"/>
+          <a:p>
+            <a:pPr>
+              <a:lnSpc>
+                <a:spcPct val="100000"/>
+              </a:lnSpc>
+            </a:pPr>
+            <a:r>
+              <a:rPr b="1" lang="en-US" sz="3000" spc="-1" strike="noStrike">
+                <a:solidFill>
+                  <a:srgbClr val="404041"/>
+                </a:solidFill>
+                <a:latin typeface="Arial"/>
+                <a:ea typeface="Arial"/>
+              </a:rPr>
+              <a:t>Future Work</a:t>
+            </a:r>
+            <a:endParaRPr b="0" lang="en-US" sz="3000" spc="-1" strike="noStrike">
+              <a:latin typeface="Arial"/>
+            </a:endParaRPr>
+          </a:p>
+        </p:txBody>
+      </p:sp>
+    </p:spTree>
+  </p:cSld>
+  <p:timing>
+    <p:tnLst>
+      <p:par>
+        <p:cTn id="41" dur="indefinite" restart="never" nodeType="tmRoot">
+          <p:childTnLst>
+            <p:seq>
+              <p:cTn id="42" dur="indefinite" nodeType="mainSeq"/>
+              <p:prevCondLst>
+                <p:cond delay="0" evt="onPrev">
+                  <p:tgtEl>
+                    <p:sldTgt/>
+                  </p:tgtEl>
+                </p:cond>
+              </p:prevCondLst>
+              <p:nextCondLst>
+                <p:cond delay="0" evt="onNext">
+                  <p:tgtEl>
+                    <p:sldTgt/>
+                  </p:tgtEl>
+                </p:cond>
+              </p:nextCondLst>
+            </p:seq>
+          </p:childTnLst>
+        </p:cTn>
+      </p:par>
+    </p:tnLst>
+  </p:timing>
+</p:sld>
+</file>
+
+<file path=ppt/slides/slide22.xml><?xml version="1.0" encoding="utf-8"?>
+<p:sld xmlns:a="http://schemas.openxmlformats.org/drawingml/2006/main" xmlns:p="http://schemas.openxmlformats.org/presentationml/2006/main" xmlns:r="http://schemas.openxmlformats.org/officeDocument/2006/relationships" xmlns:p14="http://schemas.microsoft.com/office/powerpoint/2010/main" xmlns:p15="http://schemas.microsoft.com/office/powerpoint/2012/main" xmlns:mc="http://schemas.openxmlformats.org/markup-compatibility/2006">
+  <p:cSld>
+    <p:spTree>
+      <p:nvGrpSpPr>
+        <p:cNvPr id="1" name=""/>
+        <p:cNvGrpSpPr/>
+        <p:nvPr/>
+      </p:nvGrpSpPr>
+      <p:grpSpPr>
+        <a:xfrm>
+          <a:off x="0" y="0"/>
+          <a:ext cx="0" cy="0"/>
+          <a:chOff x="0" y="0"/>
+          <a:chExt cx="0" cy="0"/>
+        </a:xfrm>
+      </p:grpSpPr>
+      <p:sp>
+        <p:nvSpPr>
+          <p:cNvPr id="109" name="CustomShape 1"/>
+          <p:cNvSpPr/>
+          <p:nvPr/>
+        </p:nvSpPr>
+        <p:spPr>
+          <a:xfrm>
+            <a:off x="529920" y="759240"/>
+            <a:ext cx="8002440" cy="697320"/>
+          </a:xfrm>
+          <a:prstGeom prst="rect">
+            <a:avLst/>
+          </a:prstGeom>
+          <a:noFill/>
+          <a:ln>
+            <a:noFill/>
+          </a:ln>
+        </p:spPr>
+        <p:style>
+          <a:lnRef idx="0"/>
+          <a:fillRef idx="0"/>
+          <a:effectRef idx="0"/>
+          <a:fontRef idx="minor"/>
+        </p:style>
+        <p:txBody>
+          <a:bodyPr lIns="90000" rIns="90000" tIns="45000" bIns="45000" anchor="ctr"/>
+          <a:p>
+            <a:pPr>
+              <a:lnSpc>
+                <a:spcPct val="100000"/>
+              </a:lnSpc>
+            </a:pPr>
+            <a:r>
+              <a:rPr b="1" lang="en-US" sz="3000" spc="-1" strike="noStrike">
+                <a:solidFill>
+                  <a:srgbClr val="404041"/>
+                </a:solidFill>
+                <a:latin typeface="Arial"/>
+                <a:ea typeface="Arial"/>
+              </a:rPr>
+              <a:t>References</a:t>
+            </a:r>
+            <a:endParaRPr b="0" lang="en-US" sz="3000" spc="-1" strike="noStrike">
+              <a:latin typeface="Arial"/>
+            </a:endParaRPr>
+          </a:p>
+        </p:txBody>
+      </p:sp>
+    </p:spTree>
+  </p:cSld>
+  <p:timing>
+    <p:tnLst>
+      <p:par>
+        <p:cTn id="43" dur="indefinite" restart="never" nodeType="tmRoot">
+          <p:childTnLst>
+            <p:seq>
+              <p:cTn id="44" dur="indefinite" nodeType="mainSeq"/>
               <p:prevCondLst>
                 <p:cond delay="0" evt="onPrev">
                   <p:tgtEl>
@@ -5474,14 +5143,14 @@
       </p:grpSpPr>
       <p:sp>
         <p:nvSpPr>
-          <p:cNvPr id="131" name="CustomShape 1"/>
+          <p:cNvPr id="90" name="CustomShape 1"/>
           <p:cNvSpPr/>
           <p:nvPr/>
         </p:nvSpPr>
         <p:spPr>
           <a:xfrm>
             <a:off x="529920" y="759240"/>
-            <a:ext cx="8002800" cy="697680"/>
+            <a:ext cx="8002440" cy="697320"/>
           </a:xfrm>
           <a:prstGeom prst="rect">
             <a:avLst/>
@@ -5513,7 +5182,7 @@
                 <a:latin typeface="Arial"/>
                 <a:ea typeface="Arial"/>
               </a:rPr>
-              <a:t>asdf</a:t>
+              <a:t>Introduction</a:t>
             </a:r>
             <a:endParaRPr b="0" lang="en-US" sz="3000" spc="-1" strike="noStrike">
               <a:latin typeface="Arial"/>
@@ -5530,6 +5199,594 @@
           <p:childTnLst>
             <p:seq>
               <p:cTn id="6" dur="indefinite" nodeType="mainSeq"/>
+              <p:prevCondLst>
+                <p:cond delay="0" evt="onPrev">
+                  <p:tgtEl>
+                    <p:sldTgt/>
+                  </p:tgtEl>
+                </p:cond>
+              </p:prevCondLst>
+              <p:nextCondLst>
+                <p:cond delay="0" evt="onNext">
+                  <p:tgtEl>
+                    <p:sldTgt/>
+                  </p:tgtEl>
+                </p:cond>
+              </p:nextCondLst>
+            </p:seq>
+          </p:childTnLst>
+        </p:cTn>
+      </p:par>
+    </p:tnLst>
+  </p:timing>
+</p:sld>
+</file>
+
+<file path=ppt/slides/slide4.xml><?xml version="1.0" encoding="utf-8"?>
+<p:sld xmlns:a="http://schemas.openxmlformats.org/drawingml/2006/main" xmlns:p="http://schemas.openxmlformats.org/presentationml/2006/main" xmlns:r="http://schemas.openxmlformats.org/officeDocument/2006/relationships" xmlns:p14="http://schemas.microsoft.com/office/powerpoint/2010/main" xmlns:p15="http://schemas.microsoft.com/office/powerpoint/2012/main" xmlns:mc="http://schemas.openxmlformats.org/markup-compatibility/2006">
+  <p:cSld>
+    <p:spTree>
+      <p:nvGrpSpPr>
+        <p:cNvPr id="1" name=""/>
+        <p:cNvGrpSpPr/>
+        <p:nvPr/>
+      </p:nvGrpSpPr>
+      <p:grpSpPr>
+        <a:xfrm>
+          <a:off x="0" y="0"/>
+          <a:ext cx="0" cy="0"/>
+          <a:chOff x="0" y="0"/>
+          <a:chExt cx="0" cy="0"/>
+        </a:xfrm>
+      </p:grpSpPr>
+      <p:sp>
+        <p:nvSpPr>
+          <p:cNvPr id="91" name="CustomShape 1"/>
+          <p:cNvSpPr/>
+          <p:nvPr/>
+        </p:nvSpPr>
+        <p:spPr>
+          <a:xfrm>
+            <a:off x="529920" y="759240"/>
+            <a:ext cx="8002440" cy="697320"/>
+          </a:xfrm>
+          <a:prstGeom prst="rect">
+            <a:avLst/>
+          </a:prstGeom>
+          <a:noFill/>
+          <a:ln>
+            <a:noFill/>
+          </a:ln>
+        </p:spPr>
+        <p:style>
+          <a:lnRef idx="0"/>
+          <a:fillRef idx="0"/>
+          <a:effectRef idx="0"/>
+          <a:fontRef idx="minor"/>
+        </p:style>
+        <p:txBody>
+          <a:bodyPr lIns="90000" rIns="90000" tIns="45000" bIns="45000" anchor="ctr"/>
+          <a:p>
+            <a:pPr>
+              <a:lnSpc>
+                <a:spcPct val="100000"/>
+              </a:lnSpc>
+            </a:pPr>
+            <a:r>
+              <a:rPr b="1" lang="en-US" sz="3000" spc="-1" strike="noStrike">
+                <a:solidFill>
+                  <a:srgbClr val="404041"/>
+                </a:solidFill>
+                <a:latin typeface="Arial"/>
+                <a:ea typeface="Arial"/>
+              </a:rPr>
+              <a:t>Motivation</a:t>
+            </a:r>
+            <a:endParaRPr b="0" lang="en-US" sz="3000" spc="-1" strike="noStrike">
+              <a:latin typeface="Arial"/>
+            </a:endParaRPr>
+          </a:p>
+        </p:txBody>
+      </p:sp>
+    </p:spTree>
+  </p:cSld>
+  <p:timing>
+    <p:tnLst>
+      <p:par>
+        <p:cTn id="7" dur="indefinite" restart="never" nodeType="tmRoot">
+          <p:childTnLst>
+            <p:seq>
+              <p:cTn id="8" dur="indefinite" nodeType="mainSeq"/>
+              <p:prevCondLst>
+                <p:cond delay="0" evt="onPrev">
+                  <p:tgtEl>
+                    <p:sldTgt/>
+                  </p:tgtEl>
+                </p:cond>
+              </p:prevCondLst>
+              <p:nextCondLst>
+                <p:cond delay="0" evt="onNext">
+                  <p:tgtEl>
+                    <p:sldTgt/>
+                  </p:tgtEl>
+                </p:cond>
+              </p:nextCondLst>
+            </p:seq>
+          </p:childTnLst>
+        </p:cTn>
+      </p:par>
+    </p:tnLst>
+  </p:timing>
+</p:sld>
+</file>
+
+<file path=ppt/slides/slide5.xml><?xml version="1.0" encoding="utf-8"?>
+<p:sld xmlns:a="http://schemas.openxmlformats.org/drawingml/2006/main" xmlns:p="http://schemas.openxmlformats.org/presentationml/2006/main" xmlns:r="http://schemas.openxmlformats.org/officeDocument/2006/relationships" xmlns:p14="http://schemas.microsoft.com/office/powerpoint/2010/main" xmlns:p15="http://schemas.microsoft.com/office/powerpoint/2012/main" xmlns:mc="http://schemas.openxmlformats.org/markup-compatibility/2006">
+  <p:cSld>
+    <p:spTree>
+      <p:nvGrpSpPr>
+        <p:cNvPr id="1" name=""/>
+        <p:cNvGrpSpPr/>
+        <p:nvPr/>
+      </p:nvGrpSpPr>
+      <p:grpSpPr>
+        <a:xfrm>
+          <a:off x="0" y="0"/>
+          <a:ext cx="0" cy="0"/>
+          <a:chOff x="0" y="0"/>
+          <a:chExt cx="0" cy="0"/>
+        </a:xfrm>
+      </p:grpSpPr>
+      <p:sp>
+        <p:nvSpPr>
+          <p:cNvPr id="92" name="CustomShape 1"/>
+          <p:cNvSpPr/>
+          <p:nvPr/>
+        </p:nvSpPr>
+        <p:spPr>
+          <a:xfrm>
+            <a:off x="529920" y="759240"/>
+            <a:ext cx="8002440" cy="697320"/>
+          </a:xfrm>
+          <a:prstGeom prst="rect">
+            <a:avLst/>
+          </a:prstGeom>
+          <a:noFill/>
+          <a:ln>
+            <a:noFill/>
+          </a:ln>
+        </p:spPr>
+        <p:style>
+          <a:lnRef idx="0"/>
+          <a:fillRef idx="0"/>
+          <a:effectRef idx="0"/>
+          <a:fontRef idx="minor"/>
+        </p:style>
+        <p:txBody>
+          <a:bodyPr lIns="90000" rIns="90000" tIns="45000" bIns="45000" anchor="ctr"/>
+          <a:p>
+            <a:pPr>
+              <a:lnSpc>
+                <a:spcPct val="100000"/>
+              </a:lnSpc>
+            </a:pPr>
+            <a:r>
+              <a:rPr b="1" lang="en-US" sz="3000" spc="-1" strike="noStrike">
+                <a:solidFill>
+                  <a:srgbClr val="404041"/>
+                </a:solidFill>
+                <a:latin typeface="Arial"/>
+                <a:ea typeface="Arial"/>
+              </a:rPr>
+              <a:t>Background</a:t>
+            </a:r>
+            <a:endParaRPr b="0" lang="en-US" sz="3000" spc="-1" strike="noStrike">
+              <a:latin typeface="Arial"/>
+            </a:endParaRPr>
+          </a:p>
+        </p:txBody>
+      </p:sp>
+    </p:spTree>
+  </p:cSld>
+  <p:timing>
+    <p:tnLst>
+      <p:par>
+        <p:cTn id="9" dur="indefinite" restart="never" nodeType="tmRoot">
+          <p:childTnLst>
+            <p:seq>
+              <p:cTn id="10" dur="indefinite" nodeType="mainSeq"/>
+              <p:prevCondLst>
+                <p:cond delay="0" evt="onPrev">
+                  <p:tgtEl>
+                    <p:sldTgt/>
+                  </p:tgtEl>
+                </p:cond>
+              </p:prevCondLst>
+              <p:nextCondLst>
+                <p:cond delay="0" evt="onNext">
+                  <p:tgtEl>
+                    <p:sldTgt/>
+                  </p:tgtEl>
+                </p:cond>
+              </p:nextCondLst>
+            </p:seq>
+          </p:childTnLst>
+        </p:cTn>
+      </p:par>
+    </p:tnLst>
+  </p:timing>
+</p:sld>
+</file>
+
+<file path=ppt/slides/slide6.xml><?xml version="1.0" encoding="utf-8"?>
+<p:sld xmlns:a="http://schemas.openxmlformats.org/drawingml/2006/main" xmlns:p="http://schemas.openxmlformats.org/presentationml/2006/main" xmlns:r="http://schemas.openxmlformats.org/officeDocument/2006/relationships" xmlns:p14="http://schemas.microsoft.com/office/powerpoint/2010/main" xmlns:p15="http://schemas.microsoft.com/office/powerpoint/2012/main" xmlns:mc="http://schemas.openxmlformats.org/markup-compatibility/2006">
+  <p:cSld>
+    <p:spTree>
+      <p:nvGrpSpPr>
+        <p:cNvPr id="1" name=""/>
+        <p:cNvGrpSpPr/>
+        <p:nvPr/>
+      </p:nvGrpSpPr>
+      <p:grpSpPr>
+        <a:xfrm>
+          <a:off x="0" y="0"/>
+          <a:ext cx="0" cy="0"/>
+          <a:chOff x="0" y="0"/>
+          <a:chExt cx="0" cy="0"/>
+        </a:xfrm>
+      </p:grpSpPr>
+      <p:sp>
+        <p:nvSpPr>
+          <p:cNvPr id="93" name="CustomShape 1"/>
+          <p:cNvSpPr/>
+          <p:nvPr/>
+        </p:nvSpPr>
+        <p:spPr>
+          <a:xfrm>
+            <a:off x="529920" y="759240"/>
+            <a:ext cx="8002440" cy="697320"/>
+          </a:xfrm>
+          <a:prstGeom prst="rect">
+            <a:avLst/>
+          </a:prstGeom>
+          <a:noFill/>
+          <a:ln>
+            <a:noFill/>
+          </a:ln>
+        </p:spPr>
+        <p:style>
+          <a:lnRef idx="0"/>
+          <a:fillRef idx="0"/>
+          <a:effectRef idx="0"/>
+          <a:fontRef idx="minor"/>
+        </p:style>
+        <p:txBody>
+          <a:bodyPr lIns="90000" rIns="90000" tIns="45000" bIns="45000" anchor="ctr"/>
+          <a:p>
+            <a:pPr>
+              <a:lnSpc>
+                <a:spcPct val="100000"/>
+              </a:lnSpc>
+            </a:pPr>
+            <a:r>
+              <a:rPr b="1" lang="en-US" sz="3000" spc="-1" strike="noStrike">
+                <a:solidFill>
+                  <a:srgbClr val="404041"/>
+                </a:solidFill>
+                <a:latin typeface="Arial"/>
+                <a:ea typeface="Arial"/>
+              </a:rPr>
+              <a:t>Data Description</a:t>
+            </a:r>
+            <a:endParaRPr b="0" lang="en-US" sz="3000" spc="-1" strike="noStrike">
+              <a:latin typeface="Arial"/>
+            </a:endParaRPr>
+          </a:p>
+        </p:txBody>
+      </p:sp>
+    </p:spTree>
+  </p:cSld>
+  <p:timing>
+    <p:tnLst>
+      <p:par>
+        <p:cTn id="11" dur="indefinite" restart="never" nodeType="tmRoot">
+          <p:childTnLst>
+            <p:seq>
+              <p:cTn id="12" dur="indefinite" nodeType="mainSeq"/>
+              <p:prevCondLst>
+                <p:cond delay="0" evt="onPrev">
+                  <p:tgtEl>
+                    <p:sldTgt/>
+                  </p:tgtEl>
+                </p:cond>
+              </p:prevCondLst>
+              <p:nextCondLst>
+                <p:cond delay="0" evt="onNext">
+                  <p:tgtEl>
+                    <p:sldTgt/>
+                  </p:tgtEl>
+                </p:cond>
+              </p:nextCondLst>
+            </p:seq>
+          </p:childTnLst>
+        </p:cTn>
+      </p:par>
+    </p:tnLst>
+  </p:timing>
+</p:sld>
+</file>
+
+<file path=ppt/slides/slide7.xml><?xml version="1.0" encoding="utf-8"?>
+<p:sld xmlns:a="http://schemas.openxmlformats.org/drawingml/2006/main" xmlns:p="http://schemas.openxmlformats.org/presentationml/2006/main" xmlns:r="http://schemas.openxmlformats.org/officeDocument/2006/relationships" xmlns:p14="http://schemas.microsoft.com/office/powerpoint/2010/main" xmlns:p15="http://schemas.microsoft.com/office/powerpoint/2012/main" xmlns:mc="http://schemas.openxmlformats.org/markup-compatibility/2006">
+  <p:cSld>
+    <p:spTree>
+      <p:nvGrpSpPr>
+        <p:cNvPr id="1" name=""/>
+        <p:cNvGrpSpPr/>
+        <p:nvPr/>
+      </p:nvGrpSpPr>
+      <p:grpSpPr>
+        <a:xfrm>
+          <a:off x="0" y="0"/>
+          <a:ext cx="0" cy="0"/>
+          <a:chOff x="0" y="0"/>
+          <a:chExt cx="0" cy="0"/>
+        </a:xfrm>
+      </p:grpSpPr>
+      <p:sp>
+        <p:nvSpPr>
+          <p:cNvPr id="94" name="CustomShape 1"/>
+          <p:cNvSpPr/>
+          <p:nvPr/>
+        </p:nvSpPr>
+        <p:spPr>
+          <a:xfrm>
+            <a:off x="529920" y="759240"/>
+            <a:ext cx="8002440" cy="697320"/>
+          </a:xfrm>
+          <a:prstGeom prst="rect">
+            <a:avLst/>
+          </a:prstGeom>
+          <a:noFill/>
+          <a:ln>
+            <a:noFill/>
+          </a:ln>
+        </p:spPr>
+        <p:style>
+          <a:lnRef idx="0"/>
+          <a:fillRef idx="0"/>
+          <a:effectRef idx="0"/>
+          <a:fontRef idx="minor"/>
+        </p:style>
+        <p:txBody>
+          <a:bodyPr lIns="90000" rIns="90000" tIns="45000" bIns="45000" anchor="ctr"/>
+          <a:p>
+            <a:pPr>
+              <a:lnSpc>
+                <a:spcPct val="100000"/>
+              </a:lnSpc>
+            </a:pPr>
+            <a:r>
+              <a:rPr b="1" lang="en-US" sz="3000" spc="-1" strike="noStrike">
+                <a:solidFill>
+                  <a:srgbClr val="404041"/>
+                </a:solidFill>
+                <a:latin typeface="Arial"/>
+                <a:ea typeface="Arial"/>
+              </a:rPr>
+              <a:t>Exploratory Analysis: Time series</a:t>
+            </a:r>
+            <a:endParaRPr b="0" lang="en-US" sz="3000" spc="-1" strike="noStrike">
+              <a:latin typeface="Arial"/>
+            </a:endParaRPr>
+          </a:p>
+        </p:txBody>
+      </p:sp>
+    </p:spTree>
+  </p:cSld>
+  <p:timing>
+    <p:tnLst>
+      <p:par>
+        <p:cTn id="13" dur="indefinite" restart="never" nodeType="tmRoot">
+          <p:childTnLst>
+            <p:seq>
+              <p:cTn id="14" dur="indefinite" nodeType="mainSeq"/>
+              <p:prevCondLst>
+                <p:cond delay="0" evt="onPrev">
+                  <p:tgtEl>
+                    <p:sldTgt/>
+                  </p:tgtEl>
+                </p:cond>
+              </p:prevCondLst>
+              <p:nextCondLst>
+                <p:cond delay="0" evt="onNext">
+                  <p:tgtEl>
+                    <p:sldTgt/>
+                  </p:tgtEl>
+                </p:cond>
+              </p:nextCondLst>
+            </p:seq>
+          </p:childTnLst>
+        </p:cTn>
+      </p:par>
+    </p:tnLst>
+  </p:timing>
+</p:sld>
+</file>
+
+<file path=ppt/slides/slide8.xml><?xml version="1.0" encoding="utf-8"?>
+<p:sld xmlns:a="http://schemas.openxmlformats.org/drawingml/2006/main" xmlns:p="http://schemas.openxmlformats.org/presentationml/2006/main" xmlns:r="http://schemas.openxmlformats.org/officeDocument/2006/relationships" xmlns:p14="http://schemas.microsoft.com/office/powerpoint/2010/main" xmlns:p15="http://schemas.microsoft.com/office/powerpoint/2012/main" xmlns:mc="http://schemas.openxmlformats.org/markup-compatibility/2006">
+  <p:cSld>
+    <p:spTree>
+      <p:nvGrpSpPr>
+        <p:cNvPr id="1" name=""/>
+        <p:cNvGrpSpPr/>
+        <p:nvPr/>
+      </p:nvGrpSpPr>
+      <p:grpSpPr>
+        <a:xfrm>
+          <a:off x="0" y="0"/>
+          <a:ext cx="0" cy="0"/>
+          <a:chOff x="0" y="0"/>
+          <a:chExt cx="0" cy="0"/>
+        </a:xfrm>
+      </p:grpSpPr>
+      <p:sp>
+        <p:nvSpPr>
+          <p:cNvPr id="95" name="CustomShape 1"/>
+          <p:cNvSpPr/>
+          <p:nvPr/>
+        </p:nvSpPr>
+        <p:spPr>
+          <a:xfrm>
+            <a:off x="529920" y="759240"/>
+            <a:ext cx="8002440" cy="697320"/>
+          </a:xfrm>
+          <a:prstGeom prst="rect">
+            <a:avLst/>
+          </a:prstGeom>
+          <a:noFill/>
+          <a:ln>
+            <a:noFill/>
+          </a:ln>
+        </p:spPr>
+        <p:style>
+          <a:lnRef idx="0"/>
+          <a:fillRef idx="0"/>
+          <a:effectRef idx="0"/>
+          <a:fontRef idx="minor"/>
+        </p:style>
+        <p:txBody>
+          <a:bodyPr lIns="90000" rIns="90000" tIns="45000" bIns="45000" anchor="ctr"/>
+          <a:p>
+            <a:pPr>
+              <a:lnSpc>
+                <a:spcPct val="100000"/>
+              </a:lnSpc>
+            </a:pPr>
+            <a:r>
+              <a:rPr b="1" lang="en-US" sz="3000" spc="-1" strike="noStrike">
+                <a:solidFill>
+                  <a:srgbClr val="404041"/>
+                </a:solidFill>
+                <a:latin typeface="Arial"/>
+                <a:ea typeface="Arial"/>
+              </a:rPr>
+              <a:t>Exploratory Analysis: Countries</a:t>
+            </a:r>
+            <a:endParaRPr b="0" lang="en-US" sz="3000" spc="-1" strike="noStrike">
+              <a:latin typeface="Arial"/>
+            </a:endParaRPr>
+          </a:p>
+        </p:txBody>
+      </p:sp>
+    </p:spTree>
+  </p:cSld>
+  <p:timing>
+    <p:tnLst>
+      <p:par>
+        <p:cTn id="15" dur="indefinite" restart="never" nodeType="tmRoot">
+          <p:childTnLst>
+            <p:seq>
+              <p:cTn id="16" dur="indefinite" nodeType="mainSeq"/>
+              <p:prevCondLst>
+                <p:cond delay="0" evt="onPrev">
+                  <p:tgtEl>
+                    <p:sldTgt/>
+                  </p:tgtEl>
+                </p:cond>
+              </p:prevCondLst>
+              <p:nextCondLst>
+                <p:cond delay="0" evt="onNext">
+                  <p:tgtEl>
+                    <p:sldTgt/>
+                  </p:tgtEl>
+                </p:cond>
+              </p:nextCondLst>
+            </p:seq>
+          </p:childTnLst>
+        </p:cTn>
+      </p:par>
+    </p:tnLst>
+  </p:timing>
+</p:sld>
+</file>
+
+<file path=ppt/slides/slide9.xml><?xml version="1.0" encoding="utf-8"?>
+<p:sld xmlns:a="http://schemas.openxmlformats.org/drawingml/2006/main" xmlns:p="http://schemas.openxmlformats.org/presentationml/2006/main" xmlns:r="http://schemas.openxmlformats.org/officeDocument/2006/relationships" xmlns:p14="http://schemas.microsoft.com/office/powerpoint/2010/main" xmlns:p15="http://schemas.microsoft.com/office/powerpoint/2012/main" xmlns:mc="http://schemas.openxmlformats.org/markup-compatibility/2006">
+  <p:cSld>
+    <p:spTree>
+      <p:nvGrpSpPr>
+        <p:cNvPr id="1" name=""/>
+        <p:cNvGrpSpPr/>
+        <p:nvPr/>
+      </p:nvGrpSpPr>
+      <p:grpSpPr>
+        <a:xfrm>
+          <a:off x="0" y="0"/>
+          <a:ext cx="0" cy="0"/>
+          <a:chOff x="0" y="0"/>
+          <a:chExt cx="0" cy="0"/>
+        </a:xfrm>
+      </p:grpSpPr>
+      <p:sp>
+        <p:nvSpPr>
+          <p:cNvPr id="96" name="CustomShape 1"/>
+          <p:cNvSpPr/>
+          <p:nvPr/>
+        </p:nvSpPr>
+        <p:spPr>
+          <a:xfrm>
+            <a:off x="529920" y="759240"/>
+            <a:ext cx="8002440" cy="697320"/>
+          </a:xfrm>
+          <a:prstGeom prst="rect">
+            <a:avLst/>
+          </a:prstGeom>
+          <a:noFill/>
+          <a:ln>
+            <a:noFill/>
+          </a:ln>
+        </p:spPr>
+        <p:style>
+          <a:lnRef idx="0"/>
+          <a:fillRef idx="0"/>
+          <a:effectRef idx="0"/>
+          <a:fontRef idx="minor"/>
+        </p:style>
+        <p:txBody>
+          <a:bodyPr lIns="90000" rIns="90000" tIns="45000" bIns="45000" anchor="ctr"/>
+          <a:p>
+            <a:pPr>
+              <a:lnSpc>
+                <a:spcPct val="100000"/>
+              </a:lnSpc>
+            </a:pPr>
+            <a:r>
+              <a:rPr b="1" lang="en-US" sz="3000" spc="-1" strike="noStrike">
+                <a:solidFill>
+                  <a:srgbClr val="404041"/>
+                </a:solidFill>
+                <a:latin typeface="Arial"/>
+                <a:ea typeface="Arial"/>
+              </a:rPr>
+              <a:t>Exploratory Analysis: Gender ratios </a:t>
+            </a:r>
+            <a:endParaRPr b="0" lang="en-US" sz="3000" spc="-1" strike="noStrike">
+              <a:latin typeface="Arial"/>
+            </a:endParaRPr>
+          </a:p>
+        </p:txBody>
+      </p:sp>
+    </p:spTree>
+  </p:cSld>
+  <p:timing>
+    <p:tnLst>
+      <p:par>
+        <p:cTn id="17" dur="indefinite" restart="never" nodeType="tmRoot">
+          <p:childTnLst>
+            <p:seq>
+              <p:cTn id="18" dur="indefinite" nodeType="mainSeq"/>
               <p:prevCondLst>
                 <p:cond delay="0" evt="onPrev">
                   <p:tgtEl>
@@ -5997,227 +6254,4 @@
     </a:fmtScheme>
   </a:themeElements>
 </a:theme>
-</file>
-
-<file path=ppt/theme/theme3.xml><?xml version="1.0" encoding="utf-8"?>
-<a:theme xmlns:a="http://schemas.openxmlformats.org/drawingml/2006/main" name="Office Theme">
-  <a:themeElements>
-    <a:clrScheme name="Office">
-      <a:dk1>
-        <a:sysClr val="windowText" lastClr="000000"/>
-      </a:dk1>
-      <a:lt1>
-        <a:sysClr val="window" lastClr="FFFFFF"/>
-      </a:lt1>
-      <a:dk2>
-        <a:srgbClr val="1f497d"/>
-      </a:dk2>
-      <a:lt2>
-        <a:srgbClr val="eeece1"/>
-      </a:lt2>
-      <a:accent1>
-        <a:srgbClr val="4f81bd"/>
-      </a:accent1>
-      <a:accent2>
-        <a:srgbClr val="c0504d"/>
-      </a:accent2>
-      <a:accent3>
-        <a:srgbClr val="9bbb59"/>
-      </a:accent3>
-      <a:accent4>
-        <a:srgbClr val="8064a2"/>
-      </a:accent4>
-      <a:accent5>
-        <a:srgbClr val="4bacc6"/>
-      </a:accent5>
-      <a:accent6>
-        <a:srgbClr val="f79646"/>
-      </a:accent6>
-      <a:hlink>
-        <a:srgbClr val="0000ff"/>
-      </a:hlink>
-      <a:folHlink>
-        <a:srgbClr val="800080"/>
-      </a:folHlink>
-    </a:clrScheme>
-    <a:fontScheme name="Office">
-      <a:majorFont>
-        <a:latin typeface="Arial"/>
-        <a:ea typeface="DejaVu Sans"/>
-        <a:cs typeface="DejaVu Sans"/>
-      </a:majorFont>
-      <a:minorFont>
-        <a:latin typeface="Arial"/>
-        <a:ea typeface="DejaVu Sans"/>
-        <a:cs typeface="DejaVu Sans"/>
-      </a:minorFont>
-    </a:fontScheme>
-    <a:fmtScheme name="Office">
-      <a:fillStyleLst>
-        <a:solidFill>
-          <a:schemeClr val="phClr"/>
-        </a:solidFill>
-        <a:gradFill rotWithShape="1">
-          <a:gsLst>
-            <a:gs pos="0">
-              <a:schemeClr val="phClr">
-                <a:tint val="50000"/>
-                <a:satMod val="300000"/>
-              </a:schemeClr>
-            </a:gs>
-            <a:gs pos="35000">
-              <a:schemeClr val="phClr">
-                <a:tint val="37000"/>
-                <a:satMod val="300000"/>
-              </a:schemeClr>
-            </a:gs>
-            <a:gs pos="100000">
-              <a:schemeClr val="phClr">
-                <a:tint val="15000"/>
-                <a:satMod val="350000"/>
-              </a:schemeClr>
-            </a:gs>
-          </a:gsLst>
-          <a:lin ang="16200000" scaled="1"/>
-        </a:gradFill>
-        <a:gradFill rotWithShape="1">
-          <a:gsLst>
-            <a:gs pos="0">
-              <a:schemeClr val="phClr">
-                <a:shade val="51000"/>
-                <a:satMod val="130000"/>
-              </a:schemeClr>
-            </a:gs>
-            <a:gs pos="80000">
-              <a:schemeClr val="phClr">
-                <a:shade val="93000"/>
-                <a:satMod val="130000"/>
-              </a:schemeClr>
-            </a:gs>
-            <a:gs pos="100000">
-              <a:schemeClr val="phClr">
-                <a:shade val="94000"/>
-                <a:satMod val="135000"/>
-              </a:schemeClr>
-            </a:gs>
-          </a:gsLst>
-          <a:lin ang="16200000" scaled="0"/>
-        </a:gradFill>
-      </a:fillStyleLst>
-      <a:lnStyleLst>
-        <a:ln w="9525" cap="flat" cmpd="sng" algn="ctr">
-          <a:solidFill>
-            <a:schemeClr val="phClr">
-              <a:shade val="95000"/>
-              <a:satMod val="105000"/>
-            </a:schemeClr>
-          </a:solidFill>
-          <a:prstDash val="solid"/>
-        </a:ln>
-        <a:ln w="25400" cap="flat" cmpd="sng" algn="ctr">
-          <a:solidFill>
-            <a:schemeClr val="phClr"/>
-          </a:solidFill>
-          <a:prstDash val="solid"/>
-        </a:ln>
-        <a:ln w="38100" cap="flat" cmpd="sng" algn="ctr">
-          <a:solidFill>
-            <a:schemeClr val="phClr"/>
-          </a:solidFill>
-          <a:prstDash val="solid"/>
-        </a:ln>
-      </a:lnStyleLst>
-      <a:effectStyleLst>
-        <a:effectStyle>
-          <a:effectLst>
-            <a:outerShdw blurRad="40000" dist="20000" dir="5400000" rotWithShape="0">
-              <a:srgbClr val="000000">
-                <a:alpha val="38000"/>
-              </a:srgbClr>
-            </a:outerShdw>
-          </a:effectLst>
-        </a:effectStyle>
-        <a:effectStyle>
-          <a:effectLst>
-            <a:outerShdw blurRad="40000" dist="23000" dir="5400000" rotWithShape="0">
-              <a:srgbClr val="000000">
-                <a:alpha val="35000"/>
-              </a:srgbClr>
-            </a:outerShdw>
-          </a:effectLst>
-        </a:effectStyle>
-        <a:effectStyle>
-          <a:effectLst>
-            <a:outerShdw blurRad="40000" dist="23000" dir="5400000" rotWithShape="0">
-              <a:srgbClr val="000000">
-                <a:alpha val="35000"/>
-              </a:srgbClr>
-            </a:outerShdw>
-          </a:effectLst>
-          <a:scene3d>
-            <a:camera prst="orthographicFront">
-              <a:rot lat="0" lon="0" rev="0"/>
-            </a:camera>
-            <a:lightRig rig="threePt" dir="t">
-              <a:rot lat="0" lon="0" rev="1200000"/>
-            </a:lightRig>
-          </a:scene3d>
-          <a:sp3d>
-            <a:bevelT w="63500" h="25400"/>
-          </a:sp3d>
-        </a:effectStyle>
-      </a:effectStyleLst>
-      <a:bgFillStyleLst>
-        <a:solidFill>
-          <a:schemeClr val="phClr"/>
-        </a:solidFill>
-        <a:gradFill rotWithShape="1">
-          <a:gsLst>
-            <a:gs pos="0">
-              <a:schemeClr val="phClr">
-                <a:tint val="40000"/>
-                <a:satMod val="350000"/>
-              </a:schemeClr>
-            </a:gs>
-            <a:gs pos="40000">
-              <a:schemeClr val="phClr">
-                <a:tint val="45000"/>
-                <a:shade val="99000"/>
-                <a:satMod val="350000"/>
-              </a:schemeClr>
-            </a:gs>
-            <a:gs pos="100000">
-              <a:schemeClr val="phClr">
-                <a:shade val="20000"/>
-                <a:satMod val="255000"/>
-              </a:schemeClr>
-            </a:gs>
-          </a:gsLst>
-          <a:path path="circle">
-            <a:fillToRect l="50000" t="-80000" r="50000" b="180000"/>
-          </a:path>
-        </a:gradFill>
-        <a:gradFill rotWithShape="1">
-          <a:gsLst>
-            <a:gs pos="0">
-              <a:schemeClr val="phClr">
-                <a:tint val="80000"/>
-                <a:satMod val="300000"/>
-              </a:schemeClr>
-            </a:gs>
-            <a:gs pos="100000">
-              <a:schemeClr val="phClr">
-                <a:shade val="30000"/>
-                <a:satMod val="200000"/>
-              </a:schemeClr>
-            </a:gs>
-          </a:gsLst>
-          <a:path path="circle">
-            <a:fillToRect l="50000" t="50000" r="50000" b="50000"/>
-          </a:path>
-        </a:gradFill>
-      </a:bgFillStyleLst>
-    </a:fmtScheme>
-  </a:themeElements>
-</a:theme>
 </file>
</xml_diff>

<commit_message>
add boxplot to ppt
</commit_message>
<xml_diff>
--- a/dviz_ppt.pptx
+++ b/dviz_ppt.pptx
@@ -23,21 +23,22 @@
     <p:sldId id="269" r:id="rId17"/>
     <p:sldId id="271" r:id="rId18"/>
     <p:sldId id="270" r:id="rId19"/>
-    <p:sldId id="272" r:id="rId20"/>
-    <p:sldId id="274" r:id="rId21"/>
-    <p:sldId id="275" r:id="rId22"/>
-    <p:sldId id="276" r:id="rId23"/>
-    <p:sldId id="286" r:id="rId24"/>
-    <p:sldId id="277" r:id="rId25"/>
-    <p:sldId id="278" r:id="rId26"/>
-    <p:sldId id="279" r:id="rId27"/>
-    <p:sldId id="288" r:id="rId28"/>
-    <p:sldId id="289" r:id="rId29"/>
-    <p:sldId id="280" r:id="rId30"/>
-    <p:sldId id="283" r:id="rId31"/>
-    <p:sldId id="287" r:id="rId32"/>
-    <p:sldId id="284" r:id="rId33"/>
-    <p:sldId id="285" r:id="rId34"/>
+    <p:sldId id="291" r:id="rId20"/>
+    <p:sldId id="272" r:id="rId21"/>
+    <p:sldId id="274" r:id="rId22"/>
+    <p:sldId id="275" r:id="rId23"/>
+    <p:sldId id="276" r:id="rId24"/>
+    <p:sldId id="286" r:id="rId25"/>
+    <p:sldId id="277" r:id="rId26"/>
+    <p:sldId id="278" r:id="rId27"/>
+    <p:sldId id="279" r:id="rId28"/>
+    <p:sldId id="288" r:id="rId29"/>
+    <p:sldId id="289" r:id="rId30"/>
+    <p:sldId id="280" r:id="rId31"/>
+    <p:sldId id="283" r:id="rId32"/>
+    <p:sldId id="287" r:id="rId33"/>
+    <p:sldId id="284" r:id="rId34"/>
+    <p:sldId id="285" r:id="rId35"/>
   </p:sldIdLst>
   <p:sldSz cx="9144000" cy="5143500" type="screen16x9"/>
   <p:notesSz cx="7772400" cy="10058400"/>
@@ -5916,16 +5917,26 @@
               </a:lnSpc>
             </a:pPr>
             <a:r>
-              <a:rPr lang="en-US" sz="3000" b="1" strike="noStrike" spc="-1">
+              <a:rPr lang="en-US" sz="3000" b="1" strike="noStrike" spc="-1" dirty="0">
                 <a:solidFill>
                   <a:srgbClr val="404041"/>
                 </a:solidFill>
                 <a:latin typeface="Arial"/>
                 <a:ea typeface="Arial"/>
               </a:rPr>
-              <a:t>Exploratory Analysis: Time series</a:t>
-            </a:r>
-            <a:endParaRPr lang="en-US" sz="3000" b="0" strike="noStrike" spc="-1">
+              <a:t>Exploratory Analysis: </a:t>
+            </a:r>
+            <a:r>
+              <a:rPr lang="en-US" sz="3000" b="1" strike="noStrike" spc="-1" dirty="0" smtClean="0">
+                <a:solidFill>
+                  <a:srgbClr val="404041"/>
+                </a:solidFill>
+                <a:latin typeface="Arial"/>
+                <a:ea typeface="Arial"/>
+              </a:rPr>
+              <a:t>Time series</a:t>
+            </a:r>
+            <a:endParaRPr lang="en-US" sz="3000" b="0" strike="noStrike" spc="-1" dirty="0">
               <a:latin typeface="Arial"/>
             </a:endParaRPr>
           </a:p>
@@ -5982,25 +5993,26 @@
       </p:sp>
       <p:pic>
         <p:nvPicPr>
-          <p:cNvPr id="129" name="Imagen 128"/>
-          <p:cNvPicPr/>
+          <p:cNvPr id="2" name="Imagen 1"/>
+          <p:cNvPicPr>
+            <a:picLocks noChangeAspect="1"/>
+          </p:cNvPicPr>
           <p:nvPr/>
         </p:nvPicPr>
         <p:blipFill>
           <a:blip r:embed="rId2"/>
-          <a:stretch/>
+          <a:stretch>
+            <a:fillRect/>
+          </a:stretch>
         </p:blipFill>
         <p:spPr>
           <a:xfrm>
-            <a:off x="2124720" y="1290960"/>
-            <a:ext cx="5686200" cy="3342960"/>
-          </a:xfrm>
-          <a:prstGeom prst="rect">
-            <a:avLst/>
-          </a:prstGeom>
-          <a:ln>
-            <a:noFill/>
-          </a:ln>
+            <a:off x="1547866" y="1393200"/>
+            <a:ext cx="5657850" cy="3343275"/>
+          </a:xfrm>
+          <a:prstGeom prst="rect">
+            <a:avLst/>
+          </a:prstGeom>
         </p:spPr>
       </p:pic>
     </p:spTree>
@@ -6057,13 +6069,13 @@
       </p:grpSpPr>
       <p:sp>
         <p:nvSpPr>
-          <p:cNvPr id="131" name="CustomShape 1"/>
+          <p:cNvPr id="127" name="CustomShape 1"/>
           <p:cNvSpPr/>
           <p:nvPr/>
         </p:nvSpPr>
         <p:spPr>
           <a:xfrm>
-            <a:off x="529920" y="389376"/>
+            <a:off x="529920" y="399240"/>
             <a:ext cx="8002080" cy="696960"/>
           </a:xfrm>
           <a:prstGeom prst="rect">
@@ -6103,17 +6115,76 @@
                 <a:latin typeface="Arial"/>
                 <a:ea typeface="Arial"/>
               </a:rPr>
-              <a:t>Exploratory Analysis: Gender ratios </a:t>
+              <a:t>Exploratory Analysis: </a:t>
+            </a:r>
+            <a:r>
+              <a:rPr lang="en-US" sz="3000" b="1" strike="noStrike" spc="-1" dirty="0" smtClean="0">
+                <a:solidFill>
+                  <a:srgbClr val="404041"/>
+                </a:solidFill>
+                <a:latin typeface="Arial"/>
+                <a:ea typeface="Arial"/>
+              </a:rPr>
+              <a:t>Boxplot</a:t>
             </a:r>
             <a:endParaRPr lang="en-US" sz="3000" b="0" strike="noStrike" spc="-1" dirty="0">
               <a:latin typeface="Arial"/>
+            </a:endParaRPr>
+          </a:p>
+        </p:txBody>
+      </p:sp>
+      <p:sp>
+        <p:nvSpPr>
+          <p:cNvPr id="128" name="TextShape 2"/>
+          <p:cNvSpPr txBox="1"/>
+          <p:nvPr/>
+        </p:nvSpPr>
+        <p:spPr>
+          <a:xfrm>
+            <a:off x="457200" y="1049760"/>
+            <a:ext cx="8046720" cy="343440"/>
+          </a:xfrm>
+          <a:prstGeom prst="rect">
+            <a:avLst/>
+          </a:prstGeom>
+          <a:noFill/>
+          <a:ln>
+            <a:noFill/>
+          </a:ln>
+        </p:spPr>
+        <p:txBody>
+          <a:bodyPr lIns="90000" tIns="45000" rIns="90000" bIns="45000"/>
+          <a:lstStyle/>
+          <a:p>
+            <a:pPr marL="216000" indent="-216000">
+              <a:buClr>
+                <a:srgbClr val="000000"/>
+              </a:buClr>
+              <a:buSzPct val="45000"/>
+              <a:buFont typeface="Wingdings" charset="2"/>
+              <a:buChar char=""/>
+            </a:pPr>
+            <a:r>
+              <a:rPr lang="en-US" sz="1800" b="0" strike="noStrike" spc="-1" dirty="0" smtClean="0">
+                <a:latin typeface="Times New Roman"/>
+              </a:rPr>
+              <a:t>Boxplots of death counts (by year) </a:t>
+            </a:r>
+            <a:r>
+              <a:rPr lang="en-US" spc="-1" dirty="0" smtClean="0">
+                <a:latin typeface="Times New Roman"/>
+              </a:rPr>
+              <a:t>for top 10 countries with most deaths</a:t>
+            </a:r>
+            <a:endParaRPr lang="en-US" sz="1800" b="0" strike="noStrike" spc="-1" dirty="0">
+              <a:latin typeface="Times New Roman"/>
             </a:endParaRPr>
           </a:p>
         </p:txBody>
       </p:sp>
       <p:pic>
         <p:nvPicPr>
-          <p:cNvPr id="2" name="Imagen 1"/>
+          <p:cNvPr id="4" name="Imagen 3"/>
           <p:cNvPicPr>
             <a:picLocks noChangeAspect="1"/>
           </p:cNvPicPr>
@@ -6127,64 +6198,20 @@
         </p:blipFill>
         <p:spPr>
           <a:xfrm>
-            <a:off x="1626474" y="1807858"/>
-            <a:ext cx="5175018" cy="2892621"/>
+            <a:off x="2254485" y="1746720"/>
+            <a:ext cx="4552950" cy="2533650"/>
           </a:xfrm>
           <a:prstGeom prst="rect">
             <a:avLst/>
           </a:prstGeom>
         </p:spPr>
       </p:pic>
-      <p:sp>
-        <p:nvSpPr>
-          <p:cNvPr id="5" name="TextShape 2"/>
-          <p:cNvSpPr txBox="1"/>
-          <p:nvPr/>
-        </p:nvSpPr>
-        <p:spPr>
-          <a:xfrm>
-            <a:off x="457200" y="1049760"/>
-            <a:ext cx="8046720" cy="343440"/>
-          </a:xfrm>
-          <a:prstGeom prst="rect">
-            <a:avLst/>
-          </a:prstGeom>
-          <a:noFill/>
-          <a:ln>
-            <a:noFill/>
-          </a:ln>
-        </p:spPr>
-        <p:txBody>
-          <a:bodyPr lIns="90000" tIns="45000" rIns="90000" bIns="45000"/>
-          <a:lstStyle/>
-          <a:p>
-            <a:pPr marL="216000" indent="-216000">
-              <a:buClr>
-                <a:srgbClr val="000000"/>
-              </a:buClr>
-              <a:buSzPct val="45000"/>
-              <a:buFont typeface="Wingdings" charset="2"/>
-              <a:buChar char=""/>
-            </a:pPr>
-            <a:r>
-              <a:rPr lang="en-US" sz="1800" b="0" strike="noStrike" spc="-1" dirty="0">
-                <a:latin typeface="Times New Roman"/>
-              </a:rPr>
-              <a:t>Number </a:t>
-            </a:r>
-            <a:r>
-              <a:rPr lang="en-US" sz="1800" b="0" strike="noStrike" spc="-1" dirty="0" smtClean="0">
-                <a:latin typeface="Times New Roman"/>
-              </a:rPr>
-              <a:t>of male and female journalists killed by year</a:t>
-            </a:r>
-            <a:endParaRPr lang="en-US" sz="1800" b="0" strike="noStrike" spc="-1" dirty="0">
-              <a:latin typeface="Times New Roman"/>
-            </a:endParaRPr>
-          </a:p>
-        </p:txBody>
-      </p:sp>
     </p:spTree>
+    <p:extLst>
+      <p:ext uri="{BB962C8B-B14F-4D97-AF65-F5344CB8AC3E}">
+        <p14:creationId xmlns:p14="http://schemas.microsoft.com/office/powerpoint/2010/main" val="104611294"/>
+      </p:ext>
+    </p:extLst>
   </p:cSld>
   <p:clrMapOvr>
     <a:masterClrMapping/>
@@ -6238,13 +6265,13 @@
       </p:grpSpPr>
       <p:sp>
         <p:nvSpPr>
-          <p:cNvPr id="133" name="CustomShape 1"/>
+          <p:cNvPr id="131" name="CustomShape 1"/>
           <p:cNvSpPr/>
           <p:nvPr/>
         </p:nvSpPr>
         <p:spPr>
           <a:xfrm>
-            <a:off x="529920" y="759240"/>
+            <a:off x="529920" y="389376"/>
             <a:ext cx="8002080" cy="696960"/>
           </a:xfrm>
           <a:prstGeom prst="rect">
@@ -6284,17 +6311,7 @@
                 <a:latin typeface="Arial"/>
                 <a:ea typeface="Arial"/>
               </a:rPr>
-              <a:t>Exploratory </a:t>
-            </a:r>
-            <a:r>
-              <a:rPr lang="en-US" sz="3000" b="1" strike="noStrike" spc="-1" dirty="0" smtClean="0">
-                <a:solidFill>
-                  <a:srgbClr val="404041"/>
-                </a:solidFill>
-                <a:latin typeface="Arial"/>
-                <a:ea typeface="Arial"/>
-              </a:rPr>
-              <a:t>Analysis: Type of Death</a:t>
+              <a:t>Exploratory Analysis: Gender ratios </a:t>
             </a:r>
             <a:endParaRPr lang="en-US" sz="3000" b="0" strike="noStrike" spc="-1" dirty="0">
               <a:latin typeface="Arial"/>
@@ -6304,7 +6321,7 @@
       </p:sp>
       <p:pic>
         <p:nvPicPr>
-          <p:cNvPr id="3" name="Imagen 2"/>
+          <p:cNvPr id="2" name="Imagen 1"/>
           <p:cNvPicPr>
             <a:picLocks noChangeAspect="1"/>
           </p:cNvPicPr>
@@ -6318,8 +6335,8 @@
         </p:blipFill>
         <p:spPr>
           <a:xfrm>
-            <a:off x="1332910" y="2361804"/>
-            <a:ext cx="5286375" cy="1428750"/>
+            <a:off x="1626474" y="1807858"/>
+            <a:ext cx="5175018" cy="2892621"/>
           </a:xfrm>
           <a:prstGeom prst="rect">
             <a:avLst/>
@@ -6334,7 +6351,7 @@
         </p:nvSpPr>
         <p:spPr>
           <a:xfrm>
-            <a:off x="457200" y="1388802"/>
+            <a:off x="457200" y="1049760"/>
             <a:ext cx="8046720" cy="343440"/>
           </a:xfrm>
           <a:prstGeom prst="rect">
@@ -6358,10 +6375,16 @@
               <a:buChar char=""/>
             </a:pPr>
             <a:r>
+              <a:rPr lang="en-US" sz="1800" b="0" strike="noStrike" spc="-1" dirty="0">
+                <a:latin typeface="Times New Roman"/>
+              </a:rPr>
+              <a:t>Number </a:t>
+            </a:r>
+            <a:r>
               <a:rPr lang="en-US" sz="1800" b="0" strike="noStrike" spc="-1" dirty="0" smtClean="0">
                 <a:latin typeface="Times New Roman"/>
               </a:rPr>
-              <a:t>Type of deaths by year</a:t>
+              <a:t>of male and female journalists killed by year</a:t>
             </a:r>
             <a:endParaRPr lang="en-US" sz="1800" b="0" strike="noStrike" spc="-1" dirty="0">
               <a:latin typeface="Times New Roman"/>
@@ -6649,13 +6672,13 @@
       </p:grpSpPr>
       <p:sp>
         <p:nvSpPr>
-          <p:cNvPr id="134" name="CustomShape 1"/>
+          <p:cNvPr id="133" name="CustomShape 1"/>
           <p:cNvSpPr/>
           <p:nvPr/>
         </p:nvSpPr>
         <p:spPr>
           <a:xfrm>
-            <a:off x="529920" y="478683"/>
+            <a:off x="529920" y="759240"/>
             <a:ext cx="8002080" cy="696960"/>
           </a:xfrm>
           <a:prstGeom prst="rect">
@@ -6705,7 +6728,7 @@
                 <a:latin typeface="Arial"/>
                 <a:ea typeface="Arial"/>
               </a:rPr>
-              <a:t>Analysis: Freelance</a:t>
+              <a:t>Analysis: Type of Death</a:t>
             </a:r>
             <a:endParaRPr lang="en-US" sz="3000" b="0" strike="noStrike" spc="-1" dirty="0">
               <a:latin typeface="Arial"/>
@@ -6729,14 +6752,57 @@
         </p:blipFill>
         <p:spPr>
           <a:xfrm>
-            <a:off x="1411523" y="1490355"/>
-            <a:ext cx="5768596" cy="3214561"/>
+            <a:off x="1332910" y="2361804"/>
+            <a:ext cx="5286375" cy="1428750"/>
           </a:xfrm>
           <a:prstGeom prst="rect">
             <a:avLst/>
           </a:prstGeom>
         </p:spPr>
       </p:pic>
+      <p:sp>
+        <p:nvSpPr>
+          <p:cNvPr id="5" name="TextShape 2"/>
+          <p:cNvSpPr txBox="1"/>
+          <p:nvPr/>
+        </p:nvSpPr>
+        <p:spPr>
+          <a:xfrm>
+            <a:off x="457200" y="1388802"/>
+            <a:ext cx="8046720" cy="343440"/>
+          </a:xfrm>
+          <a:prstGeom prst="rect">
+            <a:avLst/>
+          </a:prstGeom>
+          <a:noFill/>
+          <a:ln>
+            <a:noFill/>
+          </a:ln>
+        </p:spPr>
+        <p:txBody>
+          <a:bodyPr lIns="90000" tIns="45000" rIns="90000" bIns="45000"/>
+          <a:lstStyle/>
+          <a:p>
+            <a:pPr marL="216000" indent="-216000">
+              <a:buClr>
+                <a:srgbClr val="000000"/>
+              </a:buClr>
+              <a:buSzPct val="45000"/>
+              <a:buFont typeface="Wingdings" charset="2"/>
+              <a:buChar char=""/>
+            </a:pPr>
+            <a:r>
+              <a:rPr lang="en-US" sz="1800" b="0" strike="noStrike" spc="-1" dirty="0" smtClean="0">
+                <a:latin typeface="Times New Roman"/>
+              </a:rPr>
+              <a:t>Type of deaths by year</a:t>
+            </a:r>
+            <a:endParaRPr lang="en-US" sz="1800" b="0" strike="noStrike" spc="-1" dirty="0">
+              <a:latin typeface="Times New Roman"/>
+            </a:endParaRPr>
+          </a:p>
+        </p:txBody>
+      </p:sp>
     </p:spTree>
   </p:cSld>
   <p:clrMapOvr>
@@ -6791,13 +6857,13 @@
       </p:grpSpPr>
       <p:sp>
         <p:nvSpPr>
-          <p:cNvPr id="135" name="CustomShape 1"/>
+          <p:cNvPr id="134" name="CustomShape 1"/>
           <p:cNvSpPr/>
           <p:nvPr/>
         </p:nvSpPr>
         <p:spPr>
           <a:xfrm>
-            <a:off x="529920" y="759240"/>
+            <a:off x="529920" y="478683"/>
             <a:ext cx="8002080" cy="696960"/>
           </a:xfrm>
           <a:prstGeom prst="rect">
@@ -6837,7 +6903,7 @@
                 <a:latin typeface="Arial"/>
                 <a:ea typeface="Arial"/>
               </a:rPr>
-              <a:t>Exploratory Analysis</a:t>
+              <a:t>Exploratory </a:t>
             </a:r>
             <a:r>
               <a:rPr lang="en-US" sz="3000" b="1" strike="noStrike" spc="-1" dirty="0" smtClean="0">
@@ -6847,7 +6913,7 @@
                 <a:latin typeface="Arial"/>
                 <a:ea typeface="Arial"/>
               </a:rPr>
-              <a:t>: Local</a:t>
+              <a:t>Analysis: Freelance</a:t>
             </a:r>
             <a:endParaRPr lang="en-US" sz="3000" b="0" strike="noStrike" spc="-1" dirty="0">
               <a:latin typeface="Arial"/>
@@ -6857,7 +6923,7 @@
       </p:sp>
       <p:pic>
         <p:nvPicPr>
-          <p:cNvPr id="2" name="Imagen 1"/>
+          <p:cNvPr id="3" name="Imagen 2"/>
           <p:cNvPicPr>
             <a:picLocks noChangeAspect="1"/>
           </p:cNvPicPr>
@@ -6871,8 +6937,8 @@
         </p:blipFill>
         <p:spPr>
           <a:xfrm>
-            <a:off x="1824572" y="2306783"/>
-            <a:ext cx="5412775" cy="1341726"/>
+            <a:off x="1411523" y="1490355"/>
+            <a:ext cx="5768596" cy="3214561"/>
           </a:xfrm>
           <a:prstGeom prst="rect">
             <a:avLst/>
@@ -6939,7 +7005,7 @@
         </p:nvSpPr>
         <p:spPr>
           <a:xfrm>
-            <a:off x="529919" y="270863"/>
+            <a:off x="529920" y="759240"/>
             <a:ext cx="8002080" cy="696960"/>
           </a:xfrm>
           <a:prstGeom prst="rect">
@@ -6989,7 +7055,7 @@
                 <a:latin typeface="Arial"/>
                 <a:ea typeface="Arial"/>
               </a:rPr>
-              <a:t>: Impunity of Murder</a:t>
+              <a:t>: Local</a:t>
             </a:r>
             <a:endParaRPr lang="en-US" sz="3000" b="0" strike="noStrike" spc="-1" dirty="0">
               <a:latin typeface="Arial"/>
@@ -6999,7 +7065,7 @@
       </p:sp>
       <p:pic>
         <p:nvPicPr>
-          <p:cNvPr id="3" name="Imagen 2"/>
+          <p:cNvPr id="2" name="Imagen 1"/>
           <p:cNvPicPr>
             <a:picLocks noChangeAspect="1"/>
           </p:cNvPicPr>
@@ -7013,8 +7079,8 @@
         </p:blipFill>
         <p:spPr>
           <a:xfrm>
-            <a:off x="1431915" y="1402597"/>
-            <a:ext cx="6198088" cy="3146456"/>
+            <a:off x="1824572" y="2306783"/>
+            <a:ext cx="5412775" cy="1341726"/>
           </a:xfrm>
           <a:prstGeom prst="rect">
             <a:avLst/>
@@ -7022,11 +7088,6 @@
         </p:spPr>
       </p:pic>
     </p:spTree>
-    <p:extLst>
-      <p:ext uri="{BB962C8B-B14F-4D97-AF65-F5344CB8AC3E}">
-        <p14:creationId xmlns:p14="http://schemas.microsoft.com/office/powerpoint/2010/main" val="4072888775"/>
-      </p:ext>
-    </p:extLst>
   </p:cSld>
   <p:clrMapOvr>
     <a:masterClrMapping/>
@@ -7080,13 +7141,13 @@
       </p:grpSpPr>
       <p:sp>
         <p:nvSpPr>
-          <p:cNvPr id="136" name="CustomShape 1"/>
+          <p:cNvPr id="135" name="CustomShape 1"/>
           <p:cNvSpPr/>
           <p:nvPr/>
         </p:nvSpPr>
         <p:spPr>
           <a:xfrm>
-            <a:off x="529920" y="759240"/>
+            <a:off x="529919" y="270863"/>
             <a:ext cx="8002080" cy="696960"/>
           </a:xfrm>
           <a:prstGeom prst="rect">
@@ -7119,16 +7180,26 @@
               </a:lnSpc>
             </a:pPr>
             <a:r>
-              <a:rPr lang="en-US" sz="3000" b="1" strike="noStrike" spc="-1">
+              <a:rPr lang="en-US" sz="3000" b="1" strike="noStrike" spc="-1" dirty="0">
                 <a:solidFill>
                   <a:srgbClr val="404041"/>
                 </a:solidFill>
                 <a:latin typeface="Arial"/>
                 <a:ea typeface="Arial"/>
               </a:rPr>
-              <a:t>Data Map: Country Codes</a:t>
-            </a:r>
-            <a:endParaRPr lang="en-US" sz="3000" b="0" strike="noStrike" spc="-1">
+              <a:t>Exploratory Analysis</a:t>
+            </a:r>
+            <a:r>
+              <a:rPr lang="en-US" sz="3000" b="1" strike="noStrike" spc="-1" dirty="0" smtClean="0">
+                <a:solidFill>
+                  <a:srgbClr val="404041"/>
+                </a:solidFill>
+                <a:latin typeface="Arial"/>
+                <a:ea typeface="Arial"/>
+              </a:rPr>
+              <a:t>: Impunity of Murder</a:t>
+            </a:r>
+            <a:endParaRPr lang="en-US" sz="3000" b="0" strike="noStrike" spc="-1" dirty="0">
               <a:latin typeface="Arial"/>
             </a:endParaRPr>
           </a:p>
@@ -7136,7 +7207,7 @@
       </p:sp>
       <p:pic>
         <p:nvPicPr>
-          <p:cNvPr id="2" name="Imagen 1"/>
+          <p:cNvPr id="3" name="Imagen 2"/>
           <p:cNvPicPr>
             <a:picLocks noChangeAspect="1"/>
           </p:cNvPicPr>
@@ -7150,8 +7221,8 @@
         </p:blipFill>
         <p:spPr>
           <a:xfrm>
-            <a:off x="1053812" y="1456200"/>
-            <a:ext cx="5581650" cy="2962275"/>
+            <a:off x="1431915" y="1402597"/>
+            <a:ext cx="6198088" cy="3146456"/>
           </a:xfrm>
           <a:prstGeom prst="rect">
             <a:avLst/>
@@ -7159,6 +7230,11 @@
         </p:spPr>
       </p:pic>
     </p:spTree>
+    <p:extLst>
+      <p:ext uri="{BB962C8B-B14F-4D97-AF65-F5344CB8AC3E}">
+        <p14:creationId xmlns:p14="http://schemas.microsoft.com/office/powerpoint/2010/main" val="4072888775"/>
+      </p:ext>
+    </p:extLst>
   </p:cSld>
   <p:clrMapOvr>
     <a:masterClrMapping/>
@@ -7212,13 +7288,13 @@
       </p:grpSpPr>
       <p:sp>
         <p:nvSpPr>
-          <p:cNvPr id="137" name="CustomShape 1"/>
+          <p:cNvPr id="136" name="CustomShape 1"/>
           <p:cNvSpPr/>
           <p:nvPr/>
         </p:nvSpPr>
         <p:spPr>
           <a:xfrm>
-            <a:off x="529920" y="73434"/>
+            <a:off x="529920" y="759240"/>
             <a:ext cx="8002080" cy="696960"/>
           </a:xfrm>
           <a:prstGeom prst="rect">
@@ -7251,16 +7327,16 @@
               </a:lnSpc>
             </a:pPr>
             <a:r>
-              <a:rPr lang="en-US" sz="3000" b="1" strike="noStrike" spc="-1" dirty="0">
+              <a:rPr lang="en-US" sz="3000" b="1" strike="noStrike" spc="-1">
                 <a:solidFill>
                   <a:srgbClr val="404041"/>
                 </a:solidFill>
                 <a:latin typeface="Arial"/>
                 <a:ea typeface="Arial"/>
               </a:rPr>
-              <a:t>Data Map: 1992 - 2016</a:t>
-            </a:r>
-            <a:endParaRPr lang="en-US" sz="3000" b="0" strike="noStrike" spc="-1" dirty="0">
+              <a:t>Data Map: Country Codes</a:t>
+            </a:r>
+            <a:endParaRPr lang="en-US" sz="3000" b="0" strike="noStrike" spc="-1">
               <a:latin typeface="Arial"/>
             </a:endParaRPr>
           </a:p>
@@ -7268,7 +7344,7 @@
       </p:sp>
       <p:pic>
         <p:nvPicPr>
-          <p:cNvPr id="5" name="Imagen 4"/>
+          <p:cNvPr id="2" name="Imagen 1"/>
           <p:cNvPicPr>
             <a:picLocks noChangeAspect="1"/>
           </p:cNvPicPr>
@@ -7282,8 +7358,8 @@
         </p:blipFill>
         <p:spPr>
           <a:xfrm>
-            <a:off x="961548" y="976045"/>
-            <a:ext cx="7162514" cy="3683131"/>
+            <a:off x="1053812" y="1456200"/>
+            <a:ext cx="5581650" cy="2962275"/>
           </a:xfrm>
           <a:prstGeom prst="rect">
             <a:avLst/>
@@ -7344,13 +7420,13 @@
       </p:grpSpPr>
       <p:sp>
         <p:nvSpPr>
-          <p:cNvPr id="138" name="CustomShape 1"/>
+          <p:cNvPr id="137" name="CustomShape 1"/>
           <p:cNvSpPr/>
           <p:nvPr/>
         </p:nvSpPr>
         <p:spPr>
           <a:xfrm>
-            <a:off x="529920" y="260472"/>
+            <a:off x="529920" y="73434"/>
             <a:ext cx="8002080" cy="696960"/>
           </a:xfrm>
           <a:prstGeom prst="rect">
@@ -7390,17 +7466,7 @@
                 <a:latin typeface="Arial"/>
                 <a:ea typeface="Arial"/>
               </a:rPr>
-              <a:t>Data </a:t>
-            </a:r>
-            <a:r>
-              <a:rPr lang="en-US" sz="3000" b="1" strike="noStrike" spc="-1" dirty="0" smtClean="0">
-                <a:solidFill>
-                  <a:srgbClr val="404041"/>
-                </a:solidFill>
-                <a:latin typeface="Arial"/>
-                <a:ea typeface="Arial"/>
-              </a:rPr>
-              <a:t>Map:2006 Philippines massacre</a:t>
+              <a:t>Data Map: 1992 - 2016</a:t>
             </a:r>
             <a:endParaRPr lang="en-US" sz="3000" b="0" strike="noStrike" spc="-1" dirty="0">
               <a:latin typeface="Arial"/>
@@ -7410,7 +7476,7 @@
       </p:sp>
       <p:pic>
         <p:nvPicPr>
-          <p:cNvPr id="3" name="Imagen 2"/>
+          <p:cNvPr id="5" name="Imagen 4"/>
           <p:cNvPicPr>
             <a:picLocks noChangeAspect="1"/>
           </p:cNvPicPr>
@@ -7424,8 +7490,8 @@
         </p:blipFill>
         <p:spPr>
           <a:xfrm>
-            <a:off x="1062471" y="882311"/>
-            <a:ext cx="7229475" cy="3827369"/>
+            <a:off x="961548" y="976045"/>
+            <a:ext cx="7162514" cy="3683131"/>
           </a:xfrm>
           <a:prstGeom prst="rect">
             <a:avLst/>
@@ -7542,27 +7608,7 @@
                 <a:latin typeface="Arial"/>
                 <a:ea typeface="Arial"/>
               </a:rPr>
-              <a:t>Map:2012 rise of deaths in </a:t>
-            </a:r>
-            <a:r>
-              <a:rPr lang="en-US" sz="3000" b="1" spc="-1" dirty="0">
-                <a:solidFill>
-                  <a:srgbClr val="404041"/>
-                </a:solidFill>
-                <a:latin typeface="Arial"/>
-                <a:ea typeface="Arial"/>
-              </a:rPr>
-              <a:t>S</a:t>
-            </a:r>
-            <a:r>
-              <a:rPr lang="en-US" sz="3000" b="1" strike="noStrike" spc="-1" dirty="0" smtClean="0">
-                <a:solidFill>
-                  <a:srgbClr val="404041"/>
-                </a:solidFill>
-                <a:latin typeface="Arial"/>
-                <a:ea typeface="Arial"/>
-              </a:rPr>
-              <a:t>yria</a:t>
+              <a:t>Map:2006 Philippines massacre</a:t>
             </a:r>
             <a:endParaRPr lang="en-US" sz="3000" b="0" strike="noStrike" spc="-1" dirty="0">
               <a:latin typeface="Arial"/>
@@ -7572,7 +7618,7 @@
       </p:sp>
       <p:pic>
         <p:nvPicPr>
-          <p:cNvPr id="4" name="Imagen 3"/>
+          <p:cNvPr id="3" name="Imagen 2"/>
           <p:cNvPicPr>
             <a:picLocks noChangeAspect="1"/>
           </p:cNvPicPr>
@@ -7586,8 +7632,8 @@
         </p:blipFill>
         <p:spPr>
           <a:xfrm>
-            <a:off x="1048923" y="1060613"/>
-            <a:ext cx="6964074" cy="3591916"/>
+            <a:off x="1062471" y="882311"/>
+            <a:ext cx="7229475" cy="3827369"/>
           </a:xfrm>
           <a:prstGeom prst="rect">
             <a:avLst/>
@@ -7595,11 +7641,6 @@
         </p:spPr>
       </p:pic>
     </p:spTree>
-    <p:extLst>
-      <p:ext uri="{BB962C8B-B14F-4D97-AF65-F5344CB8AC3E}">
-        <p14:creationId xmlns:p14="http://schemas.microsoft.com/office/powerpoint/2010/main" val="2878631577"/>
-      </p:ext>
-    </p:extLst>
   </p:cSld>
   <p:clrMapOvr>
     <a:masterClrMapping/>
@@ -7659,7 +7700,7 @@
         </p:nvSpPr>
         <p:spPr>
           <a:xfrm>
-            <a:off x="529920" y="146171"/>
+            <a:off x="529920" y="260472"/>
             <a:ext cx="8002080" cy="696960"/>
           </a:xfrm>
           <a:prstGeom prst="rect">
@@ -7709,17 +7750,27 @@
                 <a:latin typeface="Arial"/>
                 <a:ea typeface="Arial"/>
               </a:rPr>
-              <a:t>Map:1995 Algerian Civi</a:t>
-            </a:r>
-            <a:r>
-              <a:rPr lang="en-US" sz="3000" b="1" spc="-1" dirty="0" smtClean="0">
+              <a:t>Map:2012 rise of deaths in </a:t>
+            </a:r>
+            <a:r>
+              <a:rPr lang="en-US" sz="3000" b="1" spc="-1" dirty="0">
                 <a:solidFill>
                   <a:srgbClr val="404041"/>
                 </a:solidFill>
                 <a:latin typeface="Arial"/>
                 <a:ea typeface="Arial"/>
               </a:rPr>
-              <a:t>l War</a:t>
+              <a:t>S</a:t>
+            </a:r>
+            <a:r>
+              <a:rPr lang="en-US" sz="3000" b="1" strike="noStrike" spc="-1" dirty="0" smtClean="0">
+                <a:solidFill>
+                  <a:srgbClr val="404041"/>
+                </a:solidFill>
+                <a:latin typeface="Arial"/>
+                <a:ea typeface="Arial"/>
+              </a:rPr>
+              <a:t>yria</a:t>
             </a:r>
             <a:endParaRPr lang="en-US" sz="3000" b="0" strike="noStrike" spc="-1" dirty="0">
               <a:latin typeface="Arial"/>
@@ -7729,7 +7780,7 @@
       </p:sp>
       <p:pic>
         <p:nvPicPr>
-          <p:cNvPr id="2" name="Imagen 1"/>
+          <p:cNvPr id="4" name="Imagen 3"/>
           <p:cNvPicPr>
             <a:picLocks noChangeAspect="1"/>
           </p:cNvPicPr>
@@ -7743,8 +7794,8 @@
         </p:blipFill>
         <p:spPr>
           <a:xfrm>
-            <a:off x="998393" y="947041"/>
-            <a:ext cx="7366289" cy="3755679"/>
+            <a:off x="1048923" y="1060613"/>
+            <a:ext cx="6964074" cy="3591916"/>
           </a:xfrm>
           <a:prstGeom prst="rect">
             <a:avLst/>
@@ -7754,7 +7805,7 @@
     </p:spTree>
     <p:extLst>
       <p:ext uri="{BB962C8B-B14F-4D97-AF65-F5344CB8AC3E}">
-        <p14:creationId xmlns:p14="http://schemas.microsoft.com/office/powerpoint/2010/main" val="2116996356"/>
+        <p14:creationId xmlns:p14="http://schemas.microsoft.com/office/powerpoint/2010/main" val="2878631577"/>
       </p:ext>
     </p:extLst>
   </p:cSld>
@@ -7810,13 +7861,13 @@
       </p:grpSpPr>
       <p:sp>
         <p:nvSpPr>
-          <p:cNvPr id="139" name="CustomShape 1"/>
+          <p:cNvPr id="138" name="CustomShape 1"/>
           <p:cNvSpPr/>
           <p:nvPr/>
         </p:nvSpPr>
         <p:spPr>
           <a:xfrm>
-            <a:off x="529920" y="142797"/>
+            <a:off x="529920" y="146171"/>
             <a:ext cx="8002080" cy="696960"/>
           </a:xfrm>
           <a:prstGeom prst="rect">
@@ -7856,7 +7907,27 @@
                 <a:latin typeface="Arial"/>
                 <a:ea typeface="Arial"/>
               </a:rPr>
-              <a:t>Network Graph: 1992-2016</a:t>
+              <a:t>Data </a:t>
+            </a:r>
+            <a:r>
+              <a:rPr lang="en-US" sz="3000" b="1" strike="noStrike" spc="-1" dirty="0" smtClean="0">
+                <a:solidFill>
+                  <a:srgbClr val="404041"/>
+                </a:solidFill>
+                <a:latin typeface="Arial"/>
+                <a:ea typeface="Arial"/>
+              </a:rPr>
+              <a:t>Map:1995 Algerian Civi</a:t>
+            </a:r>
+            <a:r>
+              <a:rPr lang="en-US" sz="3000" b="1" spc="-1" dirty="0" smtClean="0">
+                <a:solidFill>
+                  <a:srgbClr val="404041"/>
+                </a:solidFill>
+                <a:latin typeface="Arial"/>
+                <a:ea typeface="Arial"/>
+              </a:rPr>
+              <a:t>l War</a:t>
             </a:r>
             <a:endParaRPr lang="en-US" sz="3000" b="0" strike="noStrike" spc="-1" dirty="0">
               <a:latin typeface="Arial"/>
@@ -7880,44 +7951,20 @@
         </p:blipFill>
         <p:spPr>
           <a:xfrm>
-            <a:off x="1664277" y="1528118"/>
-            <a:ext cx="4518314" cy="3180838"/>
+            <a:off x="998393" y="947041"/>
+            <a:ext cx="7366289" cy="3755679"/>
           </a:xfrm>
           <a:prstGeom prst="rect">
             <a:avLst/>
           </a:prstGeom>
         </p:spPr>
       </p:pic>
-      <p:sp>
-        <p:nvSpPr>
-          <p:cNvPr id="3" name="CuadroTexto 2"/>
-          <p:cNvSpPr txBox="1"/>
-          <p:nvPr/>
-        </p:nvSpPr>
-        <p:spPr>
-          <a:xfrm>
-            <a:off x="1664277" y="878130"/>
-            <a:ext cx="5768138" cy="369332"/>
-          </a:xfrm>
-          <a:prstGeom prst="rect">
-            <a:avLst/>
-          </a:prstGeom>
-          <a:noFill/>
-        </p:spPr>
-        <p:txBody>
-          <a:bodyPr wrap="square" rtlCol="0">
-            <a:spAutoFit/>
-          </a:bodyPr>
-          <a:lstStyle/>
-          <a:p>
-            <a:r>
-              <a:rPr lang="en-US" dirty="0" smtClean="0"/>
-              <a:t>Network of Journalists and coverage</a:t>
-            </a:r>
-          </a:p>
-        </p:txBody>
-      </p:sp>
     </p:spTree>
+    <p:extLst>
+      <p:ext uri="{BB962C8B-B14F-4D97-AF65-F5344CB8AC3E}">
+        <p14:creationId xmlns:p14="http://schemas.microsoft.com/office/powerpoint/2010/main" val="2116996356"/>
+      </p:ext>
+    </p:extLst>
   </p:cSld>
   <p:clrMapOvr>
     <a:masterClrMapping/>
@@ -7971,13 +8018,13 @@
       </p:grpSpPr>
       <p:sp>
         <p:nvSpPr>
-          <p:cNvPr id="142" name="CustomShape 1"/>
+          <p:cNvPr id="139" name="CustomShape 1"/>
           <p:cNvSpPr/>
           <p:nvPr/>
         </p:nvSpPr>
         <p:spPr>
           <a:xfrm>
-            <a:off x="529920" y="759240"/>
+            <a:off x="529920" y="142797"/>
             <a:ext cx="8002080" cy="696960"/>
           </a:xfrm>
           <a:prstGeom prst="rect">
@@ -8010,14 +8057,14 @@
               </a:lnSpc>
             </a:pPr>
             <a:r>
-              <a:rPr lang="en-US" sz="3000" b="1" strike="noStrike" spc="-1" dirty="0" smtClean="0">
+              <a:rPr lang="en-US" sz="3000" b="1" strike="noStrike" spc="-1" dirty="0">
                 <a:solidFill>
                   <a:srgbClr val="404041"/>
                 </a:solidFill>
                 <a:latin typeface="Arial"/>
                 <a:ea typeface="Arial"/>
               </a:rPr>
-              <a:t>Demo</a:t>
+              <a:t>Network Graph: 1992-2016</a:t>
             </a:r>
             <a:endParaRPr lang="en-US" sz="3000" b="0" strike="noStrike" spc="-1" dirty="0">
               <a:latin typeface="Arial"/>
@@ -8025,6 +8072,30 @@
           </a:p>
         </p:txBody>
       </p:sp>
+      <p:pic>
+        <p:nvPicPr>
+          <p:cNvPr id="2" name="Imagen 1"/>
+          <p:cNvPicPr>
+            <a:picLocks noChangeAspect="1"/>
+          </p:cNvPicPr>
+          <p:nvPr/>
+        </p:nvPicPr>
+        <p:blipFill>
+          <a:blip r:embed="rId2"/>
+          <a:stretch>
+            <a:fillRect/>
+          </a:stretch>
+        </p:blipFill>
+        <p:spPr>
+          <a:xfrm>
+            <a:off x="1664277" y="1528118"/>
+            <a:ext cx="4518314" cy="3180838"/>
+          </a:xfrm>
+          <a:prstGeom prst="rect">
+            <a:avLst/>
+          </a:prstGeom>
+        </p:spPr>
+      </p:pic>
       <p:sp>
         <p:nvSpPr>
           <p:cNvPr id="3" name="CuadroTexto 2"/>
@@ -8033,8 +8104,8 @@
         </p:nvSpPr>
         <p:spPr>
           <a:xfrm>
-            <a:off x="519645" y="1628144"/>
-            <a:ext cx="6353765" cy="369332"/>
+            <a:off x="1664277" y="878130"/>
+            <a:ext cx="5768138" cy="369332"/>
           </a:xfrm>
           <a:prstGeom prst="rect">
             <a:avLst/>
@@ -8048,14 +8119,8 @@
           <a:lstStyle/>
           <a:p>
             <a:r>
-              <a:rPr lang="en-US" dirty="0" smtClean="0">
-                <a:hlinkClick r:id="rId2"/>
-              </a:rPr>
-              <a:t>Webpage</a:t>
-            </a:r>
-            <a:r>
               <a:rPr lang="en-US" dirty="0" smtClean="0"/>
-              <a:t>: https://seashiva94.github.io/data_viz_project/</a:t>
+              <a:t>Network of Journalists and coverage</a:t>
             </a:r>
           </a:p>
         </p:txBody>
@@ -8378,31 +8443,31 @@
               </a:lnSpc>
             </a:pPr>
             <a:r>
-              <a:rPr lang="en-US" sz="3000" b="1" strike="noStrike" spc="-1">
+              <a:rPr lang="en-US" sz="3000" b="1" strike="noStrike" spc="-1" dirty="0" smtClean="0">
                 <a:solidFill>
                   <a:srgbClr val="404041"/>
                 </a:solidFill>
                 <a:latin typeface="Arial"/>
                 <a:ea typeface="Arial"/>
               </a:rPr>
-              <a:t>Challenges</a:t>
-            </a:r>
-            <a:endParaRPr lang="en-US" sz="3000" b="0" strike="noStrike" spc="-1">
-              <a:latin typeface="Arial"/>
-            </a:endParaRPr>
-          </a:p>
-        </p:txBody>
-      </p:sp>
-      <p:sp>
-        <p:nvSpPr>
-          <p:cNvPr id="4" name="CuadroTexto 3"/>
+              <a:t>Demo</a:t>
+            </a:r>
+            <a:endParaRPr lang="en-US" sz="3000" b="0" strike="noStrike" spc="-1" dirty="0">
+              <a:latin typeface="Arial"/>
+            </a:endParaRPr>
+          </a:p>
+        </p:txBody>
+      </p:sp>
+      <p:sp>
+        <p:nvSpPr>
+          <p:cNvPr id="3" name="CuadroTexto 2"/>
           <p:cNvSpPr txBox="1"/>
           <p:nvPr/>
         </p:nvSpPr>
         <p:spPr>
           <a:xfrm>
             <a:off x="519645" y="1628144"/>
-            <a:ext cx="7021586" cy="1477328"/>
+            <a:ext cx="6353765" cy="369332"/>
           </a:xfrm>
           <a:prstGeom prst="rect">
             <a:avLst/>
@@ -8415,74 +8480,20 @@
           </a:bodyPr>
           <a:lstStyle/>
           <a:p>
-            <a:pPr marL="285750" indent="-285750">
-              <a:buFont typeface="Arial" panose="020B0604020202020204" pitchFamily="34" charset="0"/>
-              <a:buChar char="•"/>
-            </a:pPr>
+            <a:r>
+              <a:rPr lang="en-US" dirty="0" smtClean="0">
+                <a:hlinkClick r:id="rId2"/>
+              </a:rPr>
+              <a:t>Webpage</a:t>
+            </a:r>
             <a:r>
               <a:rPr lang="en-US" dirty="0" smtClean="0"/>
-              <a:t>Learning to make interactive maps in </a:t>
-            </a:r>
-            <a:r>
-              <a:rPr lang="en-US" dirty="0" err="1" smtClean="0"/>
-              <a:t>altair</a:t>
-            </a:r>
-            <a:endParaRPr lang="en-US" dirty="0"/>
-          </a:p>
-          <a:p>
-            <a:pPr marL="742950" lvl="1" indent="-285750">
-              <a:buFont typeface="Arial" panose="020B0604020202020204" pitchFamily="34" charset="0"/>
-              <a:buChar char="•"/>
-            </a:pPr>
-            <a:r>
-              <a:rPr lang="en-US" dirty="0" smtClean="0"/>
-              <a:t>Maps do not support some common functionality</a:t>
-            </a:r>
-          </a:p>
-          <a:p>
-            <a:pPr marL="285750" indent="-285750">
-              <a:buFont typeface="Arial" panose="020B0604020202020204" pitchFamily="34" charset="0"/>
-              <a:buChar char="•"/>
-            </a:pPr>
-            <a:endParaRPr lang="en-US" dirty="0"/>
-          </a:p>
-          <a:p>
-            <a:pPr marL="285750" indent="-285750">
-              <a:buFont typeface="Arial" panose="020B0604020202020204" pitchFamily="34" charset="0"/>
-              <a:buChar char="•"/>
-            </a:pPr>
-            <a:r>
-              <a:rPr lang="en-US" dirty="0" smtClean="0"/>
-              <a:t>Slider for year selection in python did not work</a:t>
-            </a:r>
-          </a:p>
-          <a:p>
-            <a:pPr marL="742950" lvl="1" indent="-285750">
-              <a:buFont typeface="Arial" panose="020B0604020202020204" pitchFamily="34" charset="0"/>
-              <a:buChar char="•"/>
-            </a:pPr>
-            <a:r>
-              <a:rPr lang="en-US" dirty="0" smtClean="0"/>
-              <a:t>Used </a:t>
-            </a:r>
-            <a:r>
-              <a:rPr lang="en-US" dirty="0" err="1" smtClean="0"/>
-              <a:t>jquery</a:t>
-            </a:r>
-            <a:r>
-              <a:rPr lang="en-US" dirty="0" smtClean="0"/>
-              <a:t> in the end</a:t>
-            </a:r>
-            <a:endParaRPr lang="en-US" dirty="0"/>
+              <a:t>: https://seashiva94.github.io/data_viz_project/</a:t>
+            </a:r>
           </a:p>
         </p:txBody>
       </p:sp>
     </p:spTree>
-    <p:extLst>
-      <p:ext uri="{BB962C8B-B14F-4D97-AF65-F5344CB8AC3E}">
-        <p14:creationId xmlns:p14="http://schemas.microsoft.com/office/powerpoint/2010/main" val="3095711716"/>
-      </p:ext>
-    </p:extLst>
   </p:cSld>
   <p:clrMapOvr>
     <a:masterClrMapping/>
@@ -8536,6 +8547,203 @@
       </p:grpSpPr>
       <p:sp>
         <p:nvSpPr>
+          <p:cNvPr id="142" name="CustomShape 1"/>
+          <p:cNvSpPr/>
+          <p:nvPr/>
+        </p:nvSpPr>
+        <p:spPr>
+          <a:xfrm>
+            <a:off x="529920" y="759240"/>
+            <a:ext cx="8002080" cy="696960"/>
+          </a:xfrm>
+          <a:prstGeom prst="rect">
+            <a:avLst/>
+          </a:prstGeom>
+          <a:noFill/>
+          <a:ln>
+            <a:noFill/>
+          </a:ln>
+        </p:spPr>
+        <p:style>
+          <a:lnRef idx="0">
+            <a:scrgbClr r="0" g="0" b="0"/>
+          </a:lnRef>
+          <a:fillRef idx="0">
+            <a:scrgbClr r="0" g="0" b="0"/>
+          </a:fillRef>
+          <a:effectRef idx="0">
+            <a:scrgbClr r="0" g="0" b="0"/>
+          </a:effectRef>
+          <a:fontRef idx="minor"/>
+        </p:style>
+        <p:txBody>
+          <a:bodyPr lIns="90000" tIns="45000" rIns="90000" bIns="45000" anchor="ctr"/>
+          <a:lstStyle/>
+          <a:p>
+            <a:pPr>
+              <a:lnSpc>
+                <a:spcPct val="100000"/>
+              </a:lnSpc>
+            </a:pPr>
+            <a:r>
+              <a:rPr lang="en-US" sz="3000" b="1" strike="noStrike" spc="-1">
+                <a:solidFill>
+                  <a:srgbClr val="404041"/>
+                </a:solidFill>
+                <a:latin typeface="Arial"/>
+                <a:ea typeface="Arial"/>
+              </a:rPr>
+              <a:t>Challenges</a:t>
+            </a:r>
+            <a:endParaRPr lang="en-US" sz="3000" b="0" strike="noStrike" spc="-1">
+              <a:latin typeface="Arial"/>
+            </a:endParaRPr>
+          </a:p>
+        </p:txBody>
+      </p:sp>
+      <p:sp>
+        <p:nvSpPr>
+          <p:cNvPr id="4" name="CuadroTexto 3"/>
+          <p:cNvSpPr txBox="1"/>
+          <p:nvPr/>
+        </p:nvSpPr>
+        <p:spPr>
+          <a:xfrm>
+            <a:off x="519645" y="1628144"/>
+            <a:ext cx="7021586" cy="1477328"/>
+          </a:xfrm>
+          <a:prstGeom prst="rect">
+            <a:avLst/>
+          </a:prstGeom>
+          <a:noFill/>
+        </p:spPr>
+        <p:txBody>
+          <a:bodyPr wrap="square" rtlCol="0">
+            <a:spAutoFit/>
+          </a:bodyPr>
+          <a:lstStyle/>
+          <a:p>
+            <a:pPr marL="285750" indent="-285750">
+              <a:buFont typeface="Arial" panose="020B0604020202020204" pitchFamily="34" charset="0"/>
+              <a:buChar char="•"/>
+            </a:pPr>
+            <a:r>
+              <a:rPr lang="en-US" dirty="0" smtClean="0"/>
+              <a:t>Learning to make interactive maps in </a:t>
+            </a:r>
+            <a:r>
+              <a:rPr lang="en-US" dirty="0" err="1" smtClean="0"/>
+              <a:t>altair</a:t>
+            </a:r>
+            <a:endParaRPr lang="en-US" dirty="0"/>
+          </a:p>
+          <a:p>
+            <a:pPr marL="742950" lvl="1" indent="-285750">
+              <a:buFont typeface="Arial" panose="020B0604020202020204" pitchFamily="34" charset="0"/>
+              <a:buChar char="•"/>
+            </a:pPr>
+            <a:r>
+              <a:rPr lang="en-US" dirty="0" smtClean="0"/>
+              <a:t>Maps do not support some common functionality</a:t>
+            </a:r>
+          </a:p>
+          <a:p>
+            <a:pPr marL="285750" indent="-285750">
+              <a:buFont typeface="Arial" panose="020B0604020202020204" pitchFamily="34" charset="0"/>
+              <a:buChar char="•"/>
+            </a:pPr>
+            <a:endParaRPr lang="en-US" dirty="0"/>
+          </a:p>
+          <a:p>
+            <a:pPr marL="285750" indent="-285750">
+              <a:buFont typeface="Arial" panose="020B0604020202020204" pitchFamily="34" charset="0"/>
+              <a:buChar char="•"/>
+            </a:pPr>
+            <a:r>
+              <a:rPr lang="en-US" dirty="0" smtClean="0"/>
+              <a:t>Slider for year selection in python did not work</a:t>
+            </a:r>
+          </a:p>
+          <a:p>
+            <a:pPr marL="742950" lvl="1" indent="-285750">
+              <a:buFont typeface="Arial" panose="020B0604020202020204" pitchFamily="34" charset="0"/>
+              <a:buChar char="•"/>
+            </a:pPr>
+            <a:r>
+              <a:rPr lang="en-US" dirty="0" smtClean="0"/>
+              <a:t>Used </a:t>
+            </a:r>
+            <a:r>
+              <a:rPr lang="en-US" dirty="0" err="1" smtClean="0"/>
+              <a:t>jquery</a:t>
+            </a:r>
+            <a:r>
+              <a:rPr lang="en-US" dirty="0" smtClean="0"/>
+              <a:t> in the end</a:t>
+            </a:r>
+            <a:endParaRPr lang="en-US" dirty="0"/>
+          </a:p>
+        </p:txBody>
+      </p:sp>
+    </p:spTree>
+    <p:extLst>
+      <p:ext uri="{BB962C8B-B14F-4D97-AF65-F5344CB8AC3E}">
+        <p14:creationId xmlns:p14="http://schemas.microsoft.com/office/powerpoint/2010/main" val="3095711716"/>
+      </p:ext>
+    </p:extLst>
+  </p:cSld>
+  <p:clrMapOvr>
+    <a:masterClrMapping/>
+  </p:clrMapOvr>
+  <p:timing>
+    <p:tnLst>
+      <p:par>
+        <p:cTn id="1" dur="indefinite" restart="never" nodeType="tmRoot">
+          <p:childTnLst>
+            <p:seq>
+              <p:cTn id="2" dur="indefinite" nodeType="mainSeq"/>
+              <p:prevCondLst>
+                <p:cond evt="onPrev" delay="0">
+                  <p:tgtEl>
+                    <p:sldTgt/>
+                  </p:tgtEl>
+                </p:cond>
+              </p:prevCondLst>
+              <p:nextCondLst>
+                <p:cond evt="onNext" delay="0">
+                  <p:tgtEl>
+                    <p:sldTgt/>
+                  </p:tgtEl>
+                </p:cond>
+              </p:nextCondLst>
+            </p:seq>
+          </p:childTnLst>
+        </p:cTn>
+      </p:par>
+    </p:tnLst>
+  </p:timing>
+</p:sld>
+</file>
+
+<file path=ppt/slides/slide32.xml><?xml version="1.0" encoding="utf-8"?>
+<p:sld xmlns:a="http://schemas.openxmlformats.org/drawingml/2006/main" xmlns:r="http://schemas.openxmlformats.org/officeDocument/2006/relationships" xmlns:p="http://schemas.openxmlformats.org/presentationml/2006/main">
+  <p:cSld>
+    <p:spTree>
+      <p:nvGrpSpPr>
+        <p:cNvPr id="1" name=""/>
+        <p:cNvGrpSpPr/>
+        <p:nvPr/>
+      </p:nvGrpSpPr>
+      <p:grpSpPr>
+        <a:xfrm>
+          <a:off x="0" y="0"/>
+          <a:ext cx="0" cy="0"/>
+          <a:chOff x="0" y="0"/>
+          <a:chExt cx="0" cy="0"/>
+        </a:xfrm>
+      </p:grpSpPr>
+      <p:sp>
+        <p:nvSpPr>
           <p:cNvPr id="143" name="CustomShape 1"/>
           <p:cNvSpPr/>
           <p:nvPr/>
@@ -8696,7 +8904,7 @@
 </p:sld>
 </file>
 
-<file path=ppt/slides/slide32.xml><?xml version="1.0" encoding="utf-8"?>
+<file path=ppt/slides/slide33.xml><?xml version="1.0" encoding="utf-8"?>
 <p:sld xmlns:a="http://schemas.openxmlformats.org/drawingml/2006/main" xmlns:r="http://schemas.openxmlformats.org/officeDocument/2006/relationships" xmlns:p="http://schemas.openxmlformats.org/presentationml/2006/main">
   <p:cSld>
     <p:spTree>

</xml_diff>

<commit_message>
ppt 15 sec again
</commit_message>
<xml_diff>
--- a/dviz_ppt.pptx
+++ b/dviz_ppt.pptx
@@ -4861,10 +4861,10 @@
   </p:clrMapOvr>
   <mc:AlternateContent xmlns:mc="http://schemas.openxmlformats.org/markup-compatibility/2006">
     <mc:Choice xmlns:p14="http://schemas.microsoft.com/office/powerpoint/2010/main" Requires="p14">
-      <p:transition spd="slow" p14:dur="2000" advTm="15000"/>
+      <p:transition spd="slow" p14:dur="2000" advTm="5000"/>
     </mc:Choice>
     <mc:Fallback>
-      <p:transition spd="slow" advTm="15000"/>
+      <p:transition spd="slow" advTm="5000"/>
     </mc:Fallback>
   </mc:AlternateContent>
   <p:timing>
@@ -7375,10 +7375,10 @@
   </p:clrMapOvr>
   <mc:AlternateContent xmlns:mc="http://schemas.openxmlformats.org/markup-compatibility/2006">
     <mc:Choice xmlns:p14="http://schemas.microsoft.com/office/powerpoint/2010/main" Requires="p14">
-      <p:transition spd="slow" p14:dur="2000" advTm="15000"/>
+      <p:transition spd="slow" p14:dur="2000" advTm="5000"/>
     </mc:Choice>
     <mc:Fallback>
-      <p:transition spd="slow" advTm="15000"/>
+      <p:transition spd="slow" advTm="5000"/>
     </mc:Fallback>
   </mc:AlternateContent>
   <p:timing>

</xml_diff>